<commit_message>
Updated presentation, added INTERSECT logo, activities
</commit_message>
<xml_diff>
--- a/presentations/CollaborativeConstruction.pptx
+++ b/presentations/CollaborativeConstruction.pptx
@@ -5,7 +5,7 @@
     <p:sldMasterId id="2147483648" r:id="rId1"/>
   </p:sldMasterIdLst>
   <p:notesMasterIdLst>
-    <p:notesMasterId r:id="rId29"/>
+    <p:notesMasterId r:id="rId32"/>
   </p:notesMasterIdLst>
   <p:sldIdLst>
     <p:sldId id="256" r:id="rId2"/>
@@ -34,7 +34,10 @@
     <p:sldId id="456" r:id="rId25"/>
     <p:sldId id="453" r:id="rId26"/>
     <p:sldId id="440" r:id="rId27"/>
-    <p:sldId id="430" r:id="rId28"/>
+    <p:sldId id="457" r:id="rId28"/>
+    <p:sldId id="459" r:id="rId29"/>
+    <p:sldId id="458" r:id="rId30"/>
+    <p:sldId id="460" r:id="rId31"/>
   </p:sldIdLst>
   <p:sldSz cx="12192000" cy="6858000"/>
   <p:notesSz cx="6858000" cy="9144000"/>
@@ -223,7 +226,7 @@
           <a:p>
             <a:fld id="{030160F6-98F2-C24A-A79A-6A89FCFB074E}" type="datetimeFigureOut">
               <a:rPr lang="en-US" smtClean="0"/>
-              <a:t>6/28/23</a:t>
+              <a:t>7/7/23</a:t>
             </a:fld>
             <a:endParaRPr lang="en-US"/>
           </a:p>
@@ -620,41 +623,7 @@
           <a:p>
             <a:r>
               <a:rPr lang="en-US" dirty="0"/>
-              <a:t>“Don’t shit where you eat.”</a:t>
-            </a:r>
-          </a:p>
-          <a:p>
-            <a:endParaRPr lang="en-US" dirty="0"/>
-          </a:p>
-          <a:p>
-            <a:r>
-              <a:rPr lang="en-US" dirty="0"/>
-              <a:t>Learning to do this kind of thing effectively, will give you a growing </a:t>
-            </a:r>
-            <a:r>
-              <a:rPr lang="en-US" u="sng" dirty="0"/>
-              <a:t>influence</a:t>
-            </a:r>
-            <a:r>
-              <a:rPr lang="en-US" dirty="0"/>
-              <a:t> in the environments where you work.  This will allow you to have a profoundly positive effect in many different situations.</a:t>
-            </a:r>
-          </a:p>
-          <a:p>
-            <a:endParaRPr lang="en-US" dirty="0"/>
-          </a:p>
-          <a:p>
-            <a:r>
-              <a:rPr lang="en-US" dirty="0"/>
-              <a:t>A slight caveat on the last point:  </a:t>
-            </a:r>
-            <a:r>
-              <a:rPr lang="en-US" b="1" dirty="0"/>
-              <a:t>Don’t feel like you have to fix the author’s code for them.</a:t>
-            </a:r>
-            <a:r>
-              <a:rPr lang="en-US" dirty="0"/>
-              <a:t>  It’s their code.  Share whatever insights you may have, but they are primarily responsible.</a:t>
+              <a:t>Palantir has a similar specification, even more detailed, for reviewers to consider.</a:t>
             </a:r>
           </a:p>
         </p:txBody>
@@ -676,7 +645,7 @@
           <a:p>
             <a:fld id="{2744C287-4C1B-E44A-A5AD-508A7D1413E1}" type="slidenum">
               <a:rPr lang="en-US" smtClean="0"/>
-              <a:t>11</a:t>
+              <a:t>10</a:t>
             </a:fld>
             <a:endParaRPr lang="en-US"/>
           </a:p>
@@ -685,7 +654,7 @@
     </p:spTree>
     <p:extLst>
       <p:ext uri="{BB962C8B-B14F-4D97-AF65-F5344CB8AC3E}">
-        <p14:creationId xmlns:p14="http://schemas.microsoft.com/office/powerpoint/2010/main" val="1477151881"/>
+        <p14:creationId xmlns:p14="http://schemas.microsoft.com/office/powerpoint/2010/main" val="4109892975"/>
       </p:ext>
     </p:extLst>
   </p:cSld>
@@ -741,7 +710,7 @@
           <a:p>
             <a:r>
               <a:rPr lang="en-US" dirty="0"/>
-              <a:t>Dave R. calls this interaction “kibbitzing”</a:t>
+              <a:t>“Don’t shit where you eat.”</a:t>
             </a:r>
           </a:p>
           <a:p>
@@ -750,7 +719,32 @@
           <a:p>
             <a:r>
               <a:rPr lang="en-US" dirty="0"/>
-              <a:t>The “Driver” and “Navigator” roles remind me of rally-car racing, where the navigator is just as important as the driver, calling out the course-notes to the driver to keep them from hurtling off the side of the cliff!</a:t>
+              <a:t>Learning to do this kind of thing effectively, will give you a growing </a:t>
+            </a:r>
+            <a:r>
+              <a:rPr lang="en-US" u="sng" dirty="0"/>
+              <a:t>influence</a:t>
+            </a:r>
+            <a:r>
+              <a:rPr lang="en-US" dirty="0"/>
+              <a:t> in the environments where you work.  This will allow you to have a profoundly positive effect in many different situations.</a:t>
+            </a:r>
+          </a:p>
+          <a:p>
+            <a:endParaRPr lang="en-US" dirty="0"/>
+          </a:p>
+          <a:p>
+            <a:r>
+              <a:rPr lang="en-US" dirty="0"/>
+              <a:t>A slight caveat on the last point:  </a:t>
+            </a:r>
+            <a:r>
+              <a:rPr lang="en-US" b="1" dirty="0"/>
+              <a:t>Don’t feel like you have to fix the author’s code for them.</a:t>
+            </a:r>
+            <a:r>
+              <a:rPr lang="en-US" dirty="0"/>
+              <a:t>  It’s their code.  Share whatever insights you may have, but they are primarily responsible.</a:t>
             </a:r>
           </a:p>
         </p:txBody>
@@ -772,7 +766,7 @@
           <a:p>
             <a:fld id="{2744C287-4C1B-E44A-A5AD-508A7D1413E1}" type="slidenum">
               <a:rPr lang="en-US" smtClean="0"/>
-              <a:t>16</a:t>
+              <a:t>11</a:t>
             </a:fld>
             <a:endParaRPr lang="en-US"/>
           </a:p>
@@ -781,7 +775,7 @@
     </p:spTree>
     <p:extLst>
       <p:ext uri="{BB962C8B-B14F-4D97-AF65-F5344CB8AC3E}">
-        <p14:creationId xmlns:p14="http://schemas.microsoft.com/office/powerpoint/2010/main" val="1987780007"/>
+        <p14:creationId xmlns:p14="http://schemas.microsoft.com/office/powerpoint/2010/main" val="1477151881"/>
       </p:ext>
     </p:extLst>
   </p:cSld>
@@ -835,10 +829,7 @@
           <a:bodyPr/>
           <a:lstStyle/>
           <a:p>
-            <a:r>
-              <a:rPr lang="en-US" dirty="0"/>
-              <a:t>As with anything, pair programming requires a learning and adjustment phase, but after that, the steady-state is around 15% overhead.</a:t>
-            </a:r>
+            <a:endParaRPr lang="en-US" dirty="0"/>
           </a:p>
         </p:txBody>
       </p:sp>
@@ -859,7 +850,7 @@
           <a:p>
             <a:fld id="{2744C287-4C1B-E44A-A5AD-508A7D1413E1}" type="slidenum">
               <a:rPr lang="en-US" smtClean="0"/>
-              <a:t>17</a:t>
+              <a:t>14</a:t>
             </a:fld>
             <a:endParaRPr lang="en-US"/>
           </a:p>
@@ -868,7 +859,7 @@
     </p:spTree>
     <p:extLst>
       <p:ext uri="{BB962C8B-B14F-4D97-AF65-F5344CB8AC3E}">
-        <p14:creationId xmlns:p14="http://schemas.microsoft.com/office/powerpoint/2010/main" val="297968358"/>
+        <p14:creationId xmlns:p14="http://schemas.microsoft.com/office/powerpoint/2010/main" val="2220079808"/>
       </p:ext>
     </p:extLst>
   </p:cSld>
@@ -924,7 +915,7 @@
           <a:p>
             <a:r>
               <a:rPr lang="en-US" dirty="0"/>
-              <a:t>“Tunnel vision” and “target fixation” are physical phenomena that relate to this issue.</a:t>
+              <a:t>Dave R. calls this interaction “kibbitzing”</a:t>
             </a:r>
           </a:p>
           <a:p>
@@ -933,16 +924,7 @@
           <a:p>
             <a:r>
               <a:rPr lang="en-US" dirty="0"/>
-              <a:t>“Rubber-duck debugging” refers to the phenomenon of identifying bugs in your program, merely through the process of explaining it to someone else.</a:t>
-            </a:r>
-          </a:p>
-          <a:p>
-            <a:endParaRPr lang="en-US" dirty="0"/>
-          </a:p>
-          <a:p>
-            <a:r>
-              <a:rPr lang="en-US" dirty="0"/>
-              <a:t>In fact, this doesn’t even need interaction from the one listening – to the point that some people would just explain their code to a rubber duck on their desk!</a:t>
+              <a:t>The “Driver” and “Navigator” roles remind me of rally-car racing, where the navigator is just as important as the driver, calling out the course-notes to the driver to keep them from hurtling off the side of the cliff!</a:t>
             </a:r>
           </a:p>
         </p:txBody>
@@ -964,7 +946,7 @@
           <a:p>
             <a:fld id="{2744C287-4C1B-E44A-A5AD-508A7D1413E1}" type="slidenum">
               <a:rPr lang="en-US" smtClean="0"/>
-              <a:t>19</a:t>
+              <a:t>16</a:t>
             </a:fld>
             <a:endParaRPr lang="en-US"/>
           </a:p>
@@ -973,7 +955,7 @@
     </p:spTree>
     <p:extLst>
       <p:ext uri="{BB962C8B-B14F-4D97-AF65-F5344CB8AC3E}">
-        <p14:creationId xmlns:p14="http://schemas.microsoft.com/office/powerpoint/2010/main" val="3244465112"/>
+        <p14:creationId xmlns:p14="http://schemas.microsoft.com/office/powerpoint/2010/main" val="1987780007"/>
       </p:ext>
     </p:extLst>
   </p:cSld>
@@ -1027,7 +1009,10 @@
           <a:bodyPr/>
           <a:lstStyle/>
           <a:p>
-            <a:endParaRPr lang="en-US" dirty="0"/>
+            <a:r>
+              <a:rPr lang="en-US" dirty="0"/>
+              <a:t>As with anything, pair programming requires a learning and adjustment phase, but after that, the steady-state is around 15% overhead.</a:t>
+            </a:r>
           </a:p>
         </p:txBody>
       </p:sp>
@@ -1048,7 +1033,7 @@
           <a:p>
             <a:fld id="{2744C287-4C1B-E44A-A5AD-508A7D1413E1}" type="slidenum">
               <a:rPr lang="en-US" smtClean="0"/>
-              <a:t>21</a:t>
+              <a:t>17</a:t>
             </a:fld>
             <a:endParaRPr lang="en-US"/>
           </a:p>
@@ -1057,7 +1042,7 @@
     </p:spTree>
     <p:extLst>
       <p:ext uri="{BB962C8B-B14F-4D97-AF65-F5344CB8AC3E}">
-        <p14:creationId xmlns:p14="http://schemas.microsoft.com/office/powerpoint/2010/main" val="1959687549"/>
+        <p14:creationId xmlns:p14="http://schemas.microsoft.com/office/powerpoint/2010/main" val="297968358"/>
       </p:ext>
     </p:extLst>
   </p:cSld>
@@ -1111,45 +1096,6 @@
           <a:bodyPr/>
           <a:lstStyle/>
           <a:p>
-            <a:r>
-              <a:rPr lang="en-US" dirty="0"/>
-              <a:t>These kinds of comments make me wonder why students on team projects so often “silo” the work.</a:t>
-            </a:r>
-          </a:p>
-          <a:p>
-            <a:endParaRPr lang="en-US" dirty="0"/>
-          </a:p>
-          <a:p>
-            <a:pPr marL="171450" indent="-171450">
-              <a:buFont typeface="Arial" panose="020B0604020202020204" pitchFamily="34" charset="0"/>
-              <a:buChar char="•"/>
-            </a:pPr>
-            <a:r>
-              <a:rPr lang="en-US" dirty="0"/>
-              <a:t>You are letting more defects slip through, which makes things take longer to finish</a:t>
-            </a:r>
-          </a:p>
-          <a:p>
-            <a:pPr marL="171450" indent="-171450">
-              <a:buFont typeface="Arial" panose="020B0604020202020204" pitchFamily="34" charset="0"/>
-              <a:buChar char="•"/>
-            </a:pPr>
-            <a:r>
-              <a:rPr lang="en-US" dirty="0"/>
-              <a:t>You aren’t learning what the other teammates are working on, which is a constant complaint from project classes</a:t>
-            </a:r>
-          </a:p>
-          <a:p>
-            <a:pPr marL="171450" indent="-171450">
-              <a:buFont typeface="Arial" panose="020B0604020202020204" pitchFamily="34" charset="0"/>
-              <a:buChar char="•"/>
-            </a:pPr>
-            <a:r>
-              <a:rPr lang="en-US" dirty="0"/>
-              <a:t>You are having a less satisfying and more exhausting experience from the process!</a:t>
-            </a:r>
-          </a:p>
-          <a:p>
             <a:endParaRPr lang="en-US" dirty="0"/>
           </a:p>
         </p:txBody>
@@ -1171,7 +1117,7 @@
           <a:p>
             <a:fld id="{2744C287-4C1B-E44A-A5AD-508A7D1413E1}" type="slidenum">
               <a:rPr lang="en-US" smtClean="0"/>
-              <a:t>22</a:t>
+              <a:t>18</a:t>
             </a:fld>
             <a:endParaRPr lang="en-US"/>
           </a:p>
@@ -1180,7 +1126,7 @@
     </p:spTree>
     <p:extLst>
       <p:ext uri="{BB962C8B-B14F-4D97-AF65-F5344CB8AC3E}">
-        <p14:creationId xmlns:p14="http://schemas.microsoft.com/office/powerpoint/2010/main" val="4139959776"/>
+        <p14:creationId xmlns:p14="http://schemas.microsoft.com/office/powerpoint/2010/main" val="2568552436"/>
       </p:ext>
     </p:extLst>
   </p:cSld>
@@ -1235,66 +1181,27 @@
           <a:lstStyle/>
           <a:p>
             <a:r>
-              <a:rPr lang="en-US" sz="1200" kern="1200" dirty="0">
-                <a:solidFill>
-                  <a:schemeClr val="tx1"/>
-                </a:solidFill>
-                <a:effectLst/>
-                <a:latin typeface="+mn-lt"/>
-                <a:ea typeface="+mn-ea"/>
-                <a:cs typeface="+mn-cs"/>
-              </a:rPr>
-              <a:t>From Ron Jeffries (one of the inventors of XP):</a:t>
-            </a:r>
-          </a:p>
-          <a:p>
-            <a:endParaRPr lang="en-US" sz="1200" kern="1200" dirty="0">
-              <a:solidFill>
-                <a:schemeClr val="tx1"/>
-              </a:solidFill>
-              <a:effectLst/>
-              <a:latin typeface="+mn-lt"/>
-              <a:ea typeface="+mn-ea"/>
-              <a:cs typeface="+mn-cs"/>
-            </a:endParaRPr>
-          </a:p>
-          <a:p>
-            <a:pPr lvl="1"/>
-            <a:r>
-              <a:rPr lang="en-US" sz="1200" kern="1200" dirty="0">
-                <a:solidFill>
-                  <a:schemeClr val="tx1"/>
-                </a:solidFill>
-                <a:effectLst/>
-                <a:latin typeface="+mn-lt"/>
-                <a:ea typeface="+mn-ea"/>
-                <a:cs typeface="+mn-cs"/>
-              </a:rPr>
-              <a:t>“I was sitting with one of the least-experienced developers, working on some fairly straightforward task. Frankly, I was thinking to myself that with my great skill in Smalltalk, I would soon be teaching this young programmer how it’s really done.</a:t>
-            </a:r>
-          </a:p>
-          <a:p>
-            <a:pPr lvl="1"/>
+              <a:rPr lang="en-US" dirty="0"/>
+              <a:t>“Tunnel vision” and “target fixation” are physical phenomena that relate to this issue.</a:t>
+            </a:r>
+          </a:p>
+          <a:p>
             <a:endParaRPr lang="en-US" dirty="0"/>
           </a:p>
           <a:p>
-            <a:pPr lvl="1"/>
-            <a:r>
-              <a:rPr lang="en-US" sz="1200" kern="1200" dirty="0">
-                <a:solidFill>
-                  <a:schemeClr val="tx1"/>
-                </a:solidFill>
-                <a:effectLst/>
-                <a:latin typeface="+mn-lt"/>
-                <a:ea typeface="+mn-ea"/>
-                <a:cs typeface="+mn-cs"/>
-              </a:rPr>
-              <a:t>“We hadn’t been programming more than a few minutes when the youngster asked me why I was doing what I was doing. Sure enough, I was off on a bad track. I went another way. Then the whippersnapper reminded me of the correct method name for whatever I was mistyping at the time. Pretty soon, he was suggesting what I should do next, meanwhile calling out my every formatting error and syntax mistake.”</a:t>
-            </a:r>
+            <a:r>
+              <a:rPr lang="en-US" dirty="0"/>
+              <a:t>“Rubber-duck debugging” refers to the phenomenon of identifying bugs in your program, merely through the process of explaining it to someone else.</a:t>
+            </a:r>
+          </a:p>
+          <a:p>
             <a:endParaRPr lang="en-US" dirty="0"/>
           </a:p>
           <a:p>
-            <a:endParaRPr lang="en-US" dirty="0"/>
+            <a:r>
+              <a:rPr lang="en-US" dirty="0"/>
+              <a:t>In fact, this doesn’t even need interaction from the one listening – to the point that some people would just explain their code to a rubber duck on their desk!</a:t>
+            </a:r>
           </a:p>
         </p:txBody>
       </p:sp>
@@ -1315,7 +1222,7 @@
           <a:p>
             <a:fld id="{2744C287-4C1B-E44A-A5AD-508A7D1413E1}" type="slidenum">
               <a:rPr lang="en-US" smtClean="0"/>
-              <a:t>24</a:t>
+              <a:t>19</a:t>
             </a:fld>
             <a:endParaRPr lang="en-US"/>
           </a:p>
@@ -1324,7 +1231,7 @@
     </p:spTree>
     <p:extLst>
       <p:ext uri="{BB962C8B-B14F-4D97-AF65-F5344CB8AC3E}">
-        <p14:creationId xmlns:p14="http://schemas.microsoft.com/office/powerpoint/2010/main" val="2003885883"/>
+        <p14:creationId xmlns:p14="http://schemas.microsoft.com/office/powerpoint/2010/main" val="3244465112"/>
       </p:ext>
     </p:extLst>
   </p:cSld>
@@ -1378,14 +1285,7 @@
           <a:bodyPr/>
           <a:lstStyle/>
           <a:p>
-            <a:r>
-              <a:rPr lang="en-US" dirty="0"/>
-              <a:t>You may notice that the suggestions here, follow the same topics as the code-review topics.  </a:t>
-            </a:r>
-            <a:r>
-              <a:rPr lang="en-US" b="1" dirty="0"/>
-              <a:t>This is not by accident!</a:t>
-            </a:r>
+            <a:endParaRPr lang="en-US" dirty="0"/>
           </a:p>
         </p:txBody>
       </p:sp>
@@ -1406,7 +1306,7 @@
           <a:p>
             <a:fld id="{2744C287-4C1B-E44A-A5AD-508A7D1413E1}" type="slidenum">
               <a:rPr lang="en-US" smtClean="0"/>
-              <a:t>26</a:t>
+              <a:t>21</a:t>
             </a:fld>
             <a:endParaRPr lang="en-US"/>
           </a:p>
@@ -1415,7 +1315,274 @@
     </p:spTree>
     <p:extLst>
       <p:ext uri="{BB962C8B-B14F-4D97-AF65-F5344CB8AC3E}">
-        <p14:creationId xmlns:p14="http://schemas.microsoft.com/office/powerpoint/2010/main" val="2780002173"/>
+        <p14:creationId xmlns:p14="http://schemas.microsoft.com/office/powerpoint/2010/main" val="1959687549"/>
+      </p:ext>
+    </p:extLst>
+  </p:cSld>
+  <p:clrMapOvr>
+    <a:masterClrMapping/>
+  </p:clrMapOvr>
+</p:notes>
+</file>
+
+<file path=ppt/notesSlides/notesSlide18.xml><?xml version="1.0" encoding="utf-8"?>
+<p:notes xmlns:a="http://schemas.openxmlformats.org/drawingml/2006/main" xmlns:r="http://schemas.openxmlformats.org/officeDocument/2006/relationships" xmlns:p="http://schemas.openxmlformats.org/presentationml/2006/main">
+  <p:cSld>
+    <p:spTree>
+      <p:nvGrpSpPr>
+        <p:cNvPr id="1" name=""/>
+        <p:cNvGrpSpPr/>
+        <p:nvPr/>
+      </p:nvGrpSpPr>
+      <p:grpSpPr>
+        <a:xfrm>
+          <a:off x="0" y="0"/>
+          <a:ext cx="0" cy="0"/>
+          <a:chOff x="0" y="0"/>
+          <a:chExt cx="0" cy="0"/>
+        </a:xfrm>
+      </p:grpSpPr>
+      <p:sp>
+        <p:nvSpPr>
+          <p:cNvPr id="2" name="Slide Image Placeholder 1"/>
+          <p:cNvSpPr>
+            <a:spLocks noGrp="1" noRot="1" noChangeAspect="1"/>
+          </p:cNvSpPr>
+          <p:nvPr>
+            <p:ph type="sldImg"/>
+          </p:nvPr>
+        </p:nvSpPr>
+        <p:spPr/>
+      </p:sp>
+      <p:sp>
+        <p:nvSpPr>
+          <p:cNvPr id="3" name="Notes Placeholder 2"/>
+          <p:cNvSpPr>
+            <a:spLocks noGrp="1"/>
+          </p:cNvSpPr>
+          <p:nvPr>
+            <p:ph type="body" idx="1"/>
+          </p:nvPr>
+        </p:nvSpPr>
+        <p:spPr/>
+        <p:txBody>
+          <a:bodyPr/>
+          <a:lstStyle/>
+          <a:p>
+            <a:r>
+              <a:rPr lang="en-US" dirty="0"/>
+              <a:t>These kinds of comments make me wonder why students on team projects so often “silo” the work.</a:t>
+            </a:r>
+          </a:p>
+          <a:p>
+            <a:endParaRPr lang="en-US" dirty="0"/>
+          </a:p>
+          <a:p>
+            <a:pPr marL="171450" indent="-171450">
+              <a:buFont typeface="Arial" panose="020B0604020202020204" pitchFamily="34" charset="0"/>
+              <a:buChar char="•"/>
+            </a:pPr>
+            <a:r>
+              <a:rPr lang="en-US" dirty="0"/>
+              <a:t>You are letting more defects slip through, which makes things take longer to finish</a:t>
+            </a:r>
+          </a:p>
+          <a:p>
+            <a:pPr marL="171450" indent="-171450">
+              <a:buFont typeface="Arial" panose="020B0604020202020204" pitchFamily="34" charset="0"/>
+              <a:buChar char="•"/>
+            </a:pPr>
+            <a:r>
+              <a:rPr lang="en-US" dirty="0"/>
+              <a:t>You aren’t learning what the other teammates are working on, which is a constant complaint from project classes</a:t>
+            </a:r>
+          </a:p>
+          <a:p>
+            <a:pPr marL="171450" indent="-171450">
+              <a:buFont typeface="Arial" panose="020B0604020202020204" pitchFamily="34" charset="0"/>
+              <a:buChar char="•"/>
+            </a:pPr>
+            <a:r>
+              <a:rPr lang="en-US" dirty="0"/>
+              <a:t>You are having a less satisfying and more exhausting experience from the process!</a:t>
+            </a:r>
+          </a:p>
+          <a:p>
+            <a:endParaRPr lang="en-US" dirty="0"/>
+          </a:p>
+        </p:txBody>
+      </p:sp>
+      <p:sp>
+        <p:nvSpPr>
+          <p:cNvPr id="4" name="Slide Number Placeholder 3"/>
+          <p:cNvSpPr>
+            <a:spLocks noGrp="1"/>
+          </p:cNvSpPr>
+          <p:nvPr>
+            <p:ph type="sldNum" sz="quarter" idx="5"/>
+          </p:nvPr>
+        </p:nvSpPr>
+        <p:spPr/>
+        <p:txBody>
+          <a:bodyPr/>
+          <a:lstStyle/>
+          <a:p>
+            <a:fld id="{2744C287-4C1B-E44A-A5AD-508A7D1413E1}" type="slidenum">
+              <a:rPr lang="en-US" smtClean="0"/>
+              <a:t>22</a:t>
+            </a:fld>
+            <a:endParaRPr lang="en-US"/>
+          </a:p>
+        </p:txBody>
+      </p:sp>
+    </p:spTree>
+    <p:extLst>
+      <p:ext uri="{BB962C8B-B14F-4D97-AF65-F5344CB8AC3E}">
+        <p14:creationId xmlns:p14="http://schemas.microsoft.com/office/powerpoint/2010/main" val="4139959776"/>
+      </p:ext>
+    </p:extLst>
+  </p:cSld>
+  <p:clrMapOvr>
+    <a:masterClrMapping/>
+  </p:clrMapOvr>
+</p:notes>
+</file>
+
+<file path=ppt/notesSlides/notesSlide19.xml><?xml version="1.0" encoding="utf-8"?>
+<p:notes xmlns:a="http://schemas.openxmlformats.org/drawingml/2006/main" xmlns:r="http://schemas.openxmlformats.org/officeDocument/2006/relationships" xmlns:p="http://schemas.openxmlformats.org/presentationml/2006/main">
+  <p:cSld>
+    <p:spTree>
+      <p:nvGrpSpPr>
+        <p:cNvPr id="1" name=""/>
+        <p:cNvGrpSpPr/>
+        <p:nvPr/>
+      </p:nvGrpSpPr>
+      <p:grpSpPr>
+        <a:xfrm>
+          <a:off x="0" y="0"/>
+          <a:ext cx="0" cy="0"/>
+          <a:chOff x="0" y="0"/>
+          <a:chExt cx="0" cy="0"/>
+        </a:xfrm>
+      </p:grpSpPr>
+      <p:sp>
+        <p:nvSpPr>
+          <p:cNvPr id="2" name="Slide Image Placeholder 1"/>
+          <p:cNvSpPr>
+            <a:spLocks noGrp="1" noRot="1" noChangeAspect="1"/>
+          </p:cNvSpPr>
+          <p:nvPr>
+            <p:ph type="sldImg"/>
+          </p:nvPr>
+        </p:nvSpPr>
+        <p:spPr/>
+      </p:sp>
+      <p:sp>
+        <p:nvSpPr>
+          <p:cNvPr id="3" name="Notes Placeholder 2"/>
+          <p:cNvSpPr>
+            <a:spLocks noGrp="1"/>
+          </p:cNvSpPr>
+          <p:nvPr>
+            <p:ph type="body" idx="1"/>
+          </p:nvPr>
+        </p:nvSpPr>
+        <p:spPr/>
+        <p:txBody>
+          <a:bodyPr/>
+          <a:lstStyle/>
+          <a:p>
+            <a:r>
+              <a:rPr lang="en-US" sz="1200" kern="1200" dirty="0">
+                <a:solidFill>
+                  <a:schemeClr val="tx1"/>
+                </a:solidFill>
+                <a:effectLst/>
+                <a:latin typeface="+mn-lt"/>
+                <a:ea typeface="+mn-ea"/>
+                <a:cs typeface="+mn-cs"/>
+              </a:rPr>
+              <a:t>From Ron Jeffries (one of the inventors of XP):</a:t>
+            </a:r>
+          </a:p>
+          <a:p>
+            <a:endParaRPr lang="en-US" sz="1200" kern="1200" dirty="0">
+              <a:solidFill>
+                <a:schemeClr val="tx1"/>
+              </a:solidFill>
+              <a:effectLst/>
+              <a:latin typeface="+mn-lt"/>
+              <a:ea typeface="+mn-ea"/>
+              <a:cs typeface="+mn-cs"/>
+            </a:endParaRPr>
+          </a:p>
+          <a:p>
+            <a:pPr lvl="1"/>
+            <a:r>
+              <a:rPr lang="en-US" sz="1200" kern="1200" dirty="0">
+                <a:solidFill>
+                  <a:schemeClr val="tx1"/>
+                </a:solidFill>
+                <a:effectLst/>
+                <a:latin typeface="+mn-lt"/>
+                <a:ea typeface="+mn-ea"/>
+                <a:cs typeface="+mn-cs"/>
+              </a:rPr>
+              <a:t>“I was sitting with one of the least-experienced developers, working on some fairly straightforward task. Frankly, I was thinking to myself that with my great skill in Smalltalk, I would soon be teaching this young programmer how it’s really done.</a:t>
+            </a:r>
+          </a:p>
+          <a:p>
+            <a:pPr lvl="1"/>
+            <a:endParaRPr lang="en-US" dirty="0"/>
+          </a:p>
+          <a:p>
+            <a:pPr lvl="1"/>
+            <a:r>
+              <a:rPr lang="en-US" sz="1200" kern="1200" dirty="0">
+                <a:solidFill>
+                  <a:schemeClr val="tx1"/>
+                </a:solidFill>
+                <a:effectLst/>
+                <a:latin typeface="+mn-lt"/>
+                <a:ea typeface="+mn-ea"/>
+                <a:cs typeface="+mn-cs"/>
+              </a:rPr>
+              <a:t>“We hadn’t been programming more than a few minutes when the youngster asked me why I was doing what I was doing. Sure enough, I was off on a bad track. I went another way. Then the whippersnapper reminded me of the correct method name for whatever I was mistyping at the time. Pretty soon, he was suggesting what I should do next, meanwhile calling out my every formatting error and syntax mistake.”</a:t>
+            </a:r>
+            <a:endParaRPr lang="en-US" dirty="0"/>
+          </a:p>
+          <a:p>
+            <a:endParaRPr lang="en-US" dirty="0"/>
+          </a:p>
+        </p:txBody>
+      </p:sp>
+      <p:sp>
+        <p:nvSpPr>
+          <p:cNvPr id="4" name="Slide Number Placeholder 3"/>
+          <p:cNvSpPr>
+            <a:spLocks noGrp="1"/>
+          </p:cNvSpPr>
+          <p:nvPr>
+            <p:ph type="sldNum" sz="quarter" idx="5"/>
+          </p:nvPr>
+        </p:nvSpPr>
+        <p:spPr/>
+        <p:txBody>
+          <a:bodyPr/>
+          <a:lstStyle/>
+          <a:p>
+            <a:fld id="{2744C287-4C1B-E44A-A5AD-508A7D1413E1}" type="slidenum">
+              <a:rPr lang="en-US" smtClean="0"/>
+              <a:t>24</a:t>
+            </a:fld>
+            <a:endParaRPr lang="en-US"/>
+          </a:p>
+        </p:txBody>
+      </p:sp>
+    </p:spTree>
+    <p:extLst>
+      <p:ext uri="{BB962C8B-B14F-4D97-AF65-F5344CB8AC3E}">
+        <p14:creationId xmlns:p14="http://schemas.microsoft.com/office/powerpoint/2010/main" val="2003885883"/>
       </p:ext>
     </p:extLst>
   </p:cSld>
@@ -1512,6 +1679,433 @@
 </p:notes>
 </file>
 
+<file path=ppt/notesSlides/notesSlide20.xml><?xml version="1.0" encoding="utf-8"?>
+<p:notes xmlns:a="http://schemas.openxmlformats.org/drawingml/2006/main" xmlns:r="http://schemas.openxmlformats.org/officeDocument/2006/relationships" xmlns:p="http://schemas.openxmlformats.org/presentationml/2006/main">
+  <p:cSld>
+    <p:spTree>
+      <p:nvGrpSpPr>
+        <p:cNvPr id="1" name=""/>
+        <p:cNvGrpSpPr/>
+        <p:nvPr/>
+      </p:nvGrpSpPr>
+      <p:grpSpPr>
+        <a:xfrm>
+          <a:off x="0" y="0"/>
+          <a:ext cx="0" cy="0"/>
+          <a:chOff x="0" y="0"/>
+          <a:chExt cx="0" cy="0"/>
+        </a:xfrm>
+      </p:grpSpPr>
+      <p:sp>
+        <p:nvSpPr>
+          <p:cNvPr id="2" name="Slide Image Placeholder 1"/>
+          <p:cNvSpPr>
+            <a:spLocks noGrp="1" noRot="1" noChangeAspect="1"/>
+          </p:cNvSpPr>
+          <p:nvPr>
+            <p:ph type="sldImg"/>
+          </p:nvPr>
+        </p:nvSpPr>
+        <p:spPr/>
+      </p:sp>
+      <p:sp>
+        <p:nvSpPr>
+          <p:cNvPr id="3" name="Notes Placeholder 2"/>
+          <p:cNvSpPr>
+            <a:spLocks noGrp="1"/>
+          </p:cNvSpPr>
+          <p:nvPr>
+            <p:ph type="body" idx="1"/>
+          </p:nvPr>
+        </p:nvSpPr>
+        <p:spPr/>
+        <p:txBody>
+          <a:bodyPr/>
+          <a:lstStyle/>
+          <a:p>
+            <a:r>
+              <a:rPr lang="en-US" dirty="0"/>
+              <a:t>You may notice that the suggestions here, follow the same topics as the code-review topics.  </a:t>
+            </a:r>
+            <a:r>
+              <a:rPr lang="en-US" b="1" dirty="0"/>
+              <a:t>This is not by accident!</a:t>
+            </a:r>
+          </a:p>
+        </p:txBody>
+      </p:sp>
+      <p:sp>
+        <p:nvSpPr>
+          <p:cNvPr id="4" name="Slide Number Placeholder 3"/>
+          <p:cNvSpPr>
+            <a:spLocks noGrp="1"/>
+          </p:cNvSpPr>
+          <p:nvPr>
+            <p:ph type="sldNum" sz="quarter" idx="5"/>
+          </p:nvPr>
+        </p:nvSpPr>
+        <p:spPr/>
+        <p:txBody>
+          <a:bodyPr/>
+          <a:lstStyle/>
+          <a:p>
+            <a:fld id="{2744C287-4C1B-E44A-A5AD-508A7D1413E1}" type="slidenum">
+              <a:rPr lang="en-US" smtClean="0"/>
+              <a:t>26</a:t>
+            </a:fld>
+            <a:endParaRPr lang="en-US"/>
+          </a:p>
+        </p:txBody>
+      </p:sp>
+    </p:spTree>
+    <p:extLst>
+      <p:ext uri="{BB962C8B-B14F-4D97-AF65-F5344CB8AC3E}">
+        <p14:creationId xmlns:p14="http://schemas.microsoft.com/office/powerpoint/2010/main" val="2780002173"/>
+      </p:ext>
+    </p:extLst>
+  </p:cSld>
+  <p:clrMapOvr>
+    <a:masterClrMapping/>
+  </p:clrMapOvr>
+</p:notes>
+</file>
+
+<file path=ppt/notesSlides/notesSlide21.xml><?xml version="1.0" encoding="utf-8"?>
+<p:notes xmlns:a="http://schemas.openxmlformats.org/drawingml/2006/main" xmlns:r="http://schemas.openxmlformats.org/officeDocument/2006/relationships" xmlns:p="http://schemas.openxmlformats.org/presentationml/2006/main">
+  <p:cSld>
+    <p:spTree>
+      <p:nvGrpSpPr>
+        <p:cNvPr id="1" name=""/>
+        <p:cNvGrpSpPr/>
+        <p:nvPr/>
+      </p:nvGrpSpPr>
+      <p:grpSpPr>
+        <a:xfrm>
+          <a:off x="0" y="0"/>
+          <a:ext cx="0" cy="0"/>
+          <a:chOff x="0" y="0"/>
+          <a:chExt cx="0" cy="0"/>
+        </a:xfrm>
+      </p:grpSpPr>
+      <p:sp>
+        <p:nvSpPr>
+          <p:cNvPr id="2" name="Slide Image Placeholder 1"/>
+          <p:cNvSpPr>
+            <a:spLocks noGrp="1" noRot="1" noChangeAspect="1"/>
+          </p:cNvSpPr>
+          <p:nvPr>
+            <p:ph type="sldImg"/>
+          </p:nvPr>
+        </p:nvSpPr>
+        <p:spPr/>
+      </p:sp>
+      <p:sp>
+        <p:nvSpPr>
+          <p:cNvPr id="3" name="Notes Placeholder 2"/>
+          <p:cNvSpPr>
+            <a:spLocks noGrp="1"/>
+          </p:cNvSpPr>
+          <p:nvPr>
+            <p:ph type="body" idx="1"/>
+          </p:nvPr>
+        </p:nvSpPr>
+        <p:spPr/>
+        <p:txBody>
+          <a:bodyPr/>
+          <a:lstStyle/>
+          <a:p>
+            <a:endParaRPr lang="en-US"/>
+          </a:p>
+        </p:txBody>
+      </p:sp>
+      <p:sp>
+        <p:nvSpPr>
+          <p:cNvPr id="4" name="Slide Number Placeholder 3"/>
+          <p:cNvSpPr>
+            <a:spLocks noGrp="1"/>
+          </p:cNvSpPr>
+          <p:nvPr>
+            <p:ph type="sldNum" sz="quarter" idx="5"/>
+          </p:nvPr>
+        </p:nvSpPr>
+        <p:spPr/>
+        <p:txBody>
+          <a:bodyPr/>
+          <a:lstStyle/>
+          <a:p>
+            <a:fld id="{2744C287-4C1B-E44A-A5AD-508A7D1413E1}" type="slidenum">
+              <a:rPr lang="en-US" smtClean="0"/>
+              <a:t>27</a:t>
+            </a:fld>
+            <a:endParaRPr lang="en-US"/>
+          </a:p>
+        </p:txBody>
+      </p:sp>
+    </p:spTree>
+    <p:extLst>
+      <p:ext uri="{BB962C8B-B14F-4D97-AF65-F5344CB8AC3E}">
+        <p14:creationId xmlns:p14="http://schemas.microsoft.com/office/powerpoint/2010/main" val="533247099"/>
+      </p:ext>
+    </p:extLst>
+  </p:cSld>
+  <p:clrMapOvr>
+    <a:masterClrMapping/>
+  </p:clrMapOvr>
+</p:notes>
+</file>
+
+<file path=ppt/notesSlides/notesSlide22.xml><?xml version="1.0" encoding="utf-8"?>
+<p:notes xmlns:a="http://schemas.openxmlformats.org/drawingml/2006/main" xmlns:r="http://schemas.openxmlformats.org/officeDocument/2006/relationships" xmlns:p="http://schemas.openxmlformats.org/presentationml/2006/main">
+  <p:cSld>
+    <p:spTree>
+      <p:nvGrpSpPr>
+        <p:cNvPr id="1" name=""/>
+        <p:cNvGrpSpPr/>
+        <p:nvPr/>
+      </p:nvGrpSpPr>
+      <p:grpSpPr>
+        <a:xfrm>
+          <a:off x="0" y="0"/>
+          <a:ext cx="0" cy="0"/>
+          <a:chOff x="0" y="0"/>
+          <a:chExt cx="0" cy="0"/>
+        </a:xfrm>
+      </p:grpSpPr>
+      <p:sp>
+        <p:nvSpPr>
+          <p:cNvPr id="2" name="Slide Image Placeholder 1"/>
+          <p:cNvSpPr>
+            <a:spLocks noGrp="1" noRot="1" noChangeAspect="1"/>
+          </p:cNvSpPr>
+          <p:nvPr>
+            <p:ph type="sldImg"/>
+          </p:nvPr>
+        </p:nvSpPr>
+        <p:spPr/>
+      </p:sp>
+      <p:sp>
+        <p:nvSpPr>
+          <p:cNvPr id="3" name="Notes Placeholder 2"/>
+          <p:cNvSpPr>
+            <a:spLocks noGrp="1"/>
+          </p:cNvSpPr>
+          <p:nvPr>
+            <p:ph type="body" idx="1"/>
+          </p:nvPr>
+        </p:nvSpPr>
+        <p:spPr/>
+        <p:txBody>
+          <a:bodyPr/>
+          <a:lstStyle/>
+          <a:p>
+            <a:endParaRPr lang="en-US" dirty="0"/>
+          </a:p>
+        </p:txBody>
+      </p:sp>
+      <p:sp>
+        <p:nvSpPr>
+          <p:cNvPr id="4" name="Slide Number Placeholder 3"/>
+          <p:cNvSpPr>
+            <a:spLocks noGrp="1"/>
+          </p:cNvSpPr>
+          <p:nvPr>
+            <p:ph type="sldNum" sz="quarter" idx="5"/>
+          </p:nvPr>
+        </p:nvSpPr>
+        <p:spPr/>
+        <p:txBody>
+          <a:bodyPr/>
+          <a:lstStyle/>
+          <a:p>
+            <a:fld id="{2744C287-4C1B-E44A-A5AD-508A7D1413E1}" type="slidenum">
+              <a:rPr lang="en-US" smtClean="0"/>
+              <a:t>28</a:t>
+            </a:fld>
+            <a:endParaRPr lang="en-US"/>
+          </a:p>
+        </p:txBody>
+      </p:sp>
+    </p:spTree>
+    <p:extLst>
+      <p:ext uri="{BB962C8B-B14F-4D97-AF65-F5344CB8AC3E}">
+        <p14:creationId xmlns:p14="http://schemas.microsoft.com/office/powerpoint/2010/main" val="1557858821"/>
+      </p:ext>
+    </p:extLst>
+  </p:cSld>
+  <p:clrMapOvr>
+    <a:masterClrMapping/>
+  </p:clrMapOvr>
+</p:notes>
+</file>
+
+<file path=ppt/notesSlides/notesSlide23.xml><?xml version="1.0" encoding="utf-8"?>
+<p:notes xmlns:a="http://schemas.openxmlformats.org/drawingml/2006/main" xmlns:r="http://schemas.openxmlformats.org/officeDocument/2006/relationships" xmlns:p="http://schemas.openxmlformats.org/presentationml/2006/main">
+  <p:cSld>
+    <p:spTree>
+      <p:nvGrpSpPr>
+        <p:cNvPr id="1" name=""/>
+        <p:cNvGrpSpPr/>
+        <p:nvPr/>
+      </p:nvGrpSpPr>
+      <p:grpSpPr>
+        <a:xfrm>
+          <a:off x="0" y="0"/>
+          <a:ext cx="0" cy="0"/>
+          <a:chOff x="0" y="0"/>
+          <a:chExt cx="0" cy="0"/>
+        </a:xfrm>
+      </p:grpSpPr>
+      <p:sp>
+        <p:nvSpPr>
+          <p:cNvPr id="2" name="Slide Image Placeholder 1"/>
+          <p:cNvSpPr>
+            <a:spLocks noGrp="1" noRot="1" noChangeAspect="1"/>
+          </p:cNvSpPr>
+          <p:nvPr>
+            <p:ph type="sldImg"/>
+          </p:nvPr>
+        </p:nvSpPr>
+        <p:spPr/>
+      </p:sp>
+      <p:sp>
+        <p:nvSpPr>
+          <p:cNvPr id="3" name="Notes Placeholder 2"/>
+          <p:cNvSpPr>
+            <a:spLocks noGrp="1"/>
+          </p:cNvSpPr>
+          <p:nvPr>
+            <p:ph type="body" idx="1"/>
+          </p:nvPr>
+        </p:nvSpPr>
+        <p:spPr/>
+        <p:txBody>
+          <a:bodyPr/>
+          <a:lstStyle/>
+          <a:p>
+            <a:endParaRPr lang="en-US"/>
+          </a:p>
+        </p:txBody>
+      </p:sp>
+      <p:sp>
+        <p:nvSpPr>
+          <p:cNvPr id="4" name="Slide Number Placeholder 3"/>
+          <p:cNvSpPr>
+            <a:spLocks noGrp="1"/>
+          </p:cNvSpPr>
+          <p:nvPr>
+            <p:ph type="sldNum" sz="quarter" idx="5"/>
+          </p:nvPr>
+        </p:nvSpPr>
+        <p:spPr/>
+        <p:txBody>
+          <a:bodyPr/>
+          <a:lstStyle/>
+          <a:p>
+            <a:fld id="{2744C287-4C1B-E44A-A5AD-508A7D1413E1}" type="slidenum">
+              <a:rPr lang="en-US" smtClean="0"/>
+              <a:t>29</a:t>
+            </a:fld>
+            <a:endParaRPr lang="en-US"/>
+          </a:p>
+        </p:txBody>
+      </p:sp>
+    </p:spTree>
+    <p:extLst>
+      <p:ext uri="{BB962C8B-B14F-4D97-AF65-F5344CB8AC3E}">
+        <p14:creationId xmlns:p14="http://schemas.microsoft.com/office/powerpoint/2010/main" val="2681094941"/>
+      </p:ext>
+    </p:extLst>
+  </p:cSld>
+  <p:clrMapOvr>
+    <a:masterClrMapping/>
+  </p:clrMapOvr>
+</p:notes>
+</file>
+
+<file path=ppt/notesSlides/notesSlide24.xml><?xml version="1.0" encoding="utf-8"?>
+<p:notes xmlns:a="http://schemas.openxmlformats.org/drawingml/2006/main" xmlns:r="http://schemas.openxmlformats.org/officeDocument/2006/relationships" xmlns:p="http://schemas.openxmlformats.org/presentationml/2006/main">
+  <p:cSld>
+    <p:spTree>
+      <p:nvGrpSpPr>
+        <p:cNvPr id="1" name=""/>
+        <p:cNvGrpSpPr/>
+        <p:nvPr/>
+      </p:nvGrpSpPr>
+      <p:grpSpPr>
+        <a:xfrm>
+          <a:off x="0" y="0"/>
+          <a:ext cx="0" cy="0"/>
+          <a:chOff x="0" y="0"/>
+          <a:chExt cx="0" cy="0"/>
+        </a:xfrm>
+      </p:grpSpPr>
+      <p:sp>
+        <p:nvSpPr>
+          <p:cNvPr id="2" name="Slide Image Placeholder 1"/>
+          <p:cNvSpPr>
+            <a:spLocks noGrp="1" noRot="1" noChangeAspect="1"/>
+          </p:cNvSpPr>
+          <p:nvPr>
+            <p:ph type="sldImg"/>
+          </p:nvPr>
+        </p:nvSpPr>
+        <p:spPr/>
+      </p:sp>
+      <p:sp>
+        <p:nvSpPr>
+          <p:cNvPr id="3" name="Notes Placeholder 2"/>
+          <p:cNvSpPr>
+            <a:spLocks noGrp="1"/>
+          </p:cNvSpPr>
+          <p:nvPr>
+            <p:ph type="body" idx="1"/>
+          </p:nvPr>
+        </p:nvSpPr>
+        <p:spPr/>
+        <p:txBody>
+          <a:bodyPr/>
+          <a:lstStyle/>
+          <a:p>
+            <a:endParaRPr lang="en-US"/>
+          </a:p>
+        </p:txBody>
+      </p:sp>
+      <p:sp>
+        <p:nvSpPr>
+          <p:cNvPr id="4" name="Slide Number Placeholder 3"/>
+          <p:cNvSpPr>
+            <a:spLocks noGrp="1"/>
+          </p:cNvSpPr>
+          <p:nvPr>
+            <p:ph type="sldNum" sz="quarter" idx="5"/>
+          </p:nvPr>
+        </p:nvSpPr>
+        <p:spPr/>
+        <p:txBody>
+          <a:bodyPr/>
+          <a:lstStyle/>
+          <a:p>
+            <a:fld id="{2744C287-4C1B-E44A-A5AD-508A7D1413E1}" type="slidenum">
+              <a:rPr lang="en-US" smtClean="0"/>
+              <a:t>30</a:t>
+            </a:fld>
+            <a:endParaRPr lang="en-US"/>
+          </a:p>
+        </p:txBody>
+      </p:sp>
+    </p:spTree>
+    <p:extLst>
+      <p:ext uri="{BB962C8B-B14F-4D97-AF65-F5344CB8AC3E}">
+        <p14:creationId xmlns:p14="http://schemas.microsoft.com/office/powerpoint/2010/main" val="125375875"/>
+      </p:ext>
+    </p:extLst>
+  </p:cSld>
+  <p:clrMapOvr>
+    <a:masterClrMapping/>
+  </p:clrMapOvr>
+</p:notes>
+</file>
+
 <file path=ppt/notesSlides/notesSlide3.xml><?xml version="1.0" encoding="utf-8"?>
 <p:notes xmlns:a="http://schemas.openxmlformats.org/drawingml/2006/main" xmlns:r="http://schemas.openxmlformats.org/officeDocument/2006/relationships" xmlns:p="http://schemas.openxmlformats.org/presentationml/2006/main">
   <p:cSld>
@@ -1556,50 +2150,7 @@
           <a:bodyPr/>
           <a:lstStyle/>
           <a:p>
-            <a:r>
-              <a:rPr lang="en-US" dirty="0"/>
-              <a:t>Positive peer-pressure:  It encourages people to be conscientious towards others</a:t>
-            </a:r>
-          </a:p>
-          <a:p>
-            <a:endParaRPr lang="en-US" dirty="0"/>
-          </a:p>
-          <a:p>
-            <a:r>
-              <a:rPr lang="en-US" dirty="0"/>
-              <a:t>Knowledge-transfer:  If more people know how the code works, it’s less critical if someone is unavailable to make an emergency fix</a:t>
-            </a:r>
-          </a:p>
-          <a:p>
-            <a:r>
-              <a:rPr lang="en-US" dirty="0"/>
-              <a:t>Knowledge-transfer:  Planning and estimation tasks are also improved, because more developers can discuss a task before making a time estimate</a:t>
-            </a:r>
-          </a:p>
-          <a:p>
-            <a:endParaRPr lang="en-US" dirty="0"/>
-          </a:p>
-          <a:p>
-            <a:r>
-              <a:rPr lang="en-US" dirty="0"/>
-              <a:t>Healthy team dynamics:  “Community responsibility” = “</a:t>
-            </a:r>
-            <a:r>
-              <a:rPr lang="en-US" u="sng" dirty="0"/>
-              <a:t>all of us</a:t>
-            </a:r>
-            <a:r>
-              <a:rPr lang="en-US" dirty="0"/>
-              <a:t> are responsible for </a:t>
-            </a:r>
-            <a:r>
-              <a:rPr lang="en-US" u="sng" dirty="0"/>
-              <a:t>all of the code</a:t>
-            </a:r>
-            <a:r>
-              <a:rPr lang="en-US" dirty="0"/>
-              <a:t>”</a:t>
-            </a:r>
+            <a:endParaRPr lang="en-US"/>
           </a:p>
         </p:txBody>
       </p:sp>
@@ -1620,7 +2171,7 @@
           <a:p>
             <a:fld id="{2744C287-4C1B-E44A-A5AD-508A7D1413E1}" type="slidenum">
               <a:rPr lang="en-US" smtClean="0"/>
-              <a:t>4</a:t>
+              <a:t>3</a:t>
             </a:fld>
             <a:endParaRPr lang="en-US"/>
           </a:p>
@@ -1629,7 +2180,7 @@
     </p:spTree>
     <p:extLst>
       <p:ext uri="{BB962C8B-B14F-4D97-AF65-F5344CB8AC3E}">
-        <p14:creationId xmlns:p14="http://schemas.microsoft.com/office/powerpoint/2010/main" val="3024724066"/>
+        <p14:creationId xmlns:p14="http://schemas.microsoft.com/office/powerpoint/2010/main" val="3539305498"/>
       </p:ext>
     </p:extLst>
   </p:cSld>
@@ -1685,7 +2236,47 @@
           <a:p>
             <a:r>
               <a:rPr lang="en-US" dirty="0"/>
-              <a:t>This definition is from Google, and is succinct and to the point!</a:t>
+              <a:t>Positive peer-pressure:  It encourages people to be conscientious towards others</a:t>
+            </a:r>
+          </a:p>
+          <a:p>
+            <a:endParaRPr lang="en-US" dirty="0"/>
+          </a:p>
+          <a:p>
+            <a:r>
+              <a:rPr lang="en-US" dirty="0"/>
+              <a:t>Knowledge-transfer:  If more people know how the code works, it’s less critical if someone is unavailable to make an emergency fix</a:t>
+            </a:r>
+          </a:p>
+          <a:p>
+            <a:r>
+              <a:rPr lang="en-US" dirty="0"/>
+              <a:t>Knowledge-transfer:  Planning and estimation tasks are also improved, because more developers can discuss a task before making a time estimate</a:t>
+            </a:r>
+          </a:p>
+          <a:p>
+            <a:endParaRPr lang="en-US" dirty="0"/>
+          </a:p>
+          <a:p>
+            <a:r>
+              <a:rPr lang="en-US" dirty="0"/>
+              <a:t>Healthy team dynamics:  “Community responsibility” = “</a:t>
+            </a:r>
+            <a:r>
+              <a:rPr lang="en-US" u="sng" dirty="0"/>
+              <a:t>all of us</a:t>
+            </a:r>
+            <a:r>
+              <a:rPr lang="en-US" dirty="0"/>
+              <a:t> are responsible for </a:t>
+            </a:r>
+            <a:r>
+              <a:rPr lang="en-US" u="sng" dirty="0"/>
+              <a:t>all of the code</a:t>
+            </a:r>
+            <a:r>
+              <a:rPr lang="en-US" dirty="0"/>
+              <a:t>”</a:t>
             </a:r>
           </a:p>
         </p:txBody>
@@ -1707,7 +2298,7 @@
           <a:p>
             <a:fld id="{2744C287-4C1B-E44A-A5AD-508A7D1413E1}" type="slidenum">
               <a:rPr lang="en-US" smtClean="0"/>
-              <a:t>5</a:t>
+              <a:t>4</a:t>
             </a:fld>
             <a:endParaRPr lang="en-US"/>
           </a:p>
@@ -1716,7 +2307,7 @@
     </p:spTree>
     <p:extLst>
       <p:ext uri="{BB962C8B-B14F-4D97-AF65-F5344CB8AC3E}">
-        <p14:creationId xmlns:p14="http://schemas.microsoft.com/office/powerpoint/2010/main" val="378348141"/>
+        <p14:creationId xmlns:p14="http://schemas.microsoft.com/office/powerpoint/2010/main" val="3024724066"/>
       </p:ext>
     </p:extLst>
   </p:cSld>
@@ -1772,16 +2363,7 @@
           <a:p>
             <a:r>
               <a:rPr lang="en-US" dirty="0"/>
-              <a:t>If you want to get your programming assignments done faster, incorporate some kind of collaborative construction!  (where you are allowed to)</a:t>
-            </a:r>
-          </a:p>
-          <a:p>
-            <a:endParaRPr lang="en-US" dirty="0"/>
-          </a:p>
-          <a:p>
-            <a:r>
-              <a:rPr lang="en-US" dirty="0"/>
-              <a:t>What makes your projects slow to complete?</a:t>
+              <a:t>This definition is from Google, and is succinct and to the point!</a:t>
             </a:r>
           </a:p>
         </p:txBody>
@@ -1803,7 +2385,7 @@
           <a:p>
             <a:fld id="{2744C287-4C1B-E44A-A5AD-508A7D1413E1}" type="slidenum">
               <a:rPr lang="en-US" smtClean="0"/>
-              <a:t>6</a:t>
+              <a:t>5</a:t>
             </a:fld>
             <a:endParaRPr lang="en-US"/>
           </a:p>
@@ -1812,7 +2394,7 @@
     </p:spTree>
     <p:extLst>
       <p:ext uri="{BB962C8B-B14F-4D97-AF65-F5344CB8AC3E}">
-        <p14:creationId xmlns:p14="http://schemas.microsoft.com/office/powerpoint/2010/main" val="4049111081"/>
+        <p14:creationId xmlns:p14="http://schemas.microsoft.com/office/powerpoint/2010/main" val="378348141"/>
       </p:ext>
     </p:extLst>
   </p:cSld>
@@ -1868,37 +2450,17 @@
           <a:p>
             <a:r>
               <a:rPr lang="en-US" dirty="0"/>
-              <a:t>According to the research, these less-formalized processes </a:t>
-            </a:r>
-            <a:r>
-              <a:rPr lang="en-US" b="1" i="1" u="none" dirty="0"/>
-              <a:t>are capable of</a:t>
-            </a:r>
-            <a:r>
-              <a:rPr lang="en-US" dirty="0"/>
-              <a:t> achieving up to the same results as formal inspections.</a:t>
-            </a:r>
-          </a:p>
-          <a:p>
-            <a:r>
-              <a:rPr lang="en-US" dirty="0"/>
-              <a:t>However, they can easily fall far short if used carelessly, and as such, </a:t>
-            </a:r>
-            <a:r>
-              <a:rPr lang="en-US" b="1" i="1" u="none" dirty="0"/>
-              <a:t>can easily become more of a burden than a benefit.</a:t>
-            </a:r>
-            <a:endParaRPr lang="en-US" b="0" i="0" u="none" dirty="0"/>
-          </a:p>
-          <a:p>
-            <a:endParaRPr lang="en-US" b="0" i="0" u="none" dirty="0"/>
-          </a:p>
-          <a:p>
-            <a:r>
-              <a:rPr lang="en-US" b="0" i="0" u="none" dirty="0"/>
-              <a:t>Google’s code-review documentation talks about finding “GOOD code-reviewers.”  This is a skill and discipline to develop, just like anything.</a:t>
-            </a:r>
-            <a:endParaRPr lang="en-US" b="1" i="1" u="none" dirty="0"/>
+              <a:t>If you want to get your programming assignments done faster, incorporate some kind of collaborative construction!  (where you are allowed to)</a:t>
+            </a:r>
+          </a:p>
+          <a:p>
+            <a:endParaRPr lang="en-US" dirty="0"/>
+          </a:p>
+          <a:p>
+            <a:r>
+              <a:rPr lang="en-US" dirty="0"/>
+              <a:t>What makes your projects slow to complete?</a:t>
+            </a:r>
           </a:p>
         </p:txBody>
       </p:sp>
@@ -1919,7 +2481,7 @@
           <a:p>
             <a:fld id="{2744C287-4C1B-E44A-A5AD-508A7D1413E1}" type="slidenum">
               <a:rPr lang="en-US" smtClean="0"/>
-              <a:t>7</a:t>
+              <a:t>6</a:t>
             </a:fld>
             <a:endParaRPr lang="en-US"/>
           </a:p>
@@ -1928,7 +2490,7 @@
     </p:spTree>
     <p:extLst>
       <p:ext uri="{BB962C8B-B14F-4D97-AF65-F5344CB8AC3E}">
-        <p14:creationId xmlns:p14="http://schemas.microsoft.com/office/powerpoint/2010/main" val="2938711545"/>
+        <p14:creationId xmlns:p14="http://schemas.microsoft.com/office/powerpoint/2010/main" val="4049111081"/>
       </p:ext>
     </p:extLst>
   </p:cSld>
@@ -1984,17 +2546,37 @@
           <a:p>
             <a:r>
               <a:rPr lang="en-US" dirty="0"/>
-              <a:t>Large-scale code inspections are often larger than these guidelines, but are more structured to support the reviewers anyway.</a:t>
-            </a:r>
-          </a:p>
-          <a:p>
-            <a:endParaRPr lang="en-US" dirty="0"/>
-          </a:p>
-          <a:p>
-            <a:r>
-              <a:rPr lang="en-US" dirty="0"/>
-              <a:t>Code read-throughs may also include a larger amount of code to read, but then the reviewer can take breaks as needed.</a:t>
-            </a:r>
+              <a:t>According to the research, these less-formalized processes </a:t>
+            </a:r>
+            <a:r>
+              <a:rPr lang="en-US" b="1" i="1" u="none" dirty="0"/>
+              <a:t>are capable of</a:t>
+            </a:r>
+            <a:r>
+              <a:rPr lang="en-US" dirty="0"/>
+              <a:t> achieving up to the same results as formal inspections.</a:t>
+            </a:r>
+          </a:p>
+          <a:p>
+            <a:r>
+              <a:rPr lang="en-US" dirty="0"/>
+              <a:t>However, they can easily fall far short if used carelessly, and as such, </a:t>
+            </a:r>
+            <a:r>
+              <a:rPr lang="en-US" b="1" i="1" u="none" dirty="0"/>
+              <a:t>can easily become more of a burden than a benefit.</a:t>
+            </a:r>
+            <a:endParaRPr lang="en-US" b="0" i="0" u="none" dirty="0"/>
+          </a:p>
+          <a:p>
+            <a:endParaRPr lang="en-US" b="0" i="0" u="none" dirty="0"/>
+          </a:p>
+          <a:p>
+            <a:r>
+              <a:rPr lang="en-US" b="0" i="0" u="none" dirty="0"/>
+              <a:t>Google’s code-review documentation talks about finding “GOOD code-reviewers.”  This is a skill and discipline to develop, just like anything.</a:t>
+            </a:r>
+            <a:endParaRPr lang="en-US" b="1" i="1" u="none" dirty="0"/>
           </a:p>
         </p:txBody>
       </p:sp>
@@ -2015,7 +2597,7 @@
           <a:p>
             <a:fld id="{2744C287-4C1B-E44A-A5AD-508A7D1413E1}" type="slidenum">
               <a:rPr lang="en-US" smtClean="0"/>
-              <a:t>8</a:t>
+              <a:t>7</a:t>
             </a:fld>
             <a:endParaRPr lang="en-US"/>
           </a:p>
@@ -2024,7 +2606,7 @@
     </p:spTree>
     <p:extLst>
       <p:ext uri="{BB962C8B-B14F-4D97-AF65-F5344CB8AC3E}">
-        <p14:creationId xmlns:p14="http://schemas.microsoft.com/office/powerpoint/2010/main" val="966696754"/>
+        <p14:creationId xmlns:p14="http://schemas.microsoft.com/office/powerpoint/2010/main" val="2938711545"/>
       </p:ext>
     </p:extLst>
   </p:cSld>
@@ -2078,30 +2660,19 @@
           <a:bodyPr/>
           <a:lstStyle/>
           <a:p>
-            <a:pPr marL="0" marR="0" lvl="0" indent="0" algn="l" defTabSz="914400" rtl="0" eaLnBrk="1" fontAlgn="auto" latinLnBrk="0" hangingPunct="1">
-              <a:lnSpc>
-                <a:spcPct val="100000"/>
-              </a:lnSpc>
-              <a:spcBef>
-                <a:spcPts val="0"/>
-              </a:spcBef>
-              <a:spcAft>
-                <a:spcPts val="0"/>
-              </a:spcAft>
-              <a:buClrTx/>
-              <a:buSzTx/>
-              <a:buFontTx/>
-              <a:buNone/>
-              <a:tabLst/>
-              <a:defRPr/>
-            </a:pPr>
-            <a:r>
-              <a:rPr lang="en-US" dirty="0"/>
-              <a:t>“sheets” example:  “Here’s a link to the SCC graph algorithm I used; can you tell me if you think I implemented it correctly.”</a:t>
+            <a:r>
+              <a:rPr lang="en-US" dirty="0"/>
+              <a:t>Large-scale code inspections are often larger than these guidelines, but are more structured to support the reviewers anyway.</a:t>
             </a:r>
           </a:p>
           <a:p>
             <a:endParaRPr lang="en-US" dirty="0"/>
+          </a:p>
+          <a:p>
+            <a:r>
+              <a:rPr lang="en-US" dirty="0"/>
+              <a:t>Code read-throughs may also include a larger amount of code to read, but then the reviewer can take breaks as needed.</a:t>
+            </a:r>
           </a:p>
         </p:txBody>
       </p:sp>
@@ -2122,7 +2693,7 @@
           <a:p>
             <a:fld id="{2744C287-4C1B-E44A-A5AD-508A7D1413E1}" type="slidenum">
               <a:rPr lang="en-US" smtClean="0"/>
-              <a:t>9</a:t>
+              <a:t>8</a:t>
             </a:fld>
             <a:endParaRPr lang="en-US"/>
           </a:p>
@@ -2131,7 +2702,7 @@
     </p:spTree>
     <p:extLst>
       <p:ext uri="{BB962C8B-B14F-4D97-AF65-F5344CB8AC3E}">
-        <p14:creationId xmlns:p14="http://schemas.microsoft.com/office/powerpoint/2010/main" val="3180398966"/>
+        <p14:creationId xmlns:p14="http://schemas.microsoft.com/office/powerpoint/2010/main" val="966696754"/>
       </p:ext>
     </p:extLst>
   </p:cSld>
@@ -2185,10 +2756,30 @@
           <a:bodyPr/>
           <a:lstStyle/>
           <a:p>
-            <a:r>
-              <a:rPr lang="en-US" dirty="0"/>
-              <a:t>Palantir has a similar specification, even more detailed, for reviewers to consider.</a:t>
-            </a:r>
+            <a:pPr marL="0" marR="0" lvl="0" indent="0" algn="l" defTabSz="914400" rtl="0" eaLnBrk="1" fontAlgn="auto" latinLnBrk="0" hangingPunct="1">
+              <a:lnSpc>
+                <a:spcPct val="100000"/>
+              </a:lnSpc>
+              <a:spcBef>
+                <a:spcPts val="0"/>
+              </a:spcBef>
+              <a:spcAft>
+                <a:spcPts val="0"/>
+              </a:spcAft>
+              <a:buClrTx/>
+              <a:buSzTx/>
+              <a:buFontTx/>
+              <a:buNone/>
+              <a:tabLst/>
+              <a:defRPr/>
+            </a:pPr>
+            <a:r>
+              <a:rPr lang="en-US" dirty="0"/>
+              <a:t>“sheets” example:  “Here’s a link to the SCC graph algorithm I used; can you tell me if you think I implemented it correctly.”</a:t>
+            </a:r>
+          </a:p>
+          <a:p>
+            <a:endParaRPr lang="en-US" dirty="0"/>
           </a:p>
         </p:txBody>
       </p:sp>
@@ -2209,7 +2800,7 @@
           <a:p>
             <a:fld id="{2744C287-4C1B-E44A-A5AD-508A7D1413E1}" type="slidenum">
               <a:rPr lang="en-US" smtClean="0"/>
-              <a:t>10</a:t>
+              <a:t>9</a:t>
             </a:fld>
             <a:endParaRPr lang="en-US"/>
           </a:p>
@@ -2218,7 +2809,7 @@
     </p:spTree>
     <p:extLst>
       <p:ext uri="{BB962C8B-B14F-4D97-AF65-F5344CB8AC3E}">
-        <p14:creationId xmlns:p14="http://schemas.microsoft.com/office/powerpoint/2010/main" val="4109892975"/>
+        <p14:creationId xmlns:p14="http://schemas.microsoft.com/office/powerpoint/2010/main" val="3180398966"/>
       </p:ext>
     </p:extLst>
   </p:cSld>
@@ -2375,7 +2966,7 @@
           <a:p>
             <a:fld id="{08C581B1-DAA2-9C48-ABD7-FAFF9FA89AAC}" type="datetime1">
               <a:rPr lang="en-US" smtClean="0"/>
-              <a:t>6/28/23</a:t>
+              <a:t>7/7/23</a:t>
             </a:fld>
             <a:endParaRPr lang="en-US"/>
           </a:p>
@@ -2573,7 +3164,7 @@
           <a:p>
             <a:fld id="{5C4569D4-F8BB-B24C-B4C5-11F11B806914}" type="datetime1">
               <a:rPr lang="en-US" smtClean="0"/>
-              <a:t>6/28/23</a:t>
+              <a:t>7/7/23</a:t>
             </a:fld>
             <a:endParaRPr lang="en-US"/>
           </a:p>
@@ -2781,7 +3372,7 @@
           <a:p>
             <a:fld id="{6AF1A67B-19C6-1047-A8FA-1C51D015C9A7}" type="datetime1">
               <a:rPr lang="en-US" smtClean="0"/>
-              <a:t>6/28/23</a:t>
+              <a:t>7/7/23</a:t>
             </a:fld>
             <a:endParaRPr lang="en-US"/>
           </a:p>
@@ -2979,7 +3570,7 @@
           <a:p>
             <a:fld id="{AC3C37EA-9CD2-5540-9C35-9542270D84DB}" type="datetime1">
               <a:rPr lang="en-US" smtClean="0"/>
-              <a:t>6/28/23</a:t>
+              <a:t>7/7/23</a:t>
             </a:fld>
             <a:endParaRPr lang="en-US"/>
           </a:p>
@@ -3254,7 +3845,7 @@
           <a:p>
             <a:fld id="{FC1B75E7-89CF-1E45-BF16-1E75DA4C4E16}" type="datetime1">
               <a:rPr lang="en-US" smtClean="0"/>
-              <a:t>6/28/23</a:t>
+              <a:t>7/7/23</a:t>
             </a:fld>
             <a:endParaRPr lang="en-US"/>
           </a:p>
@@ -3519,7 +4110,7 @@
           <a:p>
             <a:fld id="{F316FCF8-4319-A24E-8E69-D9D8CE7C84E8}" type="datetime1">
               <a:rPr lang="en-US" smtClean="0"/>
-              <a:t>6/28/23</a:t>
+              <a:t>7/7/23</a:t>
             </a:fld>
             <a:endParaRPr lang="en-US"/>
           </a:p>
@@ -3931,7 +4522,7 @@
           <a:p>
             <a:fld id="{3B768517-59A8-D141-A1F7-9FD956299CC2}" type="datetime1">
               <a:rPr lang="en-US" smtClean="0"/>
-              <a:t>6/28/23</a:t>
+              <a:t>7/7/23</a:t>
             </a:fld>
             <a:endParaRPr lang="en-US"/>
           </a:p>
@@ -4072,7 +4663,7 @@
           <a:p>
             <a:fld id="{D5026A61-9113-EA47-BA38-9D40B31CE670}" type="datetime1">
               <a:rPr lang="en-US" smtClean="0"/>
-              <a:t>6/28/23</a:t>
+              <a:t>7/7/23</a:t>
             </a:fld>
             <a:endParaRPr lang="en-US"/>
           </a:p>
@@ -4185,7 +4776,7 @@
           <a:p>
             <a:fld id="{06155294-0F32-9347-AEA9-D636AE777EEC}" type="datetime1">
               <a:rPr lang="en-US" smtClean="0"/>
-              <a:t>6/28/23</a:t>
+              <a:t>7/7/23</a:t>
             </a:fld>
             <a:endParaRPr lang="en-US"/>
           </a:p>
@@ -4496,7 +5087,7 @@
           <a:p>
             <a:fld id="{F1632DEE-EE21-344B-B206-B4CF92AEB0C1}" type="datetime1">
               <a:rPr lang="en-US" smtClean="0"/>
-              <a:t>6/28/23</a:t>
+              <a:t>7/7/23</a:t>
             </a:fld>
             <a:endParaRPr lang="en-US"/>
           </a:p>
@@ -4784,7 +5375,7 @@
           <a:p>
             <a:fld id="{483A1F3C-033A-664D-BF85-972B07A45245}" type="datetime1">
               <a:rPr lang="en-US" smtClean="0"/>
-              <a:t>6/28/23</a:t>
+              <a:t>7/7/23</a:t>
             </a:fld>
             <a:endParaRPr lang="en-US"/>
           </a:p>
@@ -5025,7 +5616,7 @@
           <a:p>
             <a:fld id="{08E6E954-0FD8-6144-BEFF-FA15B968A577}" type="datetime1">
               <a:rPr lang="en-US" smtClean="0"/>
-              <a:t>6/28/23</a:t>
+              <a:t>7/7/23</a:t>
             </a:fld>
             <a:endParaRPr lang="en-US"/>
           </a:p>
@@ -5500,11 +6091,41 @@
           <a:p>
             <a:r>
               <a:rPr lang="en-US" dirty="0"/>
-              <a:t>David Rumph</a:t>
+              <a:t>Dave Rumph</a:t>
             </a:r>
           </a:p>
         </p:txBody>
       </p:sp>
+      <p:pic>
+        <p:nvPicPr>
+          <p:cNvPr id="5" name="Picture 4" descr="A white letter on a purple background&#10;&#10;Description automatically generated">
+            <a:extLst>
+              <a:ext uri="{FF2B5EF4-FFF2-40B4-BE49-F238E27FC236}">
+                <a16:creationId xmlns:a16="http://schemas.microsoft.com/office/drawing/2014/main" id="{1D86F0B9-71DE-4ED9-1C6F-171E03D15695}"/>
+              </a:ext>
+            </a:extLst>
+          </p:cNvPr>
+          <p:cNvPicPr>
+            <a:picLocks noChangeAspect="1"/>
+          </p:cNvPicPr>
+          <p:nvPr/>
+        </p:nvPicPr>
+        <p:blipFill>
+          <a:blip r:embed="rId3"/>
+          <a:stretch>
+            <a:fillRect/>
+          </a:stretch>
+        </p:blipFill>
+        <p:spPr>
+          <a:xfrm>
+            <a:off x="228600" y="5257800"/>
+            <a:ext cx="1422400" cy="1422400"/>
+          </a:xfrm>
+          <a:prstGeom prst="rect">
+            <a:avLst/>
+          </a:prstGeom>
+        </p:spPr>
+      </p:pic>
     </p:spTree>
     <p:extLst>
       <p:ext uri="{BB962C8B-B14F-4D97-AF65-F5344CB8AC3E}">
@@ -6406,7 +7027,7 @@
           <a:p>
             <a:r>
               <a:rPr lang="en-US" dirty="0"/>
-              <a:t>Code Review Best Practices:  Feedback (2)</a:t>
+              <a:t>Code Review Best Practices:  Feedback</a:t>
             </a:r>
           </a:p>
         </p:txBody>
@@ -7518,7 +8139,7 @@
             <a:pPr lvl="1"/>
             <a:r>
               <a:rPr lang="en-US" dirty="0">
-                <a:hlinkClick r:id="rId2"/>
+                <a:hlinkClick r:id="rId3"/>
               </a:rPr>
               <a:t>Flake8</a:t>
             </a:r>
@@ -7531,7 +8152,7 @@
             <a:pPr lvl="1"/>
             <a:r>
               <a:rPr lang="en-US" dirty="0" err="1">
-                <a:hlinkClick r:id="rId3"/>
+                <a:hlinkClick r:id="rId4"/>
               </a:rPr>
               <a:t>Pylint</a:t>
             </a:r>
@@ -7544,7 +8165,7 @@
             <a:pPr lvl="1"/>
             <a:r>
               <a:rPr lang="en-US" dirty="0">
-                <a:hlinkClick r:id="rId4"/>
+                <a:hlinkClick r:id="rId5"/>
               </a:rPr>
               <a:t>Black</a:t>
             </a:r>
@@ -7557,7 +8178,7 @@
             <a:pPr lvl="1"/>
             <a:r>
               <a:rPr lang="en-US" dirty="0">
-                <a:hlinkClick r:id="rId5"/>
+                <a:hlinkClick r:id="rId6"/>
               </a:rPr>
               <a:t>mypy</a:t>
             </a:r>
@@ -8404,7 +9025,7 @@
         <p:spPr/>
         <p:txBody>
           <a:bodyPr>
-            <a:normAutofit lnSpcReduction="10000"/>
+            <a:normAutofit fontScale="92500" lnSpcReduction="10000"/>
           </a:bodyPr>
           <a:lstStyle/>
           <a:p>
@@ -8428,6 +9049,17 @@
             <a:r>
               <a:rPr lang="en-US" dirty="0"/>
               <a:t>) is an increasingly popular technique used in software development</a:t>
+            </a:r>
+          </a:p>
+          <a:p>
+            <a:pPr lvl="1">
+              <a:lnSpc>
+                <a:spcPct val="96000"/>
+              </a:lnSpc>
+            </a:pPr>
+            <a:r>
+              <a:rPr lang="en-US" dirty="0"/>
+              <a:t>Addresses the “high cost, low payback” feeling of being a code reviewer</a:t>
             </a:r>
           </a:p>
           <a:p>
@@ -8593,33 +9225,15 @@
                                   </p:childTnLst>
                                 </p:cTn>
                               </p:par>
-                            </p:childTnLst>
-                          </p:cTn>
-                        </p:par>
-                      </p:childTnLst>
-                    </p:cTn>
-                  </p:par>
-                  <p:par>
-                    <p:cTn id="7" fill="hold">
-                      <p:stCondLst>
-                        <p:cond delay="indefinite"/>
-                      </p:stCondLst>
-                      <p:childTnLst>
-                        <p:par>
-                          <p:cTn id="8" fill="hold">
-                            <p:stCondLst>
-                              <p:cond delay="0"/>
-                            </p:stCondLst>
-                            <p:childTnLst>
                               <p:par>
-                                <p:cTn id="9" presetID="1" presetClass="entr" presetSubtype="0" fill="hold" grpId="0" nodeType="clickEffect">
+                                <p:cTn id="7" presetID="1" presetClass="entr" presetSubtype="0" fill="hold" grpId="0" nodeType="withEffect">
                                   <p:stCondLst>
                                     <p:cond delay="0"/>
                                   </p:stCondLst>
                                   <p:childTnLst>
                                     <p:set>
                                       <p:cBhvr>
-                                        <p:cTn id="10" dur="1" fill="hold">
+                                        <p:cTn id="8" dur="1" fill="hold">
                                           <p:stCondLst>
                                             <p:cond delay="0"/>
                                           </p:stCondLst>
@@ -8649,26 +9263,26 @@
                     </p:cTn>
                   </p:par>
                   <p:par>
-                    <p:cTn id="11" fill="hold">
+                    <p:cTn id="9" fill="hold">
                       <p:stCondLst>
                         <p:cond delay="indefinite"/>
                       </p:stCondLst>
                       <p:childTnLst>
                         <p:par>
-                          <p:cTn id="12" fill="hold">
+                          <p:cTn id="10" fill="hold">
                             <p:stCondLst>
                               <p:cond delay="0"/>
                             </p:stCondLst>
                             <p:childTnLst>
                               <p:par>
-                                <p:cTn id="13" presetID="1" presetClass="entr" presetSubtype="0" fill="hold" grpId="0" nodeType="clickEffect">
+                                <p:cTn id="11" presetID="1" presetClass="entr" presetSubtype="0" fill="hold" grpId="0" nodeType="clickEffect">
                                   <p:stCondLst>
                                     <p:cond delay="0"/>
                                   </p:stCondLst>
                                   <p:childTnLst>
                                     <p:set>
                                       <p:cBhvr>
-                                        <p:cTn id="14" dur="1" fill="hold">
+                                        <p:cTn id="12" dur="1" fill="hold">
                                           <p:stCondLst>
                                             <p:cond delay="0"/>
                                           </p:stCondLst>
@@ -8691,8 +9305,26 @@
                                   </p:childTnLst>
                                 </p:cTn>
                               </p:par>
+                            </p:childTnLst>
+                          </p:cTn>
+                        </p:par>
+                      </p:childTnLst>
+                    </p:cTn>
+                  </p:par>
+                  <p:par>
+                    <p:cTn id="13" fill="hold">
+                      <p:stCondLst>
+                        <p:cond delay="indefinite"/>
+                      </p:stCondLst>
+                      <p:childTnLst>
+                        <p:par>
+                          <p:cTn id="14" fill="hold">
+                            <p:stCondLst>
+                              <p:cond delay="0"/>
+                            </p:stCondLst>
+                            <p:childTnLst>
                               <p:par>
-                                <p:cTn id="15" presetID="1" presetClass="entr" presetSubtype="0" fill="hold" grpId="0" nodeType="withEffect">
+                                <p:cTn id="15" presetID="1" presetClass="entr" presetSubtype="0" fill="hold" grpId="0" nodeType="clickEffect">
                                   <p:stCondLst>
                                     <p:cond delay="0"/>
                                   </p:stCondLst>
@@ -8722,33 +9354,15 @@
                                   </p:childTnLst>
                                 </p:cTn>
                               </p:par>
-                            </p:childTnLst>
-                          </p:cTn>
-                        </p:par>
-                      </p:childTnLst>
-                    </p:cTn>
-                  </p:par>
-                  <p:par>
-                    <p:cTn id="17" fill="hold">
-                      <p:stCondLst>
-                        <p:cond delay="indefinite"/>
-                      </p:stCondLst>
-                      <p:childTnLst>
-                        <p:par>
-                          <p:cTn id="18" fill="hold">
-                            <p:stCondLst>
-                              <p:cond delay="0"/>
-                            </p:stCondLst>
-                            <p:childTnLst>
                               <p:par>
-                                <p:cTn id="19" presetID="1" presetClass="entr" presetSubtype="0" fill="hold" grpId="0" nodeType="clickEffect">
+                                <p:cTn id="17" presetID="1" presetClass="entr" presetSubtype="0" fill="hold" grpId="0" nodeType="withEffect">
                                   <p:stCondLst>
                                     <p:cond delay="0"/>
                                   </p:stCondLst>
                                   <p:childTnLst>
                                     <p:set>
                                       <p:cBhvr>
-                                        <p:cTn id="20" dur="1" fill="hold">
+                                        <p:cTn id="18" dur="1" fill="hold">
                                           <p:stCondLst>
                                             <p:cond delay="0"/>
                                           </p:stCondLst>
@@ -8778,26 +9392,26 @@
                     </p:cTn>
                   </p:par>
                   <p:par>
-                    <p:cTn id="21" fill="hold">
+                    <p:cTn id="19" fill="hold">
                       <p:stCondLst>
                         <p:cond delay="indefinite"/>
                       </p:stCondLst>
                       <p:childTnLst>
                         <p:par>
-                          <p:cTn id="22" fill="hold">
+                          <p:cTn id="20" fill="hold">
                             <p:stCondLst>
                               <p:cond delay="0"/>
                             </p:stCondLst>
                             <p:childTnLst>
                               <p:par>
-                                <p:cTn id="23" presetID="1" presetClass="entr" presetSubtype="0" fill="hold" grpId="0" nodeType="clickEffect">
+                                <p:cTn id="21" presetID="1" presetClass="entr" presetSubtype="0" fill="hold" grpId="0" nodeType="clickEffect">
                                   <p:stCondLst>
                                     <p:cond delay="0"/>
                                   </p:stCondLst>
                                   <p:childTnLst>
                                     <p:set>
                                       <p:cBhvr>
-                                        <p:cTn id="24" dur="1" fill="hold">
+                                        <p:cTn id="22" dur="1" fill="hold">
                                           <p:stCondLst>
                                             <p:cond delay="0"/>
                                           </p:stCondLst>
@@ -8806,6 +9420,55 @@
                                           <p:spTgt spid="3">
                                             <p:txEl>
                                               <p:pRg st="5" end="5"/>
+                                            </p:txEl>
+                                          </p:spTgt>
+                                        </p:tgtEl>
+                                        <p:attrNameLst>
+                                          <p:attrName>style.visibility</p:attrName>
+                                        </p:attrNameLst>
+                                      </p:cBhvr>
+                                      <p:to>
+                                        <p:strVal val="visible"/>
+                                      </p:to>
+                                    </p:set>
+                                  </p:childTnLst>
+                                </p:cTn>
+                              </p:par>
+                            </p:childTnLst>
+                          </p:cTn>
+                        </p:par>
+                      </p:childTnLst>
+                    </p:cTn>
+                  </p:par>
+                  <p:par>
+                    <p:cTn id="23" fill="hold">
+                      <p:stCondLst>
+                        <p:cond delay="indefinite"/>
+                      </p:stCondLst>
+                      <p:childTnLst>
+                        <p:par>
+                          <p:cTn id="24" fill="hold">
+                            <p:stCondLst>
+                              <p:cond delay="0"/>
+                            </p:stCondLst>
+                            <p:childTnLst>
+                              <p:par>
+                                <p:cTn id="25" presetID="1" presetClass="entr" presetSubtype="0" fill="hold" grpId="0" nodeType="clickEffect">
+                                  <p:stCondLst>
+                                    <p:cond delay="0"/>
+                                  </p:stCondLst>
+                                  <p:childTnLst>
+                                    <p:set>
+                                      <p:cBhvr>
+                                        <p:cTn id="26" dur="1" fill="hold">
+                                          <p:stCondLst>
+                                            <p:cond delay="0"/>
+                                          </p:stCondLst>
+                                        </p:cTn>
+                                        <p:tgtEl>
+                                          <p:spTgt spid="3">
+                                            <p:txEl>
+                                              <p:pRg st="6" end="6"/>
                                             </p:txEl>
                                           </p:spTgt>
                                         </p:tgtEl>
@@ -10246,7 +10909,7 @@
           <a:p>
             <a:r>
               <a:rPr lang="en-US" dirty="0"/>
-              <a:t>Pair Programming and Defects (2)</a:t>
+              <a:t>Pair Programming and Defects</a:t>
             </a:r>
           </a:p>
         </p:txBody>
@@ -12323,7 +12986,7 @@
           <a:p>
             <a:r>
               <a:rPr lang="en-US" dirty="0"/>
-              <a:t>Pair Programming and Defects (3)</a:t>
+              <a:t>Pair Programming and Defects</a:t>
             </a:r>
           </a:p>
         </p:txBody>
@@ -14216,7 +14879,7 @@
           <a:p>
             <a:r>
               <a:rPr lang="en-US" dirty="0"/>
-              <a:t>Pair Programming – Issues (2)</a:t>
+              <a:t>Pair Programming – Issues</a:t>
             </a:r>
           </a:p>
         </p:txBody>
@@ -15477,9 +16140,6 @@
               <a:rPr lang="en-US" dirty="0"/>
               <a:t>Make sure they are enforced, through assertions, sanity-checks, etc.</a:t>
             </a:r>
-          </a:p>
-          <a:p>
-            <a:endParaRPr lang="en-US" dirty="0"/>
           </a:p>
         </p:txBody>
       </p:sp>
@@ -16011,7 +16671,7 @@
           <p:cNvPr id="2" name="Title 1">
             <a:extLst>
               <a:ext uri="{FF2B5EF4-FFF2-40B4-BE49-F238E27FC236}">
-                <a16:creationId xmlns:a16="http://schemas.microsoft.com/office/drawing/2014/main" id="{2948CF93-D13E-0D40-929B-75FAF600D1DB}"/>
+                <a16:creationId xmlns:a16="http://schemas.microsoft.com/office/drawing/2014/main" id="{CB4904E7-362A-F306-C1DD-9F922DC487E6}"/>
               </a:ext>
             </a:extLst>
           </p:cNvPr>
@@ -16029,7 +16689,7 @@
           <a:p>
             <a:r>
               <a:rPr lang="en-US" dirty="0"/>
-              <a:t>References</a:t>
+              <a:t>Pair Programming Activity — Setup</a:t>
             </a:r>
           </a:p>
         </p:txBody>
@@ -16039,7 +16699,7 @@
           <p:cNvPr id="3" name="Content Placeholder 2">
             <a:extLst>
               <a:ext uri="{FF2B5EF4-FFF2-40B4-BE49-F238E27FC236}">
-                <a16:creationId xmlns:a16="http://schemas.microsoft.com/office/drawing/2014/main" id="{A11F8C51-CDFE-4D40-A497-95B723640E0B}"/>
+                <a16:creationId xmlns:a16="http://schemas.microsoft.com/office/drawing/2014/main" id="{F3052A98-7B04-354A-AE82-1EA571ECE677}"/>
               </a:ext>
             </a:extLst>
           </p:cNvPr>
@@ -16058,63 +16718,78 @@
           <a:lstStyle/>
           <a:p>
             <a:r>
-              <a:rPr lang="en-US" dirty="0">
-                <a:hlinkClick r:id="rId2"/>
-              </a:rPr>
-              <a:t>Strengthening the Case for Pair Programming</a:t>
-            </a:r>
-            <a:r>
-              <a:rPr lang="en-US" dirty="0"/>
-              <a:t> – Laurie Williams et al</a:t>
+              <a:rPr lang="en-US" dirty="0"/>
+              <a:t>Pair up with someone</a:t>
+            </a:r>
+          </a:p>
+          <a:p>
+            <a:r>
+              <a:rPr lang="en-US" dirty="0"/>
+              <a:t>Clone the “Code-Review” repo</a:t>
             </a:r>
           </a:p>
           <a:p>
             <a:pPr lvl="1"/>
             <a:r>
               <a:rPr lang="en-US" dirty="0"/>
-              <a:t>An excellent overview and survey of the benefits of pair programming</a:t>
-            </a:r>
-          </a:p>
-          <a:p>
-            <a:r>
-              <a:rPr lang="en-US" dirty="0">
-                <a:hlinkClick r:id="rId3"/>
-              </a:rPr>
-              <a:t>The Costs and Benefits of Pair Programming</a:t>
-            </a:r>
-            <a:r>
-              <a:rPr lang="en-US" dirty="0"/>
-              <a:t> – Alistair Cockburn and Laurie Williams</a:t>
+              <a:t>What you need for this activity is in the “activity” folder</a:t>
+            </a:r>
+          </a:p>
+          <a:p>
+            <a:r>
+              <a:rPr lang="en-US" dirty="0"/>
+              <a:t>Make sure it runs on your system:</a:t>
             </a:r>
           </a:p>
           <a:p>
             <a:pPr lvl="1"/>
             <a:r>
               <a:rPr lang="en-US" dirty="0"/>
-              <a:t>Another excellent survey paper, with many interview notes from developers who adopted pair programming</a:t>
+              <a:t>Run “python3 </a:t>
+            </a:r>
+            <a:r>
+              <a:rPr lang="en-US" dirty="0" err="1"/>
+              <a:t>inklimit.py</a:t>
+            </a:r>
+            <a:r>
+              <a:rPr lang="en-US" dirty="0"/>
+              <a:t> </a:t>
+            </a:r>
+            <a:r>
+              <a:rPr lang="en-US" dirty="0" err="1"/>
+              <a:t>testimage.tiff</a:t>
+            </a:r>
+            <a:r>
+              <a:rPr lang="en-US" dirty="0"/>
+              <a:t> </a:t>
+            </a:r>
+            <a:r>
+              <a:rPr lang="en-US" dirty="0" err="1"/>
+              <a:t>outimage.tiff</a:t>
+            </a:r>
+            <a:r>
+              <a:rPr lang="en-US" dirty="0"/>
+              <a:t>”</a:t>
             </a:r>
           </a:p>
           <a:p>
             <a:pPr lvl="1"/>
-            <a:endParaRPr lang="en-US" dirty="0"/>
-          </a:p>
-          <a:p>
-            <a:r>
-              <a:rPr lang="en-US" dirty="0">
-                <a:hlinkClick r:id="rId4"/>
-              </a:rPr>
-              <a:t>The Collaborative Software Process</a:t>
-            </a:r>
-            <a:r>
-              <a:rPr lang="en-US" dirty="0"/>
-              <a:t> – doctoral dissertation by</a:t>
-            </a:r>
-            <a:br>
-              <a:rPr lang="en-US" dirty="0"/>
-            </a:br>
-            <a:r>
-              <a:rPr lang="en-US" dirty="0"/>
-              <a:t>Laurie Williams</a:t>
+            <a:r>
+              <a:rPr lang="en-US" dirty="0"/>
+              <a:t>Install any missing modules using “pip3 install &lt;module&gt;”</a:t>
+            </a:r>
+          </a:p>
+          <a:p>
+            <a:r>
+              <a:rPr lang="en-US" dirty="0"/>
+              <a:t>Make sure you can view the input and your output image files</a:t>
+            </a:r>
+          </a:p>
+          <a:p>
+            <a:pPr lvl="1"/>
+            <a:r>
+              <a:rPr lang="en-US" dirty="0"/>
+              <a:t>How to do that depends on your system</a:t>
             </a:r>
           </a:p>
         </p:txBody>
@@ -16124,7 +16799,7 @@
           <p:cNvPr id="4" name="Slide Number Placeholder 3">
             <a:extLst>
               <a:ext uri="{FF2B5EF4-FFF2-40B4-BE49-F238E27FC236}">
-                <a16:creationId xmlns:a16="http://schemas.microsoft.com/office/drawing/2014/main" id="{E3ADD4D7-F120-144F-BA49-47E84B2F89AA}"/>
+                <a16:creationId xmlns:a16="http://schemas.microsoft.com/office/drawing/2014/main" id="{89F6ABCD-29D6-42C7-482F-EF9EF8DD81DF}"/>
               </a:ext>
             </a:extLst>
           </p:cNvPr>
@@ -16151,7 +16826,1034 @@
     </p:spTree>
     <p:extLst>
       <p:ext uri="{BB962C8B-B14F-4D97-AF65-F5344CB8AC3E}">
-        <p14:creationId xmlns:p14="http://schemas.microsoft.com/office/powerpoint/2010/main" val="516487010"/>
+        <p14:creationId xmlns:p14="http://schemas.microsoft.com/office/powerpoint/2010/main" val="245358514"/>
+      </p:ext>
+    </p:extLst>
+  </p:cSld>
+  <p:clrMapOvr>
+    <a:masterClrMapping/>
+  </p:clrMapOvr>
+</p:sld>
+</file>
+
+<file path=ppt/slides/slide28.xml><?xml version="1.0" encoding="utf-8"?>
+<p:sld xmlns:a="http://schemas.openxmlformats.org/drawingml/2006/main" xmlns:r="http://schemas.openxmlformats.org/officeDocument/2006/relationships" xmlns:p="http://schemas.openxmlformats.org/presentationml/2006/main">
+  <p:cSld>
+    <p:spTree>
+      <p:nvGrpSpPr>
+        <p:cNvPr id="1" name=""/>
+        <p:cNvGrpSpPr/>
+        <p:nvPr/>
+      </p:nvGrpSpPr>
+      <p:grpSpPr>
+        <a:xfrm>
+          <a:off x="0" y="0"/>
+          <a:ext cx="0" cy="0"/>
+          <a:chOff x="0" y="0"/>
+          <a:chExt cx="0" cy="0"/>
+        </a:xfrm>
+      </p:grpSpPr>
+      <p:sp>
+        <p:nvSpPr>
+          <p:cNvPr id="2" name="Title 1">
+            <a:extLst>
+              <a:ext uri="{FF2B5EF4-FFF2-40B4-BE49-F238E27FC236}">
+                <a16:creationId xmlns:a16="http://schemas.microsoft.com/office/drawing/2014/main" id="{D72A235B-1E1C-86F1-ED33-A1857A8DCEA6}"/>
+              </a:ext>
+            </a:extLst>
+          </p:cNvPr>
+          <p:cNvSpPr>
+            <a:spLocks noGrp="1"/>
+          </p:cNvSpPr>
+          <p:nvPr>
+            <p:ph type="title"/>
+          </p:nvPr>
+        </p:nvSpPr>
+        <p:spPr/>
+        <p:txBody>
+          <a:bodyPr/>
+          <a:lstStyle/>
+          <a:p>
+            <a:pPr lvl="0"/>
+            <a:r>
+              <a:rPr lang="en-US" dirty="0"/>
+              <a:t>Pair Programming Activity — Task</a:t>
+            </a:r>
+          </a:p>
+        </p:txBody>
+      </p:sp>
+      <p:sp>
+        <p:nvSpPr>
+          <p:cNvPr id="3" name="Content Placeholder 2">
+            <a:extLst>
+              <a:ext uri="{FF2B5EF4-FFF2-40B4-BE49-F238E27FC236}">
+                <a16:creationId xmlns:a16="http://schemas.microsoft.com/office/drawing/2014/main" id="{351AFA82-4034-EF8D-62B2-7B657E71B538}"/>
+              </a:ext>
+            </a:extLst>
+          </p:cNvPr>
+          <p:cNvSpPr>
+            <a:spLocks noGrp="1"/>
+          </p:cNvSpPr>
+          <p:nvPr>
+            <p:ph sz="half" idx="1"/>
+          </p:nvPr>
+        </p:nvSpPr>
+        <p:spPr/>
+        <p:txBody>
+          <a:bodyPr>
+            <a:normAutofit fontScale="85000" lnSpcReduction="10000"/>
+          </a:bodyPr>
+          <a:lstStyle/>
+          <a:p>
+            <a:r>
+              <a:rPr lang="en-US" dirty="0"/>
+              <a:t>Look at the task description (on right)</a:t>
+            </a:r>
+          </a:p>
+          <a:p>
+            <a:r>
+              <a:rPr lang="en-US" dirty="0"/>
+              <a:t>Choose who will Drive, who will Navigate, and get to work</a:t>
+            </a:r>
+          </a:p>
+          <a:p>
+            <a:r>
+              <a:rPr lang="en-US" dirty="0"/>
+              <a:t>Communicate</a:t>
+            </a:r>
+          </a:p>
+          <a:p>
+            <a:pPr lvl="1"/>
+            <a:r>
+              <a:rPr lang="en-US" dirty="0"/>
+              <a:t>What possible approaches could you take?</a:t>
+            </a:r>
+          </a:p>
+          <a:p>
+            <a:r>
+              <a:rPr lang="en-US" dirty="0"/>
+              <a:t>This activity is about the pair programming process, not the code!</a:t>
+            </a:r>
+          </a:p>
+        </p:txBody>
+      </p:sp>
+      <p:sp>
+        <p:nvSpPr>
+          <p:cNvPr id="6" name="Content Placeholder 5">
+            <a:extLst>
+              <a:ext uri="{FF2B5EF4-FFF2-40B4-BE49-F238E27FC236}">
+                <a16:creationId xmlns:a16="http://schemas.microsoft.com/office/drawing/2014/main" id="{19C64FAB-234A-3B02-8988-3CDEF2D1344D}"/>
+              </a:ext>
+            </a:extLst>
+          </p:cNvPr>
+          <p:cNvSpPr>
+            <a:spLocks noGrp="1"/>
+          </p:cNvSpPr>
+          <p:nvPr>
+            <p:ph sz="half" idx="2"/>
+          </p:nvPr>
+        </p:nvSpPr>
+        <p:spPr/>
+        <p:txBody>
+          <a:bodyPr>
+            <a:normAutofit fontScale="85000" lnSpcReduction="10000"/>
+          </a:bodyPr>
+          <a:lstStyle/>
+          <a:p>
+            <a:pPr lvl="0"/>
+            <a:r>
+              <a:rPr lang="en-US" dirty="0"/>
+              <a:t>Complaint from users:</a:t>
+            </a:r>
+          </a:p>
+          <a:p>
+            <a:pPr lvl="1"/>
+            <a:r>
+              <a:rPr lang="en-US" dirty="0"/>
+              <a:t>The inkjet printer leaves puddles of ink in the dark areas!</a:t>
+            </a:r>
+          </a:p>
+          <a:p>
+            <a:r>
+              <a:rPr lang="en-US" dirty="0"/>
+              <a:t>Your task:</a:t>
+            </a:r>
+          </a:p>
+          <a:p>
+            <a:pPr lvl="1"/>
+            <a:r>
+              <a:rPr lang="en-US" dirty="0"/>
+              <a:t>Change the code in </a:t>
+            </a:r>
+            <a:r>
+              <a:rPr lang="en-US" dirty="0" err="1"/>
+              <a:t>inklimit.py</a:t>
+            </a:r>
+            <a:r>
+              <a:rPr lang="en-US" dirty="0"/>
+              <a:t> to limit the total ink in the C, M, Y and K planes for each pixel to a given percentage (e.g. 240%)</a:t>
+            </a:r>
+          </a:p>
+          <a:p>
+            <a:pPr lvl="1"/>
+            <a:r>
+              <a:rPr lang="en-US" dirty="0"/>
+              <a:t>Avoid changing the perceived color of the image</a:t>
+            </a:r>
+          </a:p>
+          <a:p>
+            <a:pPr lvl="1"/>
+            <a:r>
+              <a:rPr lang="en-US" dirty="0"/>
+              <a:t>To limit the time needed for this task, I have provided you with the boilerplate code to open, read and write TIFF files</a:t>
+            </a:r>
+          </a:p>
+          <a:p>
+            <a:pPr lvl="1"/>
+            <a:r>
+              <a:rPr lang="en-US" dirty="0"/>
+              <a:t>Your team needs only to implement the actual ink limiting algorithm</a:t>
+            </a:r>
+          </a:p>
+          <a:p>
+            <a:endParaRPr lang="en-US" dirty="0"/>
+          </a:p>
+        </p:txBody>
+      </p:sp>
+      <p:sp>
+        <p:nvSpPr>
+          <p:cNvPr id="5" name="Slide Number Placeholder 4">
+            <a:extLst>
+              <a:ext uri="{FF2B5EF4-FFF2-40B4-BE49-F238E27FC236}">
+                <a16:creationId xmlns:a16="http://schemas.microsoft.com/office/drawing/2014/main" id="{8E1DB5C0-2CCF-D390-D246-260DE4367378}"/>
+              </a:ext>
+            </a:extLst>
+          </p:cNvPr>
+          <p:cNvSpPr>
+            <a:spLocks noGrp="1"/>
+          </p:cNvSpPr>
+          <p:nvPr>
+            <p:ph type="sldNum" sz="quarter" idx="12"/>
+          </p:nvPr>
+        </p:nvSpPr>
+        <p:spPr/>
+        <p:txBody>
+          <a:bodyPr/>
+          <a:lstStyle/>
+          <a:p>
+            <a:fld id="{CD10D25F-A2D7-CB4D-BFF2-5E4504CA3430}" type="slidenum">
+              <a:rPr lang="en-US" smtClean="0"/>
+              <a:t>28</a:t>
+            </a:fld>
+            <a:endParaRPr lang="en-US"/>
+          </a:p>
+        </p:txBody>
+      </p:sp>
+    </p:spTree>
+    <p:extLst>
+      <p:ext uri="{BB962C8B-B14F-4D97-AF65-F5344CB8AC3E}">
+        <p14:creationId xmlns:p14="http://schemas.microsoft.com/office/powerpoint/2010/main" val="1947197564"/>
+      </p:ext>
+    </p:extLst>
+  </p:cSld>
+  <p:clrMapOvr>
+    <a:masterClrMapping/>
+  </p:clrMapOvr>
+  <p:timing>
+    <p:tnLst>
+      <p:par>
+        <p:cTn id="1" dur="indefinite" restart="never" nodeType="tmRoot">
+          <p:childTnLst>
+            <p:seq concurrent="1" nextAc="seek">
+              <p:cTn id="2" dur="indefinite" nodeType="mainSeq">
+                <p:childTnLst>
+                  <p:par>
+                    <p:cTn id="3" fill="hold">
+                      <p:stCondLst>
+                        <p:cond delay="indefinite"/>
+                      </p:stCondLst>
+                      <p:childTnLst>
+                        <p:par>
+                          <p:cTn id="4" fill="hold">
+                            <p:stCondLst>
+                              <p:cond delay="0"/>
+                            </p:stCondLst>
+                            <p:childTnLst>
+                              <p:par>
+                                <p:cTn id="5" presetID="1" presetClass="entr" presetSubtype="0" fill="hold" grpId="0" nodeType="clickEffect">
+                                  <p:stCondLst>
+                                    <p:cond delay="0"/>
+                                  </p:stCondLst>
+                                  <p:childTnLst>
+                                    <p:set>
+                                      <p:cBhvr>
+                                        <p:cTn id="6" dur="1" fill="hold">
+                                          <p:stCondLst>
+                                            <p:cond delay="0"/>
+                                          </p:stCondLst>
+                                        </p:cTn>
+                                        <p:tgtEl>
+                                          <p:spTgt spid="3">
+                                            <p:txEl>
+                                              <p:pRg st="0" end="0"/>
+                                            </p:txEl>
+                                          </p:spTgt>
+                                        </p:tgtEl>
+                                        <p:attrNameLst>
+                                          <p:attrName>style.visibility</p:attrName>
+                                        </p:attrNameLst>
+                                      </p:cBhvr>
+                                      <p:to>
+                                        <p:strVal val="visible"/>
+                                      </p:to>
+                                    </p:set>
+                                  </p:childTnLst>
+                                </p:cTn>
+                              </p:par>
+                            </p:childTnLst>
+                          </p:cTn>
+                        </p:par>
+                      </p:childTnLst>
+                    </p:cTn>
+                  </p:par>
+                  <p:par>
+                    <p:cTn id="7" fill="hold">
+                      <p:stCondLst>
+                        <p:cond delay="indefinite"/>
+                      </p:stCondLst>
+                      <p:childTnLst>
+                        <p:par>
+                          <p:cTn id="8" fill="hold">
+                            <p:stCondLst>
+                              <p:cond delay="0"/>
+                            </p:stCondLst>
+                            <p:childTnLst>
+                              <p:par>
+                                <p:cTn id="9" presetID="1" presetClass="entr" presetSubtype="0" fill="hold" grpId="0" nodeType="clickEffect">
+                                  <p:stCondLst>
+                                    <p:cond delay="0"/>
+                                  </p:stCondLst>
+                                  <p:childTnLst>
+                                    <p:set>
+                                      <p:cBhvr>
+                                        <p:cTn id="10" dur="1" fill="hold">
+                                          <p:stCondLst>
+                                            <p:cond delay="0"/>
+                                          </p:stCondLst>
+                                        </p:cTn>
+                                        <p:tgtEl>
+                                          <p:spTgt spid="3">
+                                            <p:txEl>
+                                              <p:pRg st="1" end="1"/>
+                                            </p:txEl>
+                                          </p:spTgt>
+                                        </p:tgtEl>
+                                        <p:attrNameLst>
+                                          <p:attrName>style.visibility</p:attrName>
+                                        </p:attrNameLst>
+                                      </p:cBhvr>
+                                      <p:to>
+                                        <p:strVal val="visible"/>
+                                      </p:to>
+                                    </p:set>
+                                  </p:childTnLst>
+                                </p:cTn>
+                              </p:par>
+                            </p:childTnLst>
+                          </p:cTn>
+                        </p:par>
+                      </p:childTnLst>
+                    </p:cTn>
+                  </p:par>
+                  <p:par>
+                    <p:cTn id="11" fill="hold">
+                      <p:stCondLst>
+                        <p:cond delay="indefinite"/>
+                      </p:stCondLst>
+                      <p:childTnLst>
+                        <p:par>
+                          <p:cTn id="12" fill="hold">
+                            <p:stCondLst>
+                              <p:cond delay="0"/>
+                            </p:stCondLst>
+                            <p:childTnLst>
+                              <p:par>
+                                <p:cTn id="13" presetID="1" presetClass="entr" presetSubtype="0" fill="hold" grpId="0" nodeType="clickEffect">
+                                  <p:stCondLst>
+                                    <p:cond delay="0"/>
+                                  </p:stCondLst>
+                                  <p:childTnLst>
+                                    <p:set>
+                                      <p:cBhvr>
+                                        <p:cTn id="14" dur="1" fill="hold">
+                                          <p:stCondLst>
+                                            <p:cond delay="0"/>
+                                          </p:stCondLst>
+                                        </p:cTn>
+                                        <p:tgtEl>
+                                          <p:spTgt spid="3">
+                                            <p:txEl>
+                                              <p:pRg st="2" end="2"/>
+                                            </p:txEl>
+                                          </p:spTgt>
+                                        </p:tgtEl>
+                                        <p:attrNameLst>
+                                          <p:attrName>style.visibility</p:attrName>
+                                        </p:attrNameLst>
+                                      </p:cBhvr>
+                                      <p:to>
+                                        <p:strVal val="visible"/>
+                                      </p:to>
+                                    </p:set>
+                                  </p:childTnLst>
+                                </p:cTn>
+                              </p:par>
+                              <p:par>
+                                <p:cTn id="15" presetID="1" presetClass="entr" presetSubtype="0" fill="hold" grpId="0" nodeType="withEffect">
+                                  <p:stCondLst>
+                                    <p:cond delay="0"/>
+                                  </p:stCondLst>
+                                  <p:childTnLst>
+                                    <p:set>
+                                      <p:cBhvr>
+                                        <p:cTn id="16" dur="1" fill="hold">
+                                          <p:stCondLst>
+                                            <p:cond delay="0"/>
+                                          </p:stCondLst>
+                                        </p:cTn>
+                                        <p:tgtEl>
+                                          <p:spTgt spid="3">
+                                            <p:txEl>
+                                              <p:pRg st="3" end="3"/>
+                                            </p:txEl>
+                                          </p:spTgt>
+                                        </p:tgtEl>
+                                        <p:attrNameLst>
+                                          <p:attrName>style.visibility</p:attrName>
+                                        </p:attrNameLst>
+                                      </p:cBhvr>
+                                      <p:to>
+                                        <p:strVal val="visible"/>
+                                      </p:to>
+                                    </p:set>
+                                  </p:childTnLst>
+                                </p:cTn>
+                              </p:par>
+                            </p:childTnLst>
+                          </p:cTn>
+                        </p:par>
+                      </p:childTnLst>
+                    </p:cTn>
+                  </p:par>
+                  <p:par>
+                    <p:cTn id="17" fill="hold">
+                      <p:stCondLst>
+                        <p:cond delay="indefinite"/>
+                      </p:stCondLst>
+                      <p:childTnLst>
+                        <p:par>
+                          <p:cTn id="18" fill="hold">
+                            <p:stCondLst>
+                              <p:cond delay="0"/>
+                            </p:stCondLst>
+                            <p:childTnLst>
+                              <p:par>
+                                <p:cTn id="19" presetID="1" presetClass="entr" presetSubtype="0" fill="hold" grpId="0" nodeType="clickEffect">
+                                  <p:stCondLst>
+                                    <p:cond delay="0"/>
+                                  </p:stCondLst>
+                                  <p:childTnLst>
+                                    <p:set>
+                                      <p:cBhvr>
+                                        <p:cTn id="20" dur="1" fill="hold">
+                                          <p:stCondLst>
+                                            <p:cond delay="0"/>
+                                          </p:stCondLst>
+                                        </p:cTn>
+                                        <p:tgtEl>
+                                          <p:spTgt spid="3">
+                                            <p:txEl>
+                                              <p:pRg st="4" end="4"/>
+                                            </p:txEl>
+                                          </p:spTgt>
+                                        </p:tgtEl>
+                                        <p:attrNameLst>
+                                          <p:attrName>style.visibility</p:attrName>
+                                        </p:attrNameLst>
+                                      </p:cBhvr>
+                                      <p:to>
+                                        <p:strVal val="visible"/>
+                                      </p:to>
+                                    </p:set>
+                                  </p:childTnLst>
+                                </p:cTn>
+                              </p:par>
+                            </p:childTnLst>
+                          </p:cTn>
+                        </p:par>
+                      </p:childTnLst>
+                    </p:cTn>
+                  </p:par>
+                  <p:par>
+                    <p:cTn id="21" fill="hold">
+                      <p:stCondLst>
+                        <p:cond delay="indefinite"/>
+                      </p:stCondLst>
+                      <p:childTnLst>
+                        <p:par>
+                          <p:cTn id="22" fill="hold">
+                            <p:stCondLst>
+                              <p:cond delay="0"/>
+                            </p:stCondLst>
+                            <p:childTnLst>
+                              <p:par>
+                                <p:cTn id="23" presetID="1" presetClass="entr" presetSubtype="0" fill="hold" grpId="0" nodeType="clickEffect">
+                                  <p:stCondLst>
+                                    <p:cond delay="0"/>
+                                  </p:stCondLst>
+                                  <p:childTnLst>
+                                    <p:set>
+                                      <p:cBhvr>
+                                        <p:cTn id="24" dur="1" fill="hold">
+                                          <p:stCondLst>
+                                            <p:cond delay="0"/>
+                                          </p:stCondLst>
+                                        </p:cTn>
+                                        <p:tgtEl>
+                                          <p:spTgt spid="6">
+                                            <p:txEl>
+                                              <p:pRg st="0" end="0"/>
+                                            </p:txEl>
+                                          </p:spTgt>
+                                        </p:tgtEl>
+                                        <p:attrNameLst>
+                                          <p:attrName>style.visibility</p:attrName>
+                                        </p:attrNameLst>
+                                      </p:cBhvr>
+                                      <p:to>
+                                        <p:strVal val="visible"/>
+                                      </p:to>
+                                    </p:set>
+                                  </p:childTnLst>
+                                </p:cTn>
+                              </p:par>
+                            </p:childTnLst>
+                          </p:cTn>
+                        </p:par>
+                      </p:childTnLst>
+                    </p:cTn>
+                  </p:par>
+                  <p:par>
+                    <p:cTn id="25" fill="hold">
+                      <p:stCondLst>
+                        <p:cond delay="indefinite"/>
+                      </p:stCondLst>
+                      <p:childTnLst>
+                        <p:par>
+                          <p:cTn id="26" fill="hold">
+                            <p:stCondLst>
+                              <p:cond delay="0"/>
+                            </p:stCondLst>
+                            <p:childTnLst>
+                              <p:par>
+                                <p:cTn id="27" presetID="1" presetClass="entr" presetSubtype="0" fill="hold" grpId="0" nodeType="clickEffect">
+                                  <p:stCondLst>
+                                    <p:cond delay="0"/>
+                                  </p:stCondLst>
+                                  <p:childTnLst>
+                                    <p:set>
+                                      <p:cBhvr>
+                                        <p:cTn id="28" dur="1" fill="hold">
+                                          <p:stCondLst>
+                                            <p:cond delay="0"/>
+                                          </p:stCondLst>
+                                        </p:cTn>
+                                        <p:tgtEl>
+                                          <p:spTgt spid="6">
+                                            <p:txEl>
+                                              <p:pRg st="1" end="1"/>
+                                            </p:txEl>
+                                          </p:spTgt>
+                                        </p:tgtEl>
+                                        <p:attrNameLst>
+                                          <p:attrName>style.visibility</p:attrName>
+                                        </p:attrNameLst>
+                                      </p:cBhvr>
+                                      <p:to>
+                                        <p:strVal val="visible"/>
+                                      </p:to>
+                                    </p:set>
+                                  </p:childTnLst>
+                                </p:cTn>
+                              </p:par>
+                            </p:childTnLst>
+                          </p:cTn>
+                        </p:par>
+                      </p:childTnLst>
+                    </p:cTn>
+                  </p:par>
+                  <p:par>
+                    <p:cTn id="29" fill="hold">
+                      <p:stCondLst>
+                        <p:cond delay="indefinite"/>
+                      </p:stCondLst>
+                      <p:childTnLst>
+                        <p:par>
+                          <p:cTn id="30" fill="hold">
+                            <p:stCondLst>
+                              <p:cond delay="0"/>
+                            </p:stCondLst>
+                            <p:childTnLst>
+                              <p:par>
+                                <p:cTn id="31" presetID="1" presetClass="entr" presetSubtype="0" fill="hold" grpId="0" nodeType="clickEffect">
+                                  <p:stCondLst>
+                                    <p:cond delay="0"/>
+                                  </p:stCondLst>
+                                  <p:childTnLst>
+                                    <p:set>
+                                      <p:cBhvr>
+                                        <p:cTn id="32" dur="1" fill="hold">
+                                          <p:stCondLst>
+                                            <p:cond delay="0"/>
+                                          </p:stCondLst>
+                                        </p:cTn>
+                                        <p:tgtEl>
+                                          <p:spTgt spid="6">
+                                            <p:txEl>
+                                              <p:pRg st="2" end="2"/>
+                                            </p:txEl>
+                                          </p:spTgt>
+                                        </p:tgtEl>
+                                        <p:attrNameLst>
+                                          <p:attrName>style.visibility</p:attrName>
+                                        </p:attrNameLst>
+                                      </p:cBhvr>
+                                      <p:to>
+                                        <p:strVal val="visible"/>
+                                      </p:to>
+                                    </p:set>
+                                  </p:childTnLst>
+                                </p:cTn>
+                              </p:par>
+                            </p:childTnLst>
+                          </p:cTn>
+                        </p:par>
+                      </p:childTnLst>
+                    </p:cTn>
+                  </p:par>
+                  <p:par>
+                    <p:cTn id="33" fill="hold">
+                      <p:stCondLst>
+                        <p:cond delay="indefinite"/>
+                      </p:stCondLst>
+                      <p:childTnLst>
+                        <p:par>
+                          <p:cTn id="34" fill="hold">
+                            <p:stCondLst>
+                              <p:cond delay="0"/>
+                            </p:stCondLst>
+                            <p:childTnLst>
+                              <p:par>
+                                <p:cTn id="35" presetID="1" presetClass="entr" presetSubtype="0" fill="hold" grpId="0" nodeType="clickEffect">
+                                  <p:stCondLst>
+                                    <p:cond delay="0"/>
+                                  </p:stCondLst>
+                                  <p:childTnLst>
+                                    <p:set>
+                                      <p:cBhvr>
+                                        <p:cTn id="36" dur="1" fill="hold">
+                                          <p:stCondLst>
+                                            <p:cond delay="0"/>
+                                          </p:stCondLst>
+                                        </p:cTn>
+                                        <p:tgtEl>
+                                          <p:spTgt spid="6">
+                                            <p:txEl>
+                                              <p:pRg st="3" end="3"/>
+                                            </p:txEl>
+                                          </p:spTgt>
+                                        </p:tgtEl>
+                                        <p:attrNameLst>
+                                          <p:attrName>style.visibility</p:attrName>
+                                        </p:attrNameLst>
+                                      </p:cBhvr>
+                                      <p:to>
+                                        <p:strVal val="visible"/>
+                                      </p:to>
+                                    </p:set>
+                                  </p:childTnLst>
+                                </p:cTn>
+                              </p:par>
+                            </p:childTnLst>
+                          </p:cTn>
+                        </p:par>
+                      </p:childTnLst>
+                    </p:cTn>
+                  </p:par>
+                  <p:par>
+                    <p:cTn id="37" fill="hold">
+                      <p:stCondLst>
+                        <p:cond delay="indefinite"/>
+                      </p:stCondLst>
+                      <p:childTnLst>
+                        <p:par>
+                          <p:cTn id="38" fill="hold">
+                            <p:stCondLst>
+                              <p:cond delay="0"/>
+                            </p:stCondLst>
+                            <p:childTnLst>
+                              <p:par>
+                                <p:cTn id="39" presetID="1" presetClass="entr" presetSubtype="0" fill="hold" grpId="0" nodeType="clickEffect">
+                                  <p:stCondLst>
+                                    <p:cond delay="0"/>
+                                  </p:stCondLst>
+                                  <p:childTnLst>
+                                    <p:set>
+                                      <p:cBhvr>
+                                        <p:cTn id="40" dur="1" fill="hold">
+                                          <p:stCondLst>
+                                            <p:cond delay="0"/>
+                                          </p:stCondLst>
+                                        </p:cTn>
+                                        <p:tgtEl>
+                                          <p:spTgt spid="6">
+                                            <p:txEl>
+                                              <p:pRg st="4" end="4"/>
+                                            </p:txEl>
+                                          </p:spTgt>
+                                        </p:tgtEl>
+                                        <p:attrNameLst>
+                                          <p:attrName>style.visibility</p:attrName>
+                                        </p:attrNameLst>
+                                      </p:cBhvr>
+                                      <p:to>
+                                        <p:strVal val="visible"/>
+                                      </p:to>
+                                    </p:set>
+                                  </p:childTnLst>
+                                </p:cTn>
+                              </p:par>
+                            </p:childTnLst>
+                          </p:cTn>
+                        </p:par>
+                      </p:childTnLst>
+                    </p:cTn>
+                  </p:par>
+                  <p:par>
+                    <p:cTn id="41" fill="hold">
+                      <p:stCondLst>
+                        <p:cond delay="indefinite"/>
+                      </p:stCondLst>
+                      <p:childTnLst>
+                        <p:par>
+                          <p:cTn id="42" fill="hold">
+                            <p:stCondLst>
+                              <p:cond delay="0"/>
+                            </p:stCondLst>
+                            <p:childTnLst>
+                              <p:par>
+                                <p:cTn id="43" presetID="1" presetClass="entr" presetSubtype="0" fill="hold" grpId="0" nodeType="clickEffect">
+                                  <p:stCondLst>
+                                    <p:cond delay="0"/>
+                                  </p:stCondLst>
+                                  <p:childTnLst>
+                                    <p:set>
+                                      <p:cBhvr>
+                                        <p:cTn id="44" dur="1" fill="hold">
+                                          <p:stCondLst>
+                                            <p:cond delay="0"/>
+                                          </p:stCondLst>
+                                        </p:cTn>
+                                        <p:tgtEl>
+                                          <p:spTgt spid="6">
+                                            <p:txEl>
+                                              <p:pRg st="5" end="5"/>
+                                            </p:txEl>
+                                          </p:spTgt>
+                                        </p:tgtEl>
+                                        <p:attrNameLst>
+                                          <p:attrName>style.visibility</p:attrName>
+                                        </p:attrNameLst>
+                                      </p:cBhvr>
+                                      <p:to>
+                                        <p:strVal val="visible"/>
+                                      </p:to>
+                                    </p:set>
+                                  </p:childTnLst>
+                                </p:cTn>
+                              </p:par>
+                            </p:childTnLst>
+                          </p:cTn>
+                        </p:par>
+                      </p:childTnLst>
+                    </p:cTn>
+                  </p:par>
+                  <p:par>
+                    <p:cTn id="45" fill="hold">
+                      <p:stCondLst>
+                        <p:cond delay="indefinite"/>
+                      </p:stCondLst>
+                      <p:childTnLst>
+                        <p:par>
+                          <p:cTn id="46" fill="hold">
+                            <p:stCondLst>
+                              <p:cond delay="0"/>
+                            </p:stCondLst>
+                            <p:childTnLst>
+                              <p:par>
+                                <p:cTn id="47" presetID="1" presetClass="entr" presetSubtype="0" fill="hold" grpId="0" nodeType="clickEffect">
+                                  <p:stCondLst>
+                                    <p:cond delay="0"/>
+                                  </p:stCondLst>
+                                  <p:childTnLst>
+                                    <p:set>
+                                      <p:cBhvr>
+                                        <p:cTn id="48" dur="1" fill="hold">
+                                          <p:stCondLst>
+                                            <p:cond delay="0"/>
+                                          </p:stCondLst>
+                                        </p:cTn>
+                                        <p:tgtEl>
+                                          <p:spTgt spid="6">
+                                            <p:txEl>
+                                              <p:pRg st="6" end="6"/>
+                                            </p:txEl>
+                                          </p:spTgt>
+                                        </p:tgtEl>
+                                        <p:attrNameLst>
+                                          <p:attrName>style.visibility</p:attrName>
+                                        </p:attrNameLst>
+                                      </p:cBhvr>
+                                      <p:to>
+                                        <p:strVal val="visible"/>
+                                      </p:to>
+                                    </p:set>
+                                  </p:childTnLst>
+                                </p:cTn>
+                              </p:par>
+                            </p:childTnLst>
+                          </p:cTn>
+                        </p:par>
+                      </p:childTnLst>
+                    </p:cTn>
+                  </p:par>
+                </p:childTnLst>
+              </p:cTn>
+              <p:prevCondLst>
+                <p:cond evt="onPrev" delay="0">
+                  <p:tgtEl>
+                    <p:sldTgt/>
+                  </p:tgtEl>
+                </p:cond>
+              </p:prevCondLst>
+              <p:nextCondLst>
+                <p:cond evt="onNext" delay="0">
+                  <p:tgtEl>
+                    <p:sldTgt/>
+                  </p:tgtEl>
+                </p:cond>
+              </p:nextCondLst>
+            </p:seq>
+          </p:childTnLst>
+        </p:cTn>
+      </p:par>
+    </p:tnLst>
+    <p:bldLst>
+      <p:bldP spid="3" grpId="0" build="p"/>
+      <p:bldP spid="6" grpId="0" uiExpand="1" build="p" bldLvl="2"/>
+    </p:bldLst>
+  </p:timing>
+</p:sld>
+</file>
+
+<file path=ppt/slides/slide29.xml><?xml version="1.0" encoding="utf-8"?>
+<p:sld xmlns:a="http://schemas.openxmlformats.org/drawingml/2006/main" xmlns:r="http://schemas.openxmlformats.org/officeDocument/2006/relationships" xmlns:p="http://schemas.openxmlformats.org/presentationml/2006/main">
+  <p:cSld>
+    <p:spTree>
+      <p:nvGrpSpPr>
+        <p:cNvPr id="1" name=""/>
+        <p:cNvGrpSpPr/>
+        <p:nvPr/>
+      </p:nvGrpSpPr>
+      <p:grpSpPr>
+        <a:xfrm>
+          <a:off x="0" y="0"/>
+          <a:ext cx="0" cy="0"/>
+          <a:chOff x="0" y="0"/>
+          <a:chExt cx="0" cy="0"/>
+        </a:xfrm>
+      </p:grpSpPr>
+      <p:sp>
+        <p:nvSpPr>
+          <p:cNvPr id="2" name="Title 1">
+            <a:extLst>
+              <a:ext uri="{FF2B5EF4-FFF2-40B4-BE49-F238E27FC236}">
+                <a16:creationId xmlns:a16="http://schemas.microsoft.com/office/drawing/2014/main" id="{B6F7355F-CB69-2C4D-F490-1B52FA325237}"/>
+              </a:ext>
+            </a:extLst>
+          </p:cNvPr>
+          <p:cNvSpPr>
+            <a:spLocks noGrp="1"/>
+          </p:cNvSpPr>
+          <p:nvPr>
+            <p:ph type="title"/>
+          </p:nvPr>
+        </p:nvSpPr>
+        <p:spPr/>
+        <p:txBody>
+          <a:bodyPr/>
+          <a:lstStyle/>
+          <a:p>
+            <a:r>
+              <a:rPr lang="en-US" dirty="0"/>
+              <a:t>Code Review Activity</a:t>
+            </a:r>
+          </a:p>
+        </p:txBody>
+      </p:sp>
+      <p:sp>
+        <p:nvSpPr>
+          <p:cNvPr id="3" name="Content Placeholder 2">
+            <a:extLst>
+              <a:ext uri="{FF2B5EF4-FFF2-40B4-BE49-F238E27FC236}">
+                <a16:creationId xmlns:a16="http://schemas.microsoft.com/office/drawing/2014/main" id="{48BE5E18-FC8B-E78F-19C1-5242D7470D92}"/>
+              </a:ext>
+            </a:extLst>
+          </p:cNvPr>
+          <p:cNvSpPr>
+            <a:spLocks noGrp="1"/>
+          </p:cNvSpPr>
+          <p:nvPr>
+            <p:ph idx="1"/>
+          </p:nvPr>
+        </p:nvSpPr>
+        <p:spPr/>
+        <p:txBody>
+          <a:bodyPr/>
+          <a:lstStyle/>
+          <a:p>
+            <a:pPr marL="228600" indent="-228600"/>
+            <a:r>
+              <a:rPr lang="en-US" dirty="0"/>
+              <a:t>Join together three (or two) pairs</a:t>
+            </a:r>
+          </a:p>
+          <a:p>
+            <a:pPr marL="228600" indent="-228600"/>
+            <a:r>
+              <a:rPr lang="en-US" dirty="0"/>
+              <a:t>Choose which pair’s code changes you will be reviewing</a:t>
+            </a:r>
+          </a:p>
+          <a:p>
+            <a:pPr marL="228600" indent="-228600"/>
+            <a:r>
+              <a:rPr lang="en-US" dirty="0"/>
+              <a:t>Run flake8 or </a:t>
+            </a:r>
+            <a:r>
+              <a:rPr lang="en-US" dirty="0" err="1"/>
+              <a:t>pylint</a:t>
+            </a:r>
+            <a:r>
+              <a:rPr lang="en-US" dirty="0"/>
+              <a:t> on the </a:t>
+            </a:r>
+            <a:r>
+              <a:rPr lang="en-US" dirty="0" err="1"/>
+              <a:t>inklimit.py</a:t>
+            </a:r>
+            <a:r>
+              <a:rPr lang="en-US" dirty="0"/>
+              <a:t> file and interpret the output</a:t>
+            </a:r>
+          </a:p>
+          <a:p>
+            <a:pPr lvl="1"/>
+            <a:r>
+              <a:rPr lang="en-US" dirty="0"/>
+              <a:t>“flake8 </a:t>
+            </a:r>
+            <a:r>
+              <a:rPr lang="en-US" dirty="0" err="1"/>
+              <a:t>inklimit.py</a:t>
+            </a:r>
+            <a:r>
+              <a:rPr lang="en-US" dirty="0"/>
+              <a:t>”</a:t>
+            </a:r>
+          </a:p>
+          <a:p>
+            <a:pPr lvl="1"/>
+            <a:r>
+              <a:rPr lang="en-US" dirty="0"/>
+              <a:t>(pip3 install flake8 or pip3 install </a:t>
+            </a:r>
+            <a:r>
+              <a:rPr lang="en-US" dirty="0" err="1"/>
+              <a:t>pylint</a:t>
+            </a:r>
+            <a:r>
+              <a:rPr lang="en-US" dirty="0"/>
+              <a:t> if necessary)</a:t>
+            </a:r>
+          </a:p>
+          <a:p>
+            <a:pPr marL="228600" indent="-228600"/>
+            <a:r>
+              <a:rPr lang="en-US" dirty="0"/>
+              <a:t>Choose someone to be “author”</a:t>
+            </a:r>
+          </a:p>
+          <a:p>
+            <a:pPr marL="228600" indent="-228600"/>
+            <a:r>
+              <a:rPr lang="en-US" dirty="0"/>
+              <a:t>Determine what categories of “defect” should be identified</a:t>
+            </a:r>
+          </a:p>
+          <a:p>
+            <a:pPr marL="228600" indent="-228600"/>
+            <a:r>
+              <a:rPr lang="en-US" dirty="0"/>
+              <a:t>Conduct a Code Walkthrough of the chosen code</a:t>
+            </a:r>
+          </a:p>
+        </p:txBody>
+      </p:sp>
+      <p:sp>
+        <p:nvSpPr>
+          <p:cNvPr id="4" name="Slide Number Placeholder 3">
+            <a:extLst>
+              <a:ext uri="{FF2B5EF4-FFF2-40B4-BE49-F238E27FC236}">
+                <a16:creationId xmlns:a16="http://schemas.microsoft.com/office/drawing/2014/main" id="{3A903C20-D0EF-617E-167D-58BBC27076E7}"/>
+              </a:ext>
+            </a:extLst>
+          </p:cNvPr>
+          <p:cNvSpPr>
+            <a:spLocks noGrp="1"/>
+          </p:cNvSpPr>
+          <p:nvPr>
+            <p:ph type="sldNum" sz="quarter" idx="12"/>
+          </p:nvPr>
+        </p:nvSpPr>
+        <p:spPr/>
+        <p:txBody>
+          <a:bodyPr/>
+          <a:lstStyle/>
+          <a:p>
+            <a:fld id="{CD10D25F-A2D7-CB4D-BFF2-5E4504CA3430}" type="slidenum">
+              <a:rPr lang="en-US" smtClean="0"/>
+              <a:t>29</a:t>
+            </a:fld>
+            <a:endParaRPr lang="en-US"/>
+          </a:p>
+        </p:txBody>
+      </p:sp>
+    </p:spTree>
+    <p:extLst>
+      <p:ext uri="{BB962C8B-B14F-4D97-AF65-F5344CB8AC3E}">
+        <p14:creationId xmlns:p14="http://schemas.microsoft.com/office/powerpoint/2010/main" val="67692164"/>
       </p:ext>
     </p:extLst>
   </p:cSld>
@@ -16201,7 +17903,7 @@
           <a:p>
             <a:r>
               <a:rPr lang="en-US" dirty="0"/>
-              <a:t>Collaborative Construction (2)</a:t>
+              <a:t>Collaborative Construction</a:t>
             </a:r>
           </a:p>
         </p:txBody>
@@ -16703,6 +18405,541 @@
 </p:sld>
 </file>
 
+<file path=ppt/slides/slide30.xml><?xml version="1.0" encoding="utf-8"?>
+<p:sld xmlns:a="http://schemas.openxmlformats.org/drawingml/2006/main" xmlns:r="http://schemas.openxmlformats.org/officeDocument/2006/relationships" xmlns:p="http://schemas.openxmlformats.org/presentationml/2006/main">
+  <p:cSld>
+    <p:spTree>
+      <p:nvGrpSpPr>
+        <p:cNvPr id="1" name=""/>
+        <p:cNvGrpSpPr/>
+        <p:nvPr/>
+      </p:nvGrpSpPr>
+      <p:grpSpPr>
+        <a:xfrm>
+          <a:off x="0" y="0"/>
+          <a:ext cx="0" cy="0"/>
+          <a:chOff x="0" y="0"/>
+          <a:chExt cx="0" cy="0"/>
+        </a:xfrm>
+      </p:grpSpPr>
+      <p:sp>
+        <p:nvSpPr>
+          <p:cNvPr id="2" name="Title 1">
+            <a:extLst>
+              <a:ext uri="{FF2B5EF4-FFF2-40B4-BE49-F238E27FC236}">
+                <a16:creationId xmlns:a16="http://schemas.microsoft.com/office/drawing/2014/main" id="{1E4372E3-A3FD-9127-6C36-D4CE349BDD04}"/>
+              </a:ext>
+            </a:extLst>
+          </p:cNvPr>
+          <p:cNvSpPr>
+            <a:spLocks noGrp="1"/>
+          </p:cNvSpPr>
+          <p:nvPr>
+            <p:ph type="title"/>
+          </p:nvPr>
+        </p:nvSpPr>
+        <p:spPr/>
+        <p:txBody>
+          <a:bodyPr/>
+          <a:lstStyle/>
+          <a:p>
+            <a:r>
+              <a:rPr lang="en-US" dirty="0"/>
+              <a:t>Debrief of Collaborative Construction</a:t>
+            </a:r>
+          </a:p>
+        </p:txBody>
+      </p:sp>
+      <p:sp>
+        <p:nvSpPr>
+          <p:cNvPr id="3" name="Content Placeholder 2">
+            <a:extLst>
+              <a:ext uri="{FF2B5EF4-FFF2-40B4-BE49-F238E27FC236}">
+                <a16:creationId xmlns:a16="http://schemas.microsoft.com/office/drawing/2014/main" id="{F48AB8EB-7E92-4D19-363C-A513FDEE3A8B}"/>
+              </a:ext>
+            </a:extLst>
+          </p:cNvPr>
+          <p:cNvSpPr>
+            <a:spLocks noGrp="1"/>
+          </p:cNvSpPr>
+          <p:nvPr>
+            <p:ph idx="1"/>
+          </p:nvPr>
+        </p:nvSpPr>
+        <p:spPr/>
+        <p:txBody>
+          <a:bodyPr/>
+          <a:lstStyle/>
+          <a:p>
+            <a:r>
+              <a:rPr lang="en-US" dirty="0"/>
+              <a:t>How did the Pair Programming go?</a:t>
+            </a:r>
+          </a:p>
+          <a:p>
+            <a:pPr lvl="1"/>
+            <a:r>
+              <a:rPr lang="en-US" dirty="0"/>
+              <a:t>Did anything surprise you?</a:t>
+            </a:r>
+          </a:p>
+          <a:p>
+            <a:pPr lvl="1"/>
+            <a:r>
+              <a:rPr lang="en-US" dirty="0"/>
+              <a:t>If you were Driver, did you feel that the Navigator’s interactions were appropriate and helpful?</a:t>
+            </a:r>
+          </a:p>
+          <a:p>
+            <a:pPr lvl="1"/>
+            <a:r>
+              <a:rPr lang="en-US" dirty="0"/>
+              <a:t>If you were Navigator, did you feel engaged in the development process?</a:t>
+            </a:r>
+          </a:p>
+          <a:p>
+            <a:r>
+              <a:rPr lang="en-US" dirty="0"/>
+              <a:t>How did the Code Walkthrough go?</a:t>
+            </a:r>
+          </a:p>
+          <a:p>
+            <a:pPr lvl="1"/>
+            <a:r>
+              <a:rPr lang="en-US" dirty="0"/>
+              <a:t>Did you find anything substantial?</a:t>
+            </a:r>
+          </a:p>
+          <a:p>
+            <a:pPr lvl="1"/>
+            <a:r>
+              <a:rPr lang="en-US" dirty="0"/>
+              <a:t>If you were not the author, do you understand the code better?</a:t>
+            </a:r>
+          </a:p>
+          <a:p>
+            <a:pPr lvl="1"/>
+            <a:r>
+              <a:rPr lang="en-US" dirty="0"/>
+              <a:t>Do you feel more part of the team?</a:t>
+            </a:r>
+          </a:p>
+          <a:p>
+            <a:r>
+              <a:rPr lang="en-US" dirty="0"/>
+              <a:t>How can you make use of these practices in your own context?</a:t>
+            </a:r>
+          </a:p>
+        </p:txBody>
+      </p:sp>
+      <p:sp>
+        <p:nvSpPr>
+          <p:cNvPr id="4" name="Slide Number Placeholder 3">
+            <a:extLst>
+              <a:ext uri="{FF2B5EF4-FFF2-40B4-BE49-F238E27FC236}">
+                <a16:creationId xmlns:a16="http://schemas.microsoft.com/office/drawing/2014/main" id="{D9CDC923-6B96-52E8-4EAA-DDA090E9D032}"/>
+              </a:ext>
+            </a:extLst>
+          </p:cNvPr>
+          <p:cNvSpPr>
+            <a:spLocks noGrp="1"/>
+          </p:cNvSpPr>
+          <p:nvPr>
+            <p:ph type="sldNum" sz="quarter" idx="12"/>
+          </p:nvPr>
+        </p:nvSpPr>
+        <p:spPr/>
+        <p:txBody>
+          <a:bodyPr/>
+          <a:lstStyle/>
+          <a:p>
+            <a:fld id="{CD10D25F-A2D7-CB4D-BFF2-5E4504CA3430}" type="slidenum">
+              <a:rPr lang="en-US" smtClean="0"/>
+              <a:t>30</a:t>
+            </a:fld>
+            <a:endParaRPr lang="en-US"/>
+          </a:p>
+        </p:txBody>
+      </p:sp>
+    </p:spTree>
+    <p:extLst>
+      <p:ext uri="{BB962C8B-B14F-4D97-AF65-F5344CB8AC3E}">
+        <p14:creationId xmlns:p14="http://schemas.microsoft.com/office/powerpoint/2010/main" val="512984081"/>
+      </p:ext>
+    </p:extLst>
+  </p:cSld>
+  <p:clrMapOvr>
+    <a:masterClrMapping/>
+  </p:clrMapOvr>
+  <p:timing>
+    <p:tnLst>
+      <p:par>
+        <p:cTn id="1" dur="indefinite" restart="never" nodeType="tmRoot">
+          <p:childTnLst>
+            <p:seq concurrent="1" nextAc="seek">
+              <p:cTn id="2" dur="indefinite" nodeType="mainSeq">
+                <p:childTnLst>
+                  <p:par>
+                    <p:cTn id="3" fill="hold">
+                      <p:stCondLst>
+                        <p:cond delay="indefinite"/>
+                      </p:stCondLst>
+                      <p:childTnLst>
+                        <p:par>
+                          <p:cTn id="4" fill="hold">
+                            <p:stCondLst>
+                              <p:cond delay="0"/>
+                            </p:stCondLst>
+                            <p:childTnLst>
+                              <p:par>
+                                <p:cTn id="5" presetID="1" presetClass="entr" presetSubtype="0" fill="hold" grpId="0" nodeType="clickEffect">
+                                  <p:stCondLst>
+                                    <p:cond delay="0"/>
+                                  </p:stCondLst>
+                                  <p:childTnLst>
+                                    <p:set>
+                                      <p:cBhvr>
+                                        <p:cTn id="6" dur="1" fill="hold">
+                                          <p:stCondLst>
+                                            <p:cond delay="0"/>
+                                          </p:stCondLst>
+                                        </p:cTn>
+                                        <p:tgtEl>
+                                          <p:spTgt spid="3">
+                                            <p:txEl>
+                                              <p:pRg st="0" end="0"/>
+                                            </p:txEl>
+                                          </p:spTgt>
+                                        </p:tgtEl>
+                                        <p:attrNameLst>
+                                          <p:attrName>style.visibility</p:attrName>
+                                        </p:attrNameLst>
+                                      </p:cBhvr>
+                                      <p:to>
+                                        <p:strVal val="visible"/>
+                                      </p:to>
+                                    </p:set>
+                                  </p:childTnLst>
+                                </p:cTn>
+                              </p:par>
+                              <p:par>
+                                <p:cTn id="7" presetID="1" presetClass="entr" presetSubtype="0" fill="hold" grpId="0" nodeType="withEffect">
+                                  <p:stCondLst>
+                                    <p:cond delay="0"/>
+                                  </p:stCondLst>
+                                  <p:childTnLst>
+                                    <p:set>
+                                      <p:cBhvr>
+                                        <p:cTn id="8" dur="1" fill="hold">
+                                          <p:stCondLst>
+                                            <p:cond delay="0"/>
+                                          </p:stCondLst>
+                                        </p:cTn>
+                                        <p:tgtEl>
+                                          <p:spTgt spid="3">
+                                            <p:txEl>
+                                              <p:pRg st="1" end="1"/>
+                                            </p:txEl>
+                                          </p:spTgt>
+                                        </p:tgtEl>
+                                        <p:attrNameLst>
+                                          <p:attrName>style.visibility</p:attrName>
+                                        </p:attrNameLst>
+                                      </p:cBhvr>
+                                      <p:to>
+                                        <p:strVal val="visible"/>
+                                      </p:to>
+                                    </p:set>
+                                  </p:childTnLst>
+                                </p:cTn>
+                              </p:par>
+                              <p:par>
+                                <p:cTn id="9" presetID="1" presetClass="entr" presetSubtype="0" fill="hold" grpId="0" nodeType="withEffect">
+                                  <p:stCondLst>
+                                    <p:cond delay="0"/>
+                                  </p:stCondLst>
+                                  <p:childTnLst>
+                                    <p:set>
+                                      <p:cBhvr>
+                                        <p:cTn id="10" dur="1" fill="hold">
+                                          <p:stCondLst>
+                                            <p:cond delay="0"/>
+                                          </p:stCondLst>
+                                        </p:cTn>
+                                        <p:tgtEl>
+                                          <p:spTgt spid="3">
+                                            <p:txEl>
+                                              <p:pRg st="2" end="2"/>
+                                            </p:txEl>
+                                          </p:spTgt>
+                                        </p:tgtEl>
+                                        <p:attrNameLst>
+                                          <p:attrName>style.visibility</p:attrName>
+                                        </p:attrNameLst>
+                                      </p:cBhvr>
+                                      <p:to>
+                                        <p:strVal val="visible"/>
+                                      </p:to>
+                                    </p:set>
+                                  </p:childTnLst>
+                                </p:cTn>
+                              </p:par>
+                              <p:par>
+                                <p:cTn id="11" presetID="1" presetClass="entr" presetSubtype="0" fill="hold" grpId="0" nodeType="withEffect">
+                                  <p:stCondLst>
+                                    <p:cond delay="0"/>
+                                  </p:stCondLst>
+                                  <p:childTnLst>
+                                    <p:set>
+                                      <p:cBhvr>
+                                        <p:cTn id="12" dur="1" fill="hold">
+                                          <p:stCondLst>
+                                            <p:cond delay="0"/>
+                                          </p:stCondLst>
+                                        </p:cTn>
+                                        <p:tgtEl>
+                                          <p:spTgt spid="3">
+                                            <p:txEl>
+                                              <p:pRg st="3" end="3"/>
+                                            </p:txEl>
+                                          </p:spTgt>
+                                        </p:tgtEl>
+                                        <p:attrNameLst>
+                                          <p:attrName>style.visibility</p:attrName>
+                                        </p:attrNameLst>
+                                      </p:cBhvr>
+                                      <p:to>
+                                        <p:strVal val="visible"/>
+                                      </p:to>
+                                    </p:set>
+                                  </p:childTnLst>
+                                </p:cTn>
+                              </p:par>
+                            </p:childTnLst>
+                          </p:cTn>
+                        </p:par>
+                      </p:childTnLst>
+                    </p:cTn>
+                  </p:par>
+                  <p:par>
+                    <p:cTn id="13" fill="hold">
+                      <p:stCondLst>
+                        <p:cond delay="indefinite"/>
+                      </p:stCondLst>
+                      <p:childTnLst>
+                        <p:par>
+                          <p:cTn id="14" fill="hold">
+                            <p:stCondLst>
+                              <p:cond delay="0"/>
+                            </p:stCondLst>
+                            <p:childTnLst>
+                              <p:par>
+                                <p:cTn id="15" presetID="1" presetClass="entr" presetSubtype="0" fill="hold" grpId="0" nodeType="clickEffect">
+                                  <p:stCondLst>
+                                    <p:cond delay="0"/>
+                                  </p:stCondLst>
+                                  <p:childTnLst>
+                                    <p:set>
+                                      <p:cBhvr>
+                                        <p:cTn id="16" dur="1" fill="hold">
+                                          <p:stCondLst>
+                                            <p:cond delay="0"/>
+                                          </p:stCondLst>
+                                        </p:cTn>
+                                        <p:tgtEl>
+                                          <p:spTgt spid="3">
+                                            <p:txEl>
+                                              <p:pRg st="4" end="4"/>
+                                            </p:txEl>
+                                          </p:spTgt>
+                                        </p:tgtEl>
+                                        <p:attrNameLst>
+                                          <p:attrName>style.visibility</p:attrName>
+                                        </p:attrNameLst>
+                                      </p:cBhvr>
+                                      <p:to>
+                                        <p:strVal val="visible"/>
+                                      </p:to>
+                                    </p:set>
+                                  </p:childTnLst>
+                                </p:cTn>
+                              </p:par>
+                              <p:par>
+                                <p:cTn id="17" presetID="1" presetClass="entr" presetSubtype="0" fill="hold" grpId="0" nodeType="withEffect">
+                                  <p:stCondLst>
+                                    <p:cond delay="0"/>
+                                  </p:stCondLst>
+                                  <p:childTnLst>
+                                    <p:set>
+                                      <p:cBhvr>
+                                        <p:cTn id="18" dur="1" fill="hold">
+                                          <p:stCondLst>
+                                            <p:cond delay="0"/>
+                                          </p:stCondLst>
+                                        </p:cTn>
+                                        <p:tgtEl>
+                                          <p:spTgt spid="3">
+                                            <p:txEl>
+                                              <p:pRg st="5" end="5"/>
+                                            </p:txEl>
+                                          </p:spTgt>
+                                        </p:tgtEl>
+                                        <p:attrNameLst>
+                                          <p:attrName>style.visibility</p:attrName>
+                                        </p:attrNameLst>
+                                      </p:cBhvr>
+                                      <p:to>
+                                        <p:strVal val="visible"/>
+                                      </p:to>
+                                    </p:set>
+                                  </p:childTnLst>
+                                </p:cTn>
+                              </p:par>
+                              <p:par>
+                                <p:cTn id="19" presetID="1" presetClass="entr" presetSubtype="0" fill="hold" grpId="0" nodeType="withEffect">
+                                  <p:stCondLst>
+                                    <p:cond delay="0"/>
+                                  </p:stCondLst>
+                                  <p:childTnLst>
+                                    <p:set>
+                                      <p:cBhvr>
+                                        <p:cTn id="20" dur="1" fill="hold">
+                                          <p:stCondLst>
+                                            <p:cond delay="0"/>
+                                          </p:stCondLst>
+                                        </p:cTn>
+                                        <p:tgtEl>
+                                          <p:spTgt spid="3">
+                                            <p:txEl>
+                                              <p:pRg st="6" end="6"/>
+                                            </p:txEl>
+                                          </p:spTgt>
+                                        </p:tgtEl>
+                                        <p:attrNameLst>
+                                          <p:attrName>style.visibility</p:attrName>
+                                        </p:attrNameLst>
+                                      </p:cBhvr>
+                                      <p:to>
+                                        <p:strVal val="visible"/>
+                                      </p:to>
+                                    </p:set>
+                                  </p:childTnLst>
+                                </p:cTn>
+                              </p:par>
+                              <p:par>
+                                <p:cTn id="21" presetID="1" presetClass="entr" presetSubtype="0" fill="hold" grpId="0" nodeType="withEffect">
+                                  <p:stCondLst>
+                                    <p:cond delay="0"/>
+                                  </p:stCondLst>
+                                  <p:childTnLst>
+                                    <p:set>
+                                      <p:cBhvr>
+                                        <p:cTn id="22" dur="1" fill="hold">
+                                          <p:stCondLst>
+                                            <p:cond delay="0"/>
+                                          </p:stCondLst>
+                                        </p:cTn>
+                                        <p:tgtEl>
+                                          <p:spTgt spid="3">
+                                            <p:txEl>
+                                              <p:pRg st="7" end="7"/>
+                                            </p:txEl>
+                                          </p:spTgt>
+                                        </p:tgtEl>
+                                        <p:attrNameLst>
+                                          <p:attrName>style.visibility</p:attrName>
+                                        </p:attrNameLst>
+                                      </p:cBhvr>
+                                      <p:to>
+                                        <p:strVal val="visible"/>
+                                      </p:to>
+                                    </p:set>
+                                  </p:childTnLst>
+                                </p:cTn>
+                              </p:par>
+                            </p:childTnLst>
+                          </p:cTn>
+                        </p:par>
+                      </p:childTnLst>
+                    </p:cTn>
+                  </p:par>
+                  <p:par>
+                    <p:cTn id="23" fill="hold">
+                      <p:stCondLst>
+                        <p:cond delay="indefinite"/>
+                      </p:stCondLst>
+                      <p:childTnLst>
+                        <p:par>
+                          <p:cTn id="24" fill="hold">
+                            <p:stCondLst>
+                              <p:cond delay="0"/>
+                            </p:stCondLst>
+                            <p:childTnLst>
+                              <p:par>
+                                <p:cTn id="25" presetID="1" presetClass="entr" presetSubtype="0" fill="hold" grpId="0" nodeType="clickEffect">
+                                  <p:stCondLst>
+                                    <p:cond delay="0"/>
+                                  </p:stCondLst>
+                                  <p:childTnLst>
+                                    <p:set>
+                                      <p:cBhvr>
+                                        <p:cTn id="26" dur="1" fill="hold">
+                                          <p:stCondLst>
+                                            <p:cond delay="0"/>
+                                          </p:stCondLst>
+                                        </p:cTn>
+                                        <p:tgtEl>
+                                          <p:spTgt spid="3">
+                                            <p:txEl>
+                                              <p:pRg st="8" end="8"/>
+                                            </p:txEl>
+                                          </p:spTgt>
+                                        </p:tgtEl>
+                                        <p:attrNameLst>
+                                          <p:attrName>style.visibility</p:attrName>
+                                        </p:attrNameLst>
+                                      </p:cBhvr>
+                                      <p:to>
+                                        <p:strVal val="visible"/>
+                                      </p:to>
+                                    </p:set>
+                                  </p:childTnLst>
+                                </p:cTn>
+                              </p:par>
+                            </p:childTnLst>
+                          </p:cTn>
+                        </p:par>
+                      </p:childTnLst>
+                    </p:cTn>
+                  </p:par>
+                </p:childTnLst>
+              </p:cTn>
+              <p:prevCondLst>
+                <p:cond evt="onPrev" delay="0">
+                  <p:tgtEl>
+                    <p:sldTgt/>
+                  </p:tgtEl>
+                </p:cond>
+              </p:prevCondLst>
+              <p:nextCondLst>
+                <p:cond evt="onNext" delay="0">
+                  <p:tgtEl>
+                    <p:sldTgt/>
+                  </p:tgtEl>
+                </p:cond>
+              </p:nextCondLst>
+            </p:seq>
+          </p:childTnLst>
+        </p:cTn>
+      </p:par>
+    </p:tnLst>
+    <p:bldLst>
+      <p:bldP spid="3" grpId="0" build="p"/>
+    </p:bldLst>
+  </p:timing>
+</p:sld>
+</file>
+
 <file path=ppt/slides/slide4.xml><?xml version="1.0" encoding="utf-8"?>
 <p:sld xmlns:a="http://schemas.openxmlformats.org/drawingml/2006/main" xmlns:r="http://schemas.openxmlformats.org/officeDocument/2006/relationships" xmlns:p="http://schemas.openxmlformats.org/presentationml/2006/main">
   <p:cSld>
@@ -16743,7 +18980,7 @@
           <a:p>
             <a:r>
               <a:rPr lang="en-US" dirty="0"/>
-              <a:t>Collaborative Construction (3)</a:t>
+              <a:t>Collaborative Construction</a:t>
             </a:r>
           </a:p>
         </p:txBody>
@@ -17517,7 +19754,23 @@
             <a:pPr lvl="1"/>
             <a:r>
               <a:rPr lang="en-US" dirty="0"/>
-              <a:t>Tends to be lighter-weight, akin to a “code walk-through” or “read-through”</a:t>
+              <a:t>Tends to be lighter-weight, akin to a “</a:t>
+            </a:r>
+            <a:r>
+              <a:rPr lang="en-US" b="1" dirty="0"/>
+              <a:t>code walk-through</a:t>
+            </a:r>
+            <a:r>
+              <a:rPr lang="en-US" dirty="0"/>
+              <a:t>” or “</a:t>
+            </a:r>
+            <a:r>
+              <a:rPr lang="en-US" b="1" dirty="0"/>
+              <a:t>read-through</a:t>
+            </a:r>
+            <a:r>
+              <a:rPr lang="en-US" dirty="0"/>
+              <a:t>”</a:t>
             </a:r>
           </a:p>
         </p:txBody>

</xml_diff>

<commit_message>
Updates to animation and a couple of typos
</commit_message>
<xml_diff>
--- a/presentations/CollaborativeConstruction.pptx
+++ b/presentations/CollaborativeConstruction.pptx
@@ -1285,7 +1285,7 @@
           <a:bodyPr/>
           <a:lstStyle/>
           <a:p>
-            <a:endParaRPr lang="en-US" dirty="0"/>
+            <a:endParaRPr lang="en-US"/>
           </a:p>
         </p:txBody>
       </p:sp>
@@ -1306,7 +1306,7 @@
           <a:p>
             <a:fld id="{2744C287-4C1B-E44A-A5AD-508A7D1413E1}" type="slidenum">
               <a:rPr lang="en-US" smtClean="0"/>
-              <a:t>21</a:t>
+              <a:t>20</a:t>
             </a:fld>
             <a:endParaRPr lang="en-US"/>
           </a:p>
@@ -1315,7 +1315,7 @@
     </p:spTree>
     <p:extLst>
       <p:ext uri="{BB962C8B-B14F-4D97-AF65-F5344CB8AC3E}">
-        <p14:creationId xmlns:p14="http://schemas.microsoft.com/office/powerpoint/2010/main" val="1959687549"/>
+        <p14:creationId xmlns:p14="http://schemas.microsoft.com/office/powerpoint/2010/main" val="4268248849"/>
       </p:ext>
     </p:extLst>
   </p:cSld>
@@ -1369,45 +1369,6 @@
           <a:bodyPr/>
           <a:lstStyle/>
           <a:p>
-            <a:r>
-              <a:rPr lang="en-US" dirty="0"/>
-              <a:t>These kinds of comments make me wonder why students on team projects so often “silo” the work.</a:t>
-            </a:r>
-          </a:p>
-          <a:p>
-            <a:endParaRPr lang="en-US" dirty="0"/>
-          </a:p>
-          <a:p>
-            <a:pPr marL="171450" indent="-171450">
-              <a:buFont typeface="Arial" panose="020B0604020202020204" pitchFamily="34" charset="0"/>
-              <a:buChar char="•"/>
-            </a:pPr>
-            <a:r>
-              <a:rPr lang="en-US" dirty="0"/>
-              <a:t>You are letting more defects slip through, which makes things take longer to finish</a:t>
-            </a:r>
-          </a:p>
-          <a:p>
-            <a:pPr marL="171450" indent="-171450">
-              <a:buFont typeface="Arial" panose="020B0604020202020204" pitchFamily="34" charset="0"/>
-              <a:buChar char="•"/>
-            </a:pPr>
-            <a:r>
-              <a:rPr lang="en-US" dirty="0"/>
-              <a:t>You aren’t learning what the other teammates are working on, which is a constant complaint from project classes</a:t>
-            </a:r>
-          </a:p>
-          <a:p>
-            <a:pPr marL="171450" indent="-171450">
-              <a:buFont typeface="Arial" panose="020B0604020202020204" pitchFamily="34" charset="0"/>
-              <a:buChar char="•"/>
-            </a:pPr>
-            <a:r>
-              <a:rPr lang="en-US" dirty="0"/>
-              <a:t>You are having a less satisfying and more exhausting experience from the process!</a:t>
-            </a:r>
-          </a:p>
-          <a:p>
             <a:endParaRPr lang="en-US" dirty="0"/>
           </a:p>
         </p:txBody>
@@ -1429,7 +1390,7 @@
           <a:p>
             <a:fld id="{2744C287-4C1B-E44A-A5AD-508A7D1413E1}" type="slidenum">
               <a:rPr lang="en-US" smtClean="0"/>
-              <a:t>22</a:t>
+              <a:t>21</a:t>
             </a:fld>
             <a:endParaRPr lang="en-US"/>
           </a:p>
@@ -1438,7 +1399,7 @@
     </p:spTree>
     <p:extLst>
       <p:ext uri="{BB962C8B-B14F-4D97-AF65-F5344CB8AC3E}">
-        <p14:creationId xmlns:p14="http://schemas.microsoft.com/office/powerpoint/2010/main" val="4139959776"/>
+        <p14:creationId xmlns:p14="http://schemas.microsoft.com/office/powerpoint/2010/main" val="1959687549"/>
       </p:ext>
     </p:extLst>
   </p:cSld>
@@ -1493,63 +1454,42 @@
           <a:lstStyle/>
           <a:p>
             <a:r>
-              <a:rPr lang="en-US" sz="1200" kern="1200" dirty="0">
-                <a:solidFill>
-                  <a:schemeClr val="tx1"/>
-                </a:solidFill>
-                <a:effectLst/>
-                <a:latin typeface="+mn-lt"/>
-                <a:ea typeface="+mn-ea"/>
-                <a:cs typeface="+mn-cs"/>
-              </a:rPr>
-              <a:t>From Ron Jeffries (one of the inventors of XP):</a:t>
-            </a:r>
-          </a:p>
-          <a:p>
-            <a:endParaRPr lang="en-US" sz="1200" kern="1200" dirty="0">
-              <a:solidFill>
-                <a:schemeClr val="tx1"/>
-              </a:solidFill>
-              <a:effectLst/>
-              <a:latin typeface="+mn-lt"/>
-              <a:ea typeface="+mn-ea"/>
-              <a:cs typeface="+mn-cs"/>
-            </a:endParaRPr>
-          </a:p>
-          <a:p>
-            <a:pPr lvl="1"/>
-            <a:r>
-              <a:rPr lang="en-US" sz="1200" kern="1200" dirty="0">
-                <a:solidFill>
-                  <a:schemeClr val="tx1"/>
-                </a:solidFill>
-                <a:effectLst/>
-                <a:latin typeface="+mn-lt"/>
-                <a:ea typeface="+mn-ea"/>
-                <a:cs typeface="+mn-cs"/>
-              </a:rPr>
-              <a:t>“I was sitting with one of the least-experienced developers, working on some fairly straightforward task. Frankly, I was thinking to myself that with my great skill in Smalltalk, I would soon be teaching this young programmer how it’s really done.</a:t>
-            </a:r>
-          </a:p>
-          <a:p>
-            <a:pPr lvl="1"/>
+              <a:rPr lang="en-US" dirty="0"/>
+              <a:t>These kinds of comments make me wonder why students on team projects so often “silo” the work.</a:t>
+            </a:r>
+          </a:p>
+          <a:p>
             <a:endParaRPr lang="en-US" dirty="0"/>
           </a:p>
           <a:p>
-            <a:pPr lvl="1"/>
-            <a:r>
-              <a:rPr lang="en-US" sz="1200" kern="1200" dirty="0">
-                <a:solidFill>
-                  <a:schemeClr val="tx1"/>
-                </a:solidFill>
-                <a:effectLst/>
-                <a:latin typeface="+mn-lt"/>
-                <a:ea typeface="+mn-ea"/>
-                <a:cs typeface="+mn-cs"/>
-              </a:rPr>
-              <a:t>“We hadn’t been programming more than a few minutes when the youngster asked me why I was doing what I was doing. Sure enough, I was off on a bad track. I went another way. Then the whippersnapper reminded me of the correct method name for whatever I was mistyping at the time. Pretty soon, he was suggesting what I should do next, meanwhile calling out my every formatting error and syntax mistake.”</a:t>
-            </a:r>
-            <a:endParaRPr lang="en-US" dirty="0"/>
+            <a:pPr marL="171450" indent="-171450">
+              <a:buFont typeface="Arial" panose="020B0604020202020204" pitchFamily="34" charset="0"/>
+              <a:buChar char="•"/>
+            </a:pPr>
+            <a:r>
+              <a:rPr lang="en-US" dirty="0"/>
+              <a:t>You are letting more defects slip through, which makes things take longer to finish</a:t>
+            </a:r>
+          </a:p>
+          <a:p>
+            <a:pPr marL="171450" indent="-171450">
+              <a:buFont typeface="Arial" panose="020B0604020202020204" pitchFamily="34" charset="0"/>
+              <a:buChar char="•"/>
+            </a:pPr>
+            <a:r>
+              <a:rPr lang="en-US" dirty="0"/>
+              <a:t>You aren’t learning what the other teammates are working on, which is a constant complaint from project classes</a:t>
+            </a:r>
+          </a:p>
+          <a:p>
+            <a:pPr marL="171450" indent="-171450">
+              <a:buFont typeface="Arial" panose="020B0604020202020204" pitchFamily="34" charset="0"/>
+              <a:buChar char="•"/>
+            </a:pPr>
+            <a:r>
+              <a:rPr lang="en-US" dirty="0"/>
+              <a:t>You are having a less satisfying and more exhausting experience from the process!</a:t>
+            </a:r>
           </a:p>
           <a:p>
             <a:endParaRPr lang="en-US" dirty="0"/>
@@ -1573,7 +1513,7 @@
           <a:p>
             <a:fld id="{2744C287-4C1B-E44A-A5AD-508A7D1413E1}" type="slidenum">
               <a:rPr lang="en-US" smtClean="0"/>
-              <a:t>24</a:t>
+              <a:t>22</a:t>
             </a:fld>
             <a:endParaRPr lang="en-US"/>
           </a:p>
@@ -1582,7 +1522,7 @@
     </p:spTree>
     <p:extLst>
       <p:ext uri="{BB962C8B-B14F-4D97-AF65-F5344CB8AC3E}">
-        <p14:creationId xmlns:p14="http://schemas.microsoft.com/office/powerpoint/2010/main" val="2003885883"/>
+        <p14:creationId xmlns:p14="http://schemas.microsoft.com/office/powerpoint/2010/main" val="4139959776"/>
       </p:ext>
     </p:extLst>
   </p:cSld>
@@ -1724,13 +1664,66 @@
           <a:lstStyle/>
           <a:p>
             <a:r>
-              <a:rPr lang="en-US" dirty="0"/>
-              <a:t>You may notice that the suggestions here, follow the same topics as the code-review topics.  </a:t>
-            </a:r>
-            <a:r>
-              <a:rPr lang="en-US" b="1" dirty="0"/>
-              <a:t>This is not by accident!</a:t>
-            </a:r>
+              <a:rPr lang="en-US" sz="1200" kern="1200" dirty="0">
+                <a:solidFill>
+                  <a:schemeClr val="tx1"/>
+                </a:solidFill>
+                <a:effectLst/>
+                <a:latin typeface="+mn-lt"/>
+                <a:ea typeface="+mn-ea"/>
+                <a:cs typeface="+mn-cs"/>
+              </a:rPr>
+              <a:t>From Ron Jeffries (one of the inventors of XP):</a:t>
+            </a:r>
+          </a:p>
+          <a:p>
+            <a:endParaRPr lang="en-US" sz="1200" kern="1200" dirty="0">
+              <a:solidFill>
+                <a:schemeClr val="tx1"/>
+              </a:solidFill>
+              <a:effectLst/>
+              <a:latin typeface="+mn-lt"/>
+              <a:ea typeface="+mn-ea"/>
+              <a:cs typeface="+mn-cs"/>
+            </a:endParaRPr>
+          </a:p>
+          <a:p>
+            <a:pPr lvl="1"/>
+            <a:r>
+              <a:rPr lang="en-US" sz="1200" kern="1200" dirty="0">
+                <a:solidFill>
+                  <a:schemeClr val="tx1"/>
+                </a:solidFill>
+                <a:effectLst/>
+                <a:latin typeface="+mn-lt"/>
+                <a:ea typeface="+mn-ea"/>
+                <a:cs typeface="+mn-cs"/>
+              </a:rPr>
+              <a:t>“I was sitting with one of the least-experienced developers, working on some fairly straightforward task. Frankly, I was thinking to myself that with my great skill in Smalltalk, I would soon be teaching this young programmer how it’s really done.</a:t>
+            </a:r>
+          </a:p>
+          <a:p>
+            <a:pPr lvl="1"/>
+            <a:endParaRPr lang="en-US" dirty="0"/>
+          </a:p>
+          <a:p>
+            <a:pPr lvl="1"/>
+            <a:r>
+              <a:rPr lang="en-US" sz="1200" kern="1200" dirty="0">
+                <a:solidFill>
+                  <a:schemeClr val="tx1"/>
+                </a:solidFill>
+                <a:effectLst/>
+                <a:latin typeface="+mn-lt"/>
+                <a:ea typeface="+mn-ea"/>
+                <a:cs typeface="+mn-cs"/>
+              </a:rPr>
+              <a:t>“We hadn’t been programming more than a few minutes when the youngster asked me why I was doing what I was doing. Sure enough, I was off on a bad track. I went another way. Then the whippersnapper reminded me of the correct method name for whatever I was mistyping at the time. Pretty soon, he was suggesting what I should do next, meanwhile calling out my every formatting error and syntax mistake.”</a:t>
+            </a:r>
+            <a:endParaRPr lang="en-US" dirty="0"/>
+          </a:p>
+          <a:p>
+            <a:endParaRPr lang="en-US" dirty="0"/>
           </a:p>
         </p:txBody>
       </p:sp>
@@ -1751,7 +1744,7 @@
           <a:p>
             <a:fld id="{2744C287-4C1B-E44A-A5AD-508A7D1413E1}" type="slidenum">
               <a:rPr lang="en-US" smtClean="0"/>
-              <a:t>26</a:t>
+              <a:t>24</a:t>
             </a:fld>
             <a:endParaRPr lang="en-US"/>
           </a:p>
@@ -1760,7 +1753,7 @@
     </p:spTree>
     <p:extLst>
       <p:ext uri="{BB962C8B-B14F-4D97-AF65-F5344CB8AC3E}">
-        <p14:creationId xmlns:p14="http://schemas.microsoft.com/office/powerpoint/2010/main" val="2780002173"/>
+        <p14:creationId xmlns:p14="http://schemas.microsoft.com/office/powerpoint/2010/main" val="2003885883"/>
       </p:ext>
     </p:extLst>
   </p:cSld>
@@ -1835,7 +1828,7 @@
           <a:p>
             <a:fld id="{2744C287-4C1B-E44A-A5AD-508A7D1413E1}" type="slidenum">
               <a:rPr lang="en-US" smtClean="0"/>
-              <a:t>27</a:t>
+              <a:t>25</a:t>
             </a:fld>
             <a:endParaRPr lang="en-US"/>
           </a:p>
@@ -1844,7 +1837,7 @@
     </p:spTree>
     <p:extLst>
       <p:ext uri="{BB962C8B-B14F-4D97-AF65-F5344CB8AC3E}">
-        <p14:creationId xmlns:p14="http://schemas.microsoft.com/office/powerpoint/2010/main" val="533247099"/>
+        <p14:creationId xmlns:p14="http://schemas.microsoft.com/office/powerpoint/2010/main" val="3570332790"/>
       </p:ext>
     </p:extLst>
   </p:cSld>
@@ -1898,7 +1891,14 @@
           <a:bodyPr/>
           <a:lstStyle/>
           <a:p>
-            <a:endParaRPr lang="en-US" dirty="0"/>
+            <a:r>
+              <a:rPr lang="en-US" dirty="0"/>
+              <a:t>You may notice that the suggestions here, follow the same topics as the code-review topics.  </a:t>
+            </a:r>
+            <a:r>
+              <a:rPr lang="en-US" b="1" dirty="0"/>
+              <a:t>This is not by accident!</a:t>
+            </a:r>
           </a:p>
         </p:txBody>
       </p:sp>
@@ -1919,7 +1919,7 @@
           <a:p>
             <a:fld id="{2744C287-4C1B-E44A-A5AD-508A7D1413E1}" type="slidenum">
               <a:rPr lang="en-US" smtClean="0"/>
-              <a:t>28</a:t>
+              <a:t>26</a:t>
             </a:fld>
             <a:endParaRPr lang="en-US"/>
           </a:p>
@@ -1928,7 +1928,7 @@
     </p:spTree>
     <p:extLst>
       <p:ext uri="{BB962C8B-B14F-4D97-AF65-F5344CB8AC3E}">
-        <p14:creationId xmlns:p14="http://schemas.microsoft.com/office/powerpoint/2010/main" val="1557858821"/>
+        <p14:creationId xmlns:p14="http://schemas.microsoft.com/office/powerpoint/2010/main" val="2780002173"/>
       </p:ext>
     </p:extLst>
   </p:cSld>
@@ -2003,6 +2003,174 @@
           <a:p>
             <a:fld id="{2744C287-4C1B-E44A-A5AD-508A7D1413E1}" type="slidenum">
               <a:rPr lang="en-US" smtClean="0"/>
+              <a:t>27</a:t>
+            </a:fld>
+            <a:endParaRPr lang="en-US"/>
+          </a:p>
+        </p:txBody>
+      </p:sp>
+    </p:spTree>
+    <p:extLst>
+      <p:ext uri="{BB962C8B-B14F-4D97-AF65-F5344CB8AC3E}">
+        <p14:creationId xmlns:p14="http://schemas.microsoft.com/office/powerpoint/2010/main" val="533247099"/>
+      </p:ext>
+    </p:extLst>
+  </p:cSld>
+  <p:clrMapOvr>
+    <a:masterClrMapping/>
+  </p:clrMapOvr>
+</p:notes>
+</file>
+
+<file path=ppt/notesSlides/notesSlide24.xml><?xml version="1.0" encoding="utf-8"?>
+<p:notes xmlns:a="http://schemas.openxmlformats.org/drawingml/2006/main" xmlns:r="http://schemas.openxmlformats.org/officeDocument/2006/relationships" xmlns:p="http://schemas.openxmlformats.org/presentationml/2006/main">
+  <p:cSld>
+    <p:spTree>
+      <p:nvGrpSpPr>
+        <p:cNvPr id="1" name=""/>
+        <p:cNvGrpSpPr/>
+        <p:nvPr/>
+      </p:nvGrpSpPr>
+      <p:grpSpPr>
+        <a:xfrm>
+          <a:off x="0" y="0"/>
+          <a:ext cx="0" cy="0"/>
+          <a:chOff x="0" y="0"/>
+          <a:chExt cx="0" cy="0"/>
+        </a:xfrm>
+      </p:grpSpPr>
+      <p:sp>
+        <p:nvSpPr>
+          <p:cNvPr id="2" name="Slide Image Placeholder 1"/>
+          <p:cNvSpPr>
+            <a:spLocks noGrp="1" noRot="1" noChangeAspect="1"/>
+          </p:cNvSpPr>
+          <p:nvPr>
+            <p:ph type="sldImg"/>
+          </p:nvPr>
+        </p:nvSpPr>
+        <p:spPr/>
+      </p:sp>
+      <p:sp>
+        <p:nvSpPr>
+          <p:cNvPr id="3" name="Notes Placeholder 2"/>
+          <p:cNvSpPr>
+            <a:spLocks noGrp="1"/>
+          </p:cNvSpPr>
+          <p:nvPr>
+            <p:ph type="body" idx="1"/>
+          </p:nvPr>
+        </p:nvSpPr>
+        <p:spPr/>
+        <p:txBody>
+          <a:bodyPr/>
+          <a:lstStyle/>
+          <a:p>
+            <a:endParaRPr lang="en-US" dirty="0"/>
+          </a:p>
+        </p:txBody>
+      </p:sp>
+      <p:sp>
+        <p:nvSpPr>
+          <p:cNvPr id="4" name="Slide Number Placeholder 3"/>
+          <p:cNvSpPr>
+            <a:spLocks noGrp="1"/>
+          </p:cNvSpPr>
+          <p:nvPr>
+            <p:ph type="sldNum" sz="quarter" idx="5"/>
+          </p:nvPr>
+        </p:nvSpPr>
+        <p:spPr/>
+        <p:txBody>
+          <a:bodyPr/>
+          <a:lstStyle/>
+          <a:p>
+            <a:fld id="{2744C287-4C1B-E44A-A5AD-508A7D1413E1}" type="slidenum">
+              <a:rPr lang="en-US" smtClean="0"/>
+              <a:t>28</a:t>
+            </a:fld>
+            <a:endParaRPr lang="en-US"/>
+          </a:p>
+        </p:txBody>
+      </p:sp>
+    </p:spTree>
+    <p:extLst>
+      <p:ext uri="{BB962C8B-B14F-4D97-AF65-F5344CB8AC3E}">
+        <p14:creationId xmlns:p14="http://schemas.microsoft.com/office/powerpoint/2010/main" val="1557858821"/>
+      </p:ext>
+    </p:extLst>
+  </p:cSld>
+  <p:clrMapOvr>
+    <a:masterClrMapping/>
+  </p:clrMapOvr>
+</p:notes>
+</file>
+
+<file path=ppt/notesSlides/notesSlide25.xml><?xml version="1.0" encoding="utf-8"?>
+<p:notes xmlns:a="http://schemas.openxmlformats.org/drawingml/2006/main" xmlns:r="http://schemas.openxmlformats.org/officeDocument/2006/relationships" xmlns:p="http://schemas.openxmlformats.org/presentationml/2006/main">
+  <p:cSld>
+    <p:spTree>
+      <p:nvGrpSpPr>
+        <p:cNvPr id="1" name=""/>
+        <p:cNvGrpSpPr/>
+        <p:nvPr/>
+      </p:nvGrpSpPr>
+      <p:grpSpPr>
+        <a:xfrm>
+          <a:off x="0" y="0"/>
+          <a:ext cx="0" cy="0"/>
+          <a:chOff x="0" y="0"/>
+          <a:chExt cx="0" cy="0"/>
+        </a:xfrm>
+      </p:grpSpPr>
+      <p:sp>
+        <p:nvSpPr>
+          <p:cNvPr id="2" name="Slide Image Placeholder 1"/>
+          <p:cNvSpPr>
+            <a:spLocks noGrp="1" noRot="1" noChangeAspect="1"/>
+          </p:cNvSpPr>
+          <p:nvPr>
+            <p:ph type="sldImg"/>
+          </p:nvPr>
+        </p:nvSpPr>
+        <p:spPr/>
+      </p:sp>
+      <p:sp>
+        <p:nvSpPr>
+          <p:cNvPr id="3" name="Notes Placeholder 2"/>
+          <p:cNvSpPr>
+            <a:spLocks noGrp="1"/>
+          </p:cNvSpPr>
+          <p:nvPr>
+            <p:ph type="body" idx="1"/>
+          </p:nvPr>
+        </p:nvSpPr>
+        <p:spPr/>
+        <p:txBody>
+          <a:bodyPr/>
+          <a:lstStyle/>
+          <a:p>
+            <a:endParaRPr lang="en-US"/>
+          </a:p>
+        </p:txBody>
+      </p:sp>
+      <p:sp>
+        <p:nvSpPr>
+          <p:cNvPr id="4" name="Slide Number Placeholder 3"/>
+          <p:cNvSpPr>
+            <a:spLocks noGrp="1"/>
+          </p:cNvSpPr>
+          <p:nvPr>
+            <p:ph type="sldNum" sz="quarter" idx="5"/>
+          </p:nvPr>
+        </p:nvSpPr>
+        <p:spPr/>
+        <p:txBody>
+          <a:bodyPr/>
+          <a:lstStyle/>
+          <a:p>
+            <a:fld id="{2744C287-4C1B-E44A-A5AD-508A7D1413E1}" type="slidenum">
+              <a:rPr lang="en-US" smtClean="0"/>
               <a:t>29</a:t>
             </a:fld>
             <a:endParaRPr lang="en-US"/>
@@ -2022,7 +2190,7 @@
 </p:notes>
 </file>
 
-<file path=ppt/notesSlides/notesSlide24.xml><?xml version="1.0" encoding="utf-8"?>
+<file path=ppt/notesSlides/notesSlide26.xml><?xml version="1.0" encoding="utf-8"?>
 <p:notes xmlns:a="http://schemas.openxmlformats.org/drawingml/2006/main" xmlns:r="http://schemas.openxmlformats.org/officeDocument/2006/relationships" xmlns:p="http://schemas.openxmlformats.org/presentationml/2006/main">
   <p:cSld>
     <p:spTree>
@@ -6390,6 +6558,480 @@
   <p:clrMapOvr>
     <a:masterClrMapping/>
   </p:clrMapOvr>
+  <p:timing>
+    <p:tnLst>
+      <p:par>
+        <p:cTn id="1" dur="indefinite" restart="never" nodeType="tmRoot">
+          <p:childTnLst>
+            <p:seq concurrent="1" nextAc="seek">
+              <p:cTn id="2" dur="indefinite" nodeType="mainSeq">
+                <p:childTnLst>
+                  <p:par>
+                    <p:cTn id="3" fill="hold">
+                      <p:stCondLst>
+                        <p:cond delay="indefinite"/>
+                      </p:stCondLst>
+                      <p:childTnLst>
+                        <p:par>
+                          <p:cTn id="4" fill="hold">
+                            <p:stCondLst>
+                              <p:cond delay="0"/>
+                            </p:stCondLst>
+                            <p:childTnLst>
+                              <p:par>
+                                <p:cTn id="5" presetID="1" presetClass="entr" presetSubtype="0" fill="hold" grpId="0" nodeType="clickEffect">
+                                  <p:stCondLst>
+                                    <p:cond delay="0"/>
+                                  </p:stCondLst>
+                                  <p:childTnLst>
+                                    <p:set>
+                                      <p:cBhvr>
+                                        <p:cTn id="6" dur="1" fill="hold">
+                                          <p:stCondLst>
+                                            <p:cond delay="0"/>
+                                          </p:stCondLst>
+                                        </p:cTn>
+                                        <p:tgtEl>
+                                          <p:spTgt spid="3">
+                                            <p:txEl>
+                                              <p:pRg st="0" end="0"/>
+                                            </p:txEl>
+                                          </p:spTgt>
+                                        </p:tgtEl>
+                                        <p:attrNameLst>
+                                          <p:attrName>style.visibility</p:attrName>
+                                        </p:attrNameLst>
+                                      </p:cBhvr>
+                                      <p:to>
+                                        <p:strVal val="visible"/>
+                                      </p:to>
+                                    </p:set>
+                                  </p:childTnLst>
+                                </p:cTn>
+                              </p:par>
+                            </p:childTnLst>
+                          </p:cTn>
+                        </p:par>
+                      </p:childTnLst>
+                    </p:cTn>
+                  </p:par>
+                  <p:par>
+                    <p:cTn id="7" fill="hold">
+                      <p:stCondLst>
+                        <p:cond delay="indefinite"/>
+                      </p:stCondLst>
+                      <p:childTnLst>
+                        <p:par>
+                          <p:cTn id="8" fill="hold">
+                            <p:stCondLst>
+                              <p:cond delay="0"/>
+                            </p:stCondLst>
+                            <p:childTnLst>
+                              <p:par>
+                                <p:cTn id="9" presetID="1" presetClass="entr" presetSubtype="0" fill="hold" grpId="0" nodeType="clickEffect">
+                                  <p:stCondLst>
+                                    <p:cond delay="0"/>
+                                  </p:stCondLst>
+                                  <p:childTnLst>
+                                    <p:set>
+                                      <p:cBhvr>
+                                        <p:cTn id="10" dur="1" fill="hold">
+                                          <p:stCondLst>
+                                            <p:cond delay="0"/>
+                                          </p:stCondLst>
+                                        </p:cTn>
+                                        <p:tgtEl>
+                                          <p:spTgt spid="3">
+                                            <p:txEl>
+                                              <p:pRg st="1" end="1"/>
+                                            </p:txEl>
+                                          </p:spTgt>
+                                        </p:tgtEl>
+                                        <p:attrNameLst>
+                                          <p:attrName>style.visibility</p:attrName>
+                                        </p:attrNameLst>
+                                      </p:cBhvr>
+                                      <p:to>
+                                        <p:strVal val="visible"/>
+                                      </p:to>
+                                    </p:set>
+                                  </p:childTnLst>
+                                </p:cTn>
+                              </p:par>
+                            </p:childTnLst>
+                          </p:cTn>
+                        </p:par>
+                      </p:childTnLst>
+                    </p:cTn>
+                  </p:par>
+                  <p:par>
+                    <p:cTn id="11" fill="hold">
+                      <p:stCondLst>
+                        <p:cond delay="indefinite"/>
+                      </p:stCondLst>
+                      <p:childTnLst>
+                        <p:par>
+                          <p:cTn id="12" fill="hold">
+                            <p:stCondLst>
+                              <p:cond delay="0"/>
+                            </p:stCondLst>
+                            <p:childTnLst>
+                              <p:par>
+                                <p:cTn id="13" presetID="1" presetClass="entr" presetSubtype="0" fill="hold" grpId="0" nodeType="clickEffect">
+                                  <p:stCondLst>
+                                    <p:cond delay="0"/>
+                                  </p:stCondLst>
+                                  <p:childTnLst>
+                                    <p:set>
+                                      <p:cBhvr>
+                                        <p:cTn id="14" dur="1" fill="hold">
+                                          <p:stCondLst>
+                                            <p:cond delay="0"/>
+                                          </p:stCondLst>
+                                        </p:cTn>
+                                        <p:tgtEl>
+                                          <p:spTgt spid="3">
+                                            <p:txEl>
+                                              <p:pRg st="2" end="2"/>
+                                            </p:txEl>
+                                          </p:spTgt>
+                                        </p:tgtEl>
+                                        <p:attrNameLst>
+                                          <p:attrName>style.visibility</p:attrName>
+                                        </p:attrNameLst>
+                                      </p:cBhvr>
+                                      <p:to>
+                                        <p:strVal val="visible"/>
+                                      </p:to>
+                                    </p:set>
+                                  </p:childTnLst>
+                                </p:cTn>
+                              </p:par>
+                            </p:childTnLst>
+                          </p:cTn>
+                        </p:par>
+                      </p:childTnLst>
+                    </p:cTn>
+                  </p:par>
+                  <p:par>
+                    <p:cTn id="15" fill="hold">
+                      <p:stCondLst>
+                        <p:cond delay="indefinite"/>
+                      </p:stCondLst>
+                      <p:childTnLst>
+                        <p:par>
+                          <p:cTn id="16" fill="hold">
+                            <p:stCondLst>
+                              <p:cond delay="0"/>
+                            </p:stCondLst>
+                            <p:childTnLst>
+                              <p:par>
+                                <p:cTn id="17" presetID="1" presetClass="entr" presetSubtype="0" fill="hold" grpId="0" nodeType="clickEffect">
+                                  <p:stCondLst>
+                                    <p:cond delay="0"/>
+                                  </p:stCondLst>
+                                  <p:childTnLst>
+                                    <p:set>
+                                      <p:cBhvr>
+                                        <p:cTn id="18" dur="1" fill="hold">
+                                          <p:stCondLst>
+                                            <p:cond delay="0"/>
+                                          </p:stCondLst>
+                                        </p:cTn>
+                                        <p:tgtEl>
+                                          <p:spTgt spid="3">
+                                            <p:txEl>
+                                              <p:pRg st="3" end="3"/>
+                                            </p:txEl>
+                                          </p:spTgt>
+                                        </p:tgtEl>
+                                        <p:attrNameLst>
+                                          <p:attrName>style.visibility</p:attrName>
+                                        </p:attrNameLst>
+                                      </p:cBhvr>
+                                      <p:to>
+                                        <p:strVal val="visible"/>
+                                      </p:to>
+                                    </p:set>
+                                  </p:childTnLst>
+                                </p:cTn>
+                              </p:par>
+                            </p:childTnLst>
+                          </p:cTn>
+                        </p:par>
+                      </p:childTnLst>
+                    </p:cTn>
+                  </p:par>
+                  <p:par>
+                    <p:cTn id="19" fill="hold">
+                      <p:stCondLst>
+                        <p:cond delay="indefinite"/>
+                      </p:stCondLst>
+                      <p:childTnLst>
+                        <p:par>
+                          <p:cTn id="20" fill="hold">
+                            <p:stCondLst>
+                              <p:cond delay="0"/>
+                            </p:stCondLst>
+                            <p:childTnLst>
+                              <p:par>
+                                <p:cTn id="21" presetID="1" presetClass="entr" presetSubtype="0" fill="hold" grpId="0" nodeType="clickEffect">
+                                  <p:stCondLst>
+                                    <p:cond delay="0"/>
+                                  </p:stCondLst>
+                                  <p:childTnLst>
+                                    <p:set>
+                                      <p:cBhvr>
+                                        <p:cTn id="22" dur="1" fill="hold">
+                                          <p:stCondLst>
+                                            <p:cond delay="0"/>
+                                          </p:stCondLst>
+                                        </p:cTn>
+                                        <p:tgtEl>
+                                          <p:spTgt spid="3">
+                                            <p:txEl>
+                                              <p:pRg st="4" end="4"/>
+                                            </p:txEl>
+                                          </p:spTgt>
+                                        </p:tgtEl>
+                                        <p:attrNameLst>
+                                          <p:attrName>style.visibility</p:attrName>
+                                        </p:attrNameLst>
+                                      </p:cBhvr>
+                                      <p:to>
+                                        <p:strVal val="visible"/>
+                                      </p:to>
+                                    </p:set>
+                                  </p:childTnLst>
+                                </p:cTn>
+                              </p:par>
+                            </p:childTnLst>
+                          </p:cTn>
+                        </p:par>
+                      </p:childTnLst>
+                    </p:cTn>
+                  </p:par>
+                  <p:par>
+                    <p:cTn id="23" fill="hold">
+                      <p:stCondLst>
+                        <p:cond delay="indefinite"/>
+                      </p:stCondLst>
+                      <p:childTnLst>
+                        <p:par>
+                          <p:cTn id="24" fill="hold">
+                            <p:stCondLst>
+                              <p:cond delay="0"/>
+                            </p:stCondLst>
+                            <p:childTnLst>
+                              <p:par>
+                                <p:cTn id="25" presetID="1" presetClass="entr" presetSubtype="0" fill="hold" grpId="0" nodeType="clickEffect">
+                                  <p:stCondLst>
+                                    <p:cond delay="0"/>
+                                  </p:stCondLst>
+                                  <p:childTnLst>
+                                    <p:set>
+                                      <p:cBhvr>
+                                        <p:cTn id="26" dur="1" fill="hold">
+                                          <p:stCondLst>
+                                            <p:cond delay="0"/>
+                                          </p:stCondLst>
+                                        </p:cTn>
+                                        <p:tgtEl>
+                                          <p:spTgt spid="3">
+                                            <p:txEl>
+                                              <p:pRg st="5" end="5"/>
+                                            </p:txEl>
+                                          </p:spTgt>
+                                        </p:tgtEl>
+                                        <p:attrNameLst>
+                                          <p:attrName>style.visibility</p:attrName>
+                                        </p:attrNameLst>
+                                      </p:cBhvr>
+                                      <p:to>
+                                        <p:strVal val="visible"/>
+                                      </p:to>
+                                    </p:set>
+                                  </p:childTnLst>
+                                </p:cTn>
+                              </p:par>
+                            </p:childTnLst>
+                          </p:cTn>
+                        </p:par>
+                      </p:childTnLst>
+                    </p:cTn>
+                  </p:par>
+                  <p:par>
+                    <p:cTn id="27" fill="hold">
+                      <p:stCondLst>
+                        <p:cond delay="indefinite"/>
+                      </p:stCondLst>
+                      <p:childTnLst>
+                        <p:par>
+                          <p:cTn id="28" fill="hold">
+                            <p:stCondLst>
+                              <p:cond delay="0"/>
+                            </p:stCondLst>
+                            <p:childTnLst>
+                              <p:par>
+                                <p:cTn id="29" presetID="1" presetClass="entr" presetSubtype="0" fill="hold" grpId="0" nodeType="clickEffect">
+                                  <p:stCondLst>
+                                    <p:cond delay="0"/>
+                                  </p:stCondLst>
+                                  <p:childTnLst>
+                                    <p:set>
+                                      <p:cBhvr>
+                                        <p:cTn id="30" dur="1" fill="hold">
+                                          <p:stCondLst>
+                                            <p:cond delay="0"/>
+                                          </p:stCondLst>
+                                        </p:cTn>
+                                        <p:tgtEl>
+                                          <p:spTgt spid="3">
+                                            <p:txEl>
+                                              <p:pRg st="6" end="6"/>
+                                            </p:txEl>
+                                          </p:spTgt>
+                                        </p:tgtEl>
+                                        <p:attrNameLst>
+                                          <p:attrName>style.visibility</p:attrName>
+                                        </p:attrNameLst>
+                                      </p:cBhvr>
+                                      <p:to>
+                                        <p:strVal val="visible"/>
+                                      </p:to>
+                                    </p:set>
+                                  </p:childTnLst>
+                                </p:cTn>
+                              </p:par>
+                            </p:childTnLst>
+                          </p:cTn>
+                        </p:par>
+                      </p:childTnLst>
+                    </p:cTn>
+                  </p:par>
+                  <p:par>
+                    <p:cTn id="31" fill="hold">
+                      <p:stCondLst>
+                        <p:cond delay="indefinite"/>
+                      </p:stCondLst>
+                      <p:childTnLst>
+                        <p:par>
+                          <p:cTn id="32" fill="hold">
+                            <p:stCondLst>
+                              <p:cond delay="0"/>
+                            </p:stCondLst>
+                            <p:childTnLst>
+                              <p:par>
+                                <p:cTn id="33" presetID="1" presetClass="entr" presetSubtype="0" fill="hold" grpId="0" nodeType="clickEffect">
+                                  <p:stCondLst>
+                                    <p:cond delay="0"/>
+                                  </p:stCondLst>
+                                  <p:childTnLst>
+                                    <p:set>
+                                      <p:cBhvr>
+                                        <p:cTn id="34" dur="1" fill="hold">
+                                          <p:stCondLst>
+                                            <p:cond delay="0"/>
+                                          </p:stCondLst>
+                                        </p:cTn>
+                                        <p:tgtEl>
+                                          <p:spTgt spid="3">
+                                            <p:txEl>
+                                              <p:pRg st="7" end="7"/>
+                                            </p:txEl>
+                                          </p:spTgt>
+                                        </p:tgtEl>
+                                        <p:attrNameLst>
+                                          <p:attrName>style.visibility</p:attrName>
+                                        </p:attrNameLst>
+                                      </p:cBhvr>
+                                      <p:to>
+                                        <p:strVal val="visible"/>
+                                      </p:to>
+                                    </p:set>
+                                  </p:childTnLst>
+                                </p:cTn>
+                              </p:par>
+                            </p:childTnLst>
+                          </p:cTn>
+                        </p:par>
+                      </p:childTnLst>
+                    </p:cTn>
+                  </p:par>
+                  <p:par>
+                    <p:cTn id="35" fill="hold">
+                      <p:stCondLst>
+                        <p:cond delay="indefinite"/>
+                      </p:stCondLst>
+                      <p:childTnLst>
+                        <p:par>
+                          <p:cTn id="36" fill="hold">
+                            <p:stCondLst>
+                              <p:cond delay="0"/>
+                            </p:stCondLst>
+                            <p:childTnLst>
+                              <p:par>
+                                <p:cTn id="37" presetID="1" presetClass="entr" presetSubtype="0" fill="hold" grpId="0" nodeType="clickEffect">
+                                  <p:stCondLst>
+                                    <p:cond delay="0"/>
+                                  </p:stCondLst>
+                                  <p:childTnLst>
+                                    <p:set>
+                                      <p:cBhvr>
+                                        <p:cTn id="38" dur="1" fill="hold">
+                                          <p:stCondLst>
+                                            <p:cond delay="0"/>
+                                          </p:stCondLst>
+                                        </p:cTn>
+                                        <p:tgtEl>
+                                          <p:spTgt spid="3">
+                                            <p:txEl>
+                                              <p:pRg st="8" end="8"/>
+                                            </p:txEl>
+                                          </p:spTgt>
+                                        </p:tgtEl>
+                                        <p:attrNameLst>
+                                          <p:attrName>style.visibility</p:attrName>
+                                        </p:attrNameLst>
+                                      </p:cBhvr>
+                                      <p:to>
+                                        <p:strVal val="visible"/>
+                                      </p:to>
+                                    </p:set>
+                                  </p:childTnLst>
+                                </p:cTn>
+                              </p:par>
+                            </p:childTnLst>
+                          </p:cTn>
+                        </p:par>
+                      </p:childTnLst>
+                    </p:cTn>
+                  </p:par>
+                </p:childTnLst>
+              </p:cTn>
+              <p:prevCondLst>
+                <p:cond evt="onPrev" delay="0">
+                  <p:tgtEl>
+                    <p:sldTgt/>
+                  </p:tgtEl>
+                </p:cond>
+              </p:prevCondLst>
+              <p:nextCondLst>
+                <p:cond evt="onNext" delay="0">
+                  <p:tgtEl>
+                    <p:sldTgt/>
+                  </p:tgtEl>
+                </p:cond>
+              </p:nextCondLst>
+            </p:seq>
+          </p:childTnLst>
+        </p:cTn>
+      </p:par>
+    </p:tnLst>
+    <p:bldLst>
+      <p:bldP spid="3" grpId="0" build="p"/>
+    </p:bldLst>
+  </p:timing>
 </p:sld>
 </file>
 
@@ -8102,7 +8744,7 @@
           <a:p>
             <a:r>
               <a:rPr lang="en-US" dirty="0"/>
-              <a:t>Code Review Best Practices:  Tools (2)</a:t>
+              <a:t>Code Review Best Practices:  Tools</a:t>
             </a:r>
           </a:p>
         </p:txBody>
@@ -8188,33 +8830,9 @@
             </a:r>
           </a:p>
           <a:p>
-            <a:endParaRPr lang="en-US" dirty="0"/>
-          </a:p>
-          <a:p>
-            <a:r>
-              <a:rPr lang="en-US" dirty="0"/>
-              <a:t>In a future project you will need to incorporate Flake8 or </a:t>
-            </a:r>
-            <a:r>
-              <a:rPr lang="en-US" dirty="0" err="1"/>
-              <a:t>Pylint</a:t>
-            </a:r>
-            <a:r>
-              <a:rPr lang="en-US" dirty="0"/>
-              <a:t> to identify and fix bugs and language anti-patterns</a:t>
-            </a:r>
-          </a:p>
-          <a:p>
-            <a:r>
-              <a:rPr lang="en-US" dirty="0"/>
-              <a:t>Of course, you are welcome to do this early too!  </a:t>
-            </a:r>
-            <a:r>
-              <a:rPr lang="en-US" dirty="0">
-                <a:sym typeface="Wingdings" pitchFamily="2" charset="2"/>
-              </a:rPr>
-              <a:t></a:t>
-            </a:r>
+            <a:pPr marL="0" indent="0">
+              <a:buNone/>
+            </a:pPr>
             <a:endParaRPr lang="en-US" dirty="0"/>
           </a:p>
         </p:txBody>
@@ -9557,7 +10175,7 @@
           <a:p>
             <a:r>
               <a:rPr lang="en-US" dirty="0"/>
-              <a:t>Pair Programming (2)</a:t>
+              <a:t>Pair Programming</a:t>
             </a:r>
           </a:p>
         </p:txBody>
@@ -9921,15 +10539,33 @@
                                   </p:childTnLst>
                                 </p:cTn>
                               </p:par>
+                            </p:childTnLst>
+                          </p:cTn>
+                        </p:par>
+                      </p:childTnLst>
+                    </p:cTn>
+                  </p:par>
+                  <p:par>
+                    <p:cTn id="23" fill="hold">
+                      <p:stCondLst>
+                        <p:cond delay="indefinite"/>
+                      </p:stCondLst>
+                      <p:childTnLst>
+                        <p:par>
+                          <p:cTn id="24" fill="hold">
+                            <p:stCondLst>
+                              <p:cond delay="0"/>
+                            </p:stCondLst>
+                            <p:childTnLst>
                               <p:par>
-                                <p:cTn id="23" presetID="1" presetClass="entr" presetSubtype="0" fill="hold" grpId="0" nodeType="withEffect">
+                                <p:cTn id="25" presetID="1" presetClass="entr" presetSubtype="0" fill="hold" grpId="0" nodeType="clickEffect">
                                   <p:stCondLst>
                                     <p:cond delay="0"/>
                                   </p:stCondLst>
                                   <p:childTnLst>
                                     <p:set>
                                       <p:cBhvr>
-                                        <p:cTn id="24" dur="1" fill="hold">
+                                        <p:cTn id="26" dur="1" fill="hold">
                                           <p:stCondLst>
                                             <p:cond delay="0"/>
                                           </p:stCondLst>
@@ -16833,6 +17469,359 @@
   <p:clrMapOvr>
     <a:masterClrMapping/>
   </p:clrMapOvr>
+  <p:timing>
+    <p:tnLst>
+      <p:par>
+        <p:cTn id="1" dur="indefinite" restart="never" nodeType="tmRoot">
+          <p:childTnLst>
+            <p:seq concurrent="1" nextAc="seek">
+              <p:cTn id="2" dur="indefinite" nodeType="mainSeq">
+                <p:childTnLst>
+                  <p:par>
+                    <p:cTn id="3" fill="hold">
+                      <p:stCondLst>
+                        <p:cond delay="indefinite"/>
+                      </p:stCondLst>
+                      <p:childTnLst>
+                        <p:par>
+                          <p:cTn id="4" fill="hold">
+                            <p:stCondLst>
+                              <p:cond delay="0"/>
+                            </p:stCondLst>
+                            <p:childTnLst>
+                              <p:par>
+                                <p:cTn id="5" presetID="1" presetClass="entr" presetSubtype="0" fill="hold" grpId="0" nodeType="clickEffect">
+                                  <p:stCondLst>
+                                    <p:cond delay="0"/>
+                                  </p:stCondLst>
+                                  <p:childTnLst>
+                                    <p:set>
+                                      <p:cBhvr>
+                                        <p:cTn id="6" dur="1" fill="hold">
+                                          <p:stCondLst>
+                                            <p:cond delay="0"/>
+                                          </p:stCondLst>
+                                        </p:cTn>
+                                        <p:tgtEl>
+                                          <p:spTgt spid="3">
+                                            <p:txEl>
+                                              <p:pRg st="0" end="0"/>
+                                            </p:txEl>
+                                          </p:spTgt>
+                                        </p:tgtEl>
+                                        <p:attrNameLst>
+                                          <p:attrName>style.visibility</p:attrName>
+                                        </p:attrNameLst>
+                                      </p:cBhvr>
+                                      <p:to>
+                                        <p:strVal val="visible"/>
+                                      </p:to>
+                                    </p:set>
+                                  </p:childTnLst>
+                                </p:cTn>
+                              </p:par>
+                            </p:childTnLst>
+                          </p:cTn>
+                        </p:par>
+                      </p:childTnLst>
+                    </p:cTn>
+                  </p:par>
+                  <p:par>
+                    <p:cTn id="7" fill="hold">
+                      <p:stCondLst>
+                        <p:cond delay="indefinite"/>
+                      </p:stCondLst>
+                      <p:childTnLst>
+                        <p:par>
+                          <p:cTn id="8" fill="hold">
+                            <p:stCondLst>
+                              <p:cond delay="0"/>
+                            </p:stCondLst>
+                            <p:childTnLst>
+                              <p:par>
+                                <p:cTn id="9" presetID="1" presetClass="entr" presetSubtype="0" fill="hold" grpId="0" nodeType="clickEffect">
+                                  <p:stCondLst>
+                                    <p:cond delay="0"/>
+                                  </p:stCondLst>
+                                  <p:childTnLst>
+                                    <p:set>
+                                      <p:cBhvr>
+                                        <p:cTn id="10" dur="1" fill="hold">
+                                          <p:stCondLst>
+                                            <p:cond delay="0"/>
+                                          </p:stCondLst>
+                                        </p:cTn>
+                                        <p:tgtEl>
+                                          <p:spTgt spid="3">
+                                            <p:txEl>
+                                              <p:pRg st="1" end="1"/>
+                                            </p:txEl>
+                                          </p:spTgt>
+                                        </p:tgtEl>
+                                        <p:attrNameLst>
+                                          <p:attrName>style.visibility</p:attrName>
+                                        </p:attrNameLst>
+                                      </p:cBhvr>
+                                      <p:to>
+                                        <p:strVal val="visible"/>
+                                      </p:to>
+                                    </p:set>
+                                  </p:childTnLst>
+                                </p:cTn>
+                              </p:par>
+                              <p:par>
+                                <p:cTn id="11" presetID="1" presetClass="entr" presetSubtype="0" fill="hold" grpId="0" nodeType="withEffect">
+                                  <p:stCondLst>
+                                    <p:cond delay="0"/>
+                                  </p:stCondLst>
+                                  <p:childTnLst>
+                                    <p:set>
+                                      <p:cBhvr>
+                                        <p:cTn id="12" dur="1" fill="hold">
+                                          <p:stCondLst>
+                                            <p:cond delay="0"/>
+                                          </p:stCondLst>
+                                        </p:cTn>
+                                        <p:tgtEl>
+                                          <p:spTgt spid="3">
+                                            <p:txEl>
+                                              <p:pRg st="2" end="2"/>
+                                            </p:txEl>
+                                          </p:spTgt>
+                                        </p:tgtEl>
+                                        <p:attrNameLst>
+                                          <p:attrName>style.visibility</p:attrName>
+                                        </p:attrNameLst>
+                                      </p:cBhvr>
+                                      <p:to>
+                                        <p:strVal val="visible"/>
+                                      </p:to>
+                                    </p:set>
+                                  </p:childTnLst>
+                                </p:cTn>
+                              </p:par>
+                            </p:childTnLst>
+                          </p:cTn>
+                        </p:par>
+                      </p:childTnLst>
+                    </p:cTn>
+                  </p:par>
+                  <p:par>
+                    <p:cTn id="13" fill="hold">
+                      <p:stCondLst>
+                        <p:cond delay="indefinite"/>
+                      </p:stCondLst>
+                      <p:childTnLst>
+                        <p:par>
+                          <p:cTn id="14" fill="hold">
+                            <p:stCondLst>
+                              <p:cond delay="0"/>
+                            </p:stCondLst>
+                            <p:childTnLst>
+                              <p:par>
+                                <p:cTn id="15" presetID="1" presetClass="entr" presetSubtype="0" fill="hold" grpId="0" nodeType="clickEffect">
+                                  <p:stCondLst>
+                                    <p:cond delay="0"/>
+                                  </p:stCondLst>
+                                  <p:childTnLst>
+                                    <p:set>
+                                      <p:cBhvr>
+                                        <p:cTn id="16" dur="1" fill="hold">
+                                          <p:stCondLst>
+                                            <p:cond delay="0"/>
+                                          </p:stCondLst>
+                                        </p:cTn>
+                                        <p:tgtEl>
+                                          <p:spTgt spid="3">
+                                            <p:txEl>
+                                              <p:pRg st="3" end="3"/>
+                                            </p:txEl>
+                                          </p:spTgt>
+                                        </p:tgtEl>
+                                        <p:attrNameLst>
+                                          <p:attrName>style.visibility</p:attrName>
+                                        </p:attrNameLst>
+                                      </p:cBhvr>
+                                      <p:to>
+                                        <p:strVal val="visible"/>
+                                      </p:to>
+                                    </p:set>
+                                  </p:childTnLst>
+                                </p:cTn>
+                              </p:par>
+                              <p:par>
+                                <p:cTn id="17" presetID="1" presetClass="entr" presetSubtype="0" fill="hold" grpId="0" nodeType="withEffect">
+                                  <p:stCondLst>
+                                    <p:cond delay="0"/>
+                                  </p:stCondLst>
+                                  <p:childTnLst>
+                                    <p:set>
+                                      <p:cBhvr>
+                                        <p:cTn id="18" dur="1" fill="hold">
+                                          <p:stCondLst>
+                                            <p:cond delay="0"/>
+                                          </p:stCondLst>
+                                        </p:cTn>
+                                        <p:tgtEl>
+                                          <p:spTgt spid="3">
+                                            <p:txEl>
+                                              <p:pRg st="4" end="4"/>
+                                            </p:txEl>
+                                          </p:spTgt>
+                                        </p:tgtEl>
+                                        <p:attrNameLst>
+                                          <p:attrName>style.visibility</p:attrName>
+                                        </p:attrNameLst>
+                                      </p:cBhvr>
+                                      <p:to>
+                                        <p:strVal val="visible"/>
+                                      </p:to>
+                                    </p:set>
+                                  </p:childTnLst>
+                                </p:cTn>
+                              </p:par>
+                              <p:par>
+                                <p:cTn id="19" presetID="1" presetClass="entr" presetSubtype="0" fill="hold" grpId="0" nodeType="withEffect">
+                                  <p:stCondLst>
+                                    <p:cond delay="0"/>
+                                  </p:stCondLst>
+                                  <p:childTnLst>
+                                    <p:set>
+                                      <p:cBhvr>
+                                        <p:cTn id="20" dur="1" fill="hold">
+                                          <p:stCondLst>
+                                            <p:cond delay="0"/>
+                                          </p:stCondLst>
+                                        </p:cTn>
+                                        <p:tgtEl>
+                                          <p:spTgt spid="3">
+                                            <p:txEl>
+                                              <p:pRg st="5" end="5"/>
+                                            </p:txEl>
+                                          </p:spTgt>
+                                        </p:tgtEl>
+                                        <p:attrNameLst>
+                                          <p:attrName>style.visibility</p:attrName>
+                                        </p:attrNameLst>
+                                      </p:cBhvr>
+                                      <p:to>
+                                        <p:strVal val="visible"/>
+                                      </p:to>
+                                    </p:set>
+                                  </p:childTnLst>
+                                </p:cTn>
+                              </p:par>
+                            </p:childTnLst>
+                          </p:cTn>
+                        </p:par>
+                      </p:childTnLst>
+                    </p:cTn>
+                  </p:par>
+                  <p:par>
+                    <p:cTn id="21" fill="hold">
+                      <p:stCondLst>
+                        <p:cond delay="indefinite"/>
+                      </p:stCondLst>
+                      <p:childTnLst>
+                        <p:par>
+                          <p:cTn id="22" fill="hold">
+                            <p:stCondLst>
+                              <p:cond delay="0"/>
+                            </p:stCondLst>
+                            <p:childTnLst>
+                              <p:par>
+                                <p:cTn id="23" presetID="1" presetClass="entr" presetSubtype="0" fill="hold" grpId="0" nodeType="clickEffect">
+                                  <p:stCondLst>
+                                    <p:cond delay="0"/>
+                                  </p:stCondLst>
+                                  <p:childTnLst>
+                                    <p:set>
+                                      <p:cBhvr>
+                                        <p:cTn id="24" dur="1" fill="hold">
+                                          <p:stCondLst>
+                                            <p:cond delay="0"/>
+                                          </p:stCondLst>
+                                        </p:cTn>
+                                        <p:tgtEl>
+                                          <p:spTgt spid="3">
+                                            <p:txEl>
+                                              <p:pRg st="6" end="6"/>
+                                            </p:txEl>
+                                          </p:spTgt>
+                                        </p:tgtEl>
+                                        <p:attrNameLst>
+                                          <p:attrName>style.visibility</p:attrName>
+                                        </p:attrNameLst>
+                                      </p:cBhvr>
+                                      <p:to>
+                                        <p:strVal val="visible"/>
+                                      </p:to>
+                                    </p:set>
+                                  </p:childTnLst>
+                                </p:cTn>
+                              </p:par>
+                              <p:par>
+                                <p:cTn id="25" presetID="1" presetClass="entr" presetSubtype="0" fill="hold" grpId="0" nodeType="withEffect">
+                                  <p:stCondLst>
+                                    <p:cond delay="0"/>
+                                  </p:stCondLst>
+                                  <p:childTnLst>
+                                    <p:set>
+                                      <p:cBhvr>
+                                        <p:cTn id="26" dur="1" fill="hold">
+                                          <p:stCondLst>
+                                            <p:cond delay="0"/>
+                                          </p:stCondLst>
+                                        </p:cTn>
+                                        <p:tgtEl>
+                                          <p:spTgt spid="3">
+                                            <p:txEl>
+                                              <p:pRg st="7" end="7"/>
+                                            </p:txEl>
+                                          </p:spTgt>
+                                        </p:tgtEl>
+                                        <p:attrNameLst>
+                                          <p:attrName>style.visibility</p:attrName>
+                                        </p:attrNameLst>
+                                      </p:cBhvr>
+                                      <p:to>
+                                        <p:strVal val="visible"/>
+                                      </p:to>
+                                    </p:set>
+                                  </p:childTnLst>
+                                </p:cTn>
+                              </p:par>
+                            </p:childTnLst>
+                          </p:cTn>
+                        </p:par>
+                      </p:childTnLst>
+                    </p:cTn>
+                  </p:par>
+                </p:childTnLst>
+              </p:cTn>
+              <p:prevCondLst>
+                <p:cond evt="onPrev" delay="0">
+                  <p:tgtEl>
+                    <p:sldTgt/>
+                  </p:tgtEl>
+                </p:cond>
+              </p:prevCondLst>
+              <p:nextCondLst>
+                <p:cond evt="onNext" delay="0">
+                  <p:tgtEl>
+                    <p:sldTgt/>
+                  </p:tgtEl>
+                </p:cond>
+              </p:nextCondLst>
+            </p:seq>
+          </p:childTnLst>
+        </p:cTn>
+      </p:par>
+    </p:tnLst>
+    <p:bldLst>
+      <p:bldP spid="3" grpId="0" build="p"/>
+    </p:bldLst>
+  </p:timing>
 </p:sld>
 </file>
 
@@ -17860,6 +18849,395 @@
   <p:clrMapOvr>
     <a:masterClrMapping/>
   </p:clrMapOvr>
+  <p:timing>
+    <p:tnLst>
+      <p:par>
+        <p:cTn id="1" dur="indefinite" restart="never" nodeType="tmRoot">
+          <p:childTnLst>
+            <p:seq concurrent="1" nextAc="seek">
+              <p:cTn id="2" dur="indefinite" nodeType="mainSeq">
+                <p:childTnLst>
+                  <p:par>
+                    <p:cTn id="3" fill="hold">
+                      <p:stCondLst>
+                        <p:cond delay="indefinite"/>
+                      </p:stCondLst>
+                      <p:childTnLst>
+                        <p:par>
+                          <p:cTn id="4" fill="hold">
+                            <p:stCondLst>
+                              <p:cond delay="0"/>
+                            </p:stCondLst>
+                            <p:childTnLst>
+                              <p:par>
+                                <p:cTn id="5" presetID="1" presetClass="entr" presetSubtype="0" fill="hold" grpId="0" nodeType="clickEffect">
+                                  <p:stCondLst>
+                                    <p:cond delay="0"/>
+                                  </p:stCondLst>
+                                  <p:childTnLst>
+                                    <p:set>
+                                      <p:cBhvr>
+                                        <p:cTn id="6" dur="1" fill="hold">
+                                          <p:stCondLst>
+                                            <p:cond delay="0"/>
+                                          </p:stCondLst>
+                                        </p:cTn>
+                                        <p:tgtEl>
+                                          <p:spTgt spid="3">
+                                            <p:txEl>
+                                              <p:pRg st="0" end="0"/>
+                                            </p:txEl>
+                                          </p:spTgt>
+                                        </p:tgtEl>
+                                        <p:attrNameLst>
+                                          <p:attrName>style.visibility</p:attrName>
+                                        </p:attrNameLst>
+                                      </p:cBhvr>
+                                      <p:to>
+                                        <p:strVal val="visible"/>
+                                      </p:to>
+                                    </p:set>
+                                  </p:childTnLst>
+                                </p:cTn>
+                              </p:par>
+                            </p:childTnLst>
+                          </p:cTn>
+                        </p:par>
+                      </p:childTnLst>
+                    </p:cTn>
+                  </p:par>
+                  <p:par>
+                    <p:cTn id="7" fill="hold">
+                      <p:stCondLst>
+                        <p:cond delay="indefinite"/>
+                      </p:stCondLst>
+                      <p:childTnLst>
+                        <p:par>
+                          <p:cTn id="8" fill="hold">
+                            <p:stCondLst>
+                              <p:cond delay="0"/>
+                            </p:stCondLst>
+                            <p:childTnLst>
+                              <p:par>
+                                <p:cTn id="9" presetID="1" presetClass="entr" presetSubtype="0" fill="hold" grpId="0" nodeType="clickEffect">
+                                  <p:stCondLst>
+                                    <p:cond delay="0"/>
+                                  </p:stCondLst>
+                                  <p:childTnLst>
+                                    <p:set>
+                                      <p:cBhvr>
+                                        <p:cTn id="10" dur="1" fill="hold">
+                                          <p:stCondLst>
+                                            <p:cond delay="0"/>
+                                          </p:stCondLst>
+                                        </p:cTn>
+                                        <p:tgtEl>
+                                          <p:spTgt spid="3">
+                                            <p:txEl>
+                                              <p:pRg st="1" end="1"/>
+                                            </p:txEl>
+                                          </p:spTgt>
+                                        </p:tgtEl>
+                                        <p:attrNameLst>
+                                          <p:attrName>style.visibility</p:attrName>
+                                        </p:attrNameLst>
+                                      </p:cBhvr>
+                                      <p:to>
+                                        <p:strVal val="visible"/>
+                                      </p:to>
+                                    </p:set>
+                                  </p:childTnLst>
+                                </p:cTn>
+                              </p:par>
+                            </p:childTnLst>
+                          </p:cTn>
+                        </p:par>
+                      </p:childTnLst>
+                    </p:cTn>
+                  </p:par>
+                  <p:par>
+                    <p:cTn id="11" fill="hold">
+                      <p:stCondLst>
+                        <p:cond delay="indefinite"/>
+                      </p:stCondLst>
+                      <p:childTnLst>
+                        <p:par>
+                          <p:cTn id="12" fill="hold">
+                            <p:stCondLst>
+                              <p:cond delay="0"/>
+                            </p:stCondLst>
+                            <p:childTnLst>
+                              <p:par>
+                                <p:cTn id="13" presetID="1" presetClass="entr" presetSubtype="0" fill="hold" grpId="0" nodeType="clickEffect">
+                                  <p:stCondLst>
+                                    <p:cond delay="0"/>
+                                  </p:stCondLst>
+                                  <p:childTnLst>
+                                    <p:set>
+                                      <p:cBhvr>
+                                        <p:cTn id="14" dur="1" fill="hold">
+                                          <p:stCondLst>
+                                            <p:cond delay="0"/>
+                                          </p:stCondLst>
+                                        </p:cTn>
+                                        <p:tgtEl>
+                                          <p:spTgt spid="3">
+                                            <p:txEl>
+                                              <p:pRg st="2" end="2"/>
+                                            </p:txEl>
+                                          </p:spTgt>
+                                        </p:tgtEl>
+                                        <p:attrNameLst>
+                                          <p:attrName>style.visibility</p:attrName>
+                                        </p:attrNameLst>
+                                      </p:cBhvr>
+                                      <p:to>
+                                        <p:strVal val="visible"/>
+                                      </p:to>
+                                    </p:set>
+                                  </p:childTnLst>
+                                </p:cTn>
+                              </p:par>
+                              <p:par>
+                                <p:cTn id="15" presetID="1" presetClass="entr" presetSubtype="0" fill="hold" grpId="0" nodeType="withEffect">
+                                  <p:stCondLst>
+                                    <p:cond delay="0"/>
+                                  </p:stCondLst>
+                                  <p:childTnLst>
+                                    <p:set>
+                                      <p:cBhvr>
+                                        <p:cTn id="16" dur="1" fill="hold">
+                                          <p:stCondLst>
+                                            <p:cond delay="0"/>
+                                          </p:stCondLst>
+                                        </p:cTn>
+                                        <p:tgtEl>
+                                          <p:spTgt spid="3">
+                                            <p:txEl>
+                                              <p:pRg st="3" end="3"/>
+                                            </p:txEl>
+                                          </p:spTgt>
+                                        </p:tgtEl>
+                                        <p:attrNameLst>
+                                          <p:attrName>style.visibility</p:attrName>
+                                        </p:attrNameLst>
+                                      </p:cBhvr>
+                                      <p:to>
+                                        <p:strVal val="visible"/>
+                                      </p:to>
+                                    </p:set>
+                                  </p:childTnLst>
+                                </p:cTn>
+                              </p:par>
+                              <p:par>
+                                <p:cTn id="17" presetID="1" presetClass="entr" presetSubtype="0" fill="hold" grpId="0" nodeType="withEffect">
+                                  <p:stCondLst>
+                                    <p:cond delay="0"/>
+                                  </p:stCondLst>
+                                  <p:childTnLst>
+                                    <p:set>
+                                      <p:cBhvr>
+                                        <p:cTn id="18" dur="1" fill="hold">
+                                          <p:stCondLst>
+                                            <p:cond delay="0"/>
+                                          </p:stCondLst>
+                                        </p:cTn>
+                                        <p:tgtEl>
+                                          <p:spTgt spid="3">
+                                            <p:txEl>
+                                              <p:pRg st="4" end="4"/>
+                                            </p:txEl>
+                                          </p:spTgt>
+                                        </p:tgtEl>
+                                        <p:attrNameLst>
+                                          <p:attrName>style.visibility</p:attrName>
+                                        </p:attrNameLst>
+                                      </p:cBhvr>
+                                      <p:to>
+                                        <p:strVal val="visible"/>
+                                      </p:to>
+                                    </p:set>
+                                  </p:childTnLst>
+                                </p:cTn>
+                              </p:par>
+                            </p:childTnLst>
+                          </p:cTn>
+                        </p:par>
+                      </p:childTnLst>
+                    </p:cTn>
+                  </p:par>
+                  <p:par>
+                    <p:cTn id="19" fill="hold">
+                      <p:stCondLst>
+                        <p:cond delay="indefinite"/>
+                      </p:stCondLst>
+                      <p:childTnLst>
+                        <p:par>
+                          <p:cTn id="20" fill="hold">
+                            <p:stCondLst>
+                              <p:cond delay="0"/>
+                            </p:stCondLst>
+                            <p:childTnLst>
+                              <p:par>
+                                <p:cTn id="21" presetID="1" presetClass="entr" presetSubtype="0" fill="hold" grpId="0" nodeType="clickEffect">
+                                  <p:stCondLst>
+                                    <p:cond delay="0"/>
+                                  </p:stCondLst>
+                                  <p:childTnLst>
+                                    <p:set>
+                                      <p:cBhvr>
+                                        <p:cTn id="22" dur="1" fill="hold">
+                                          <p:stCondLst>
+                                            <p:cond delay="0"/>
+                                          </p:stCondLst>
+                                        </p:cTn>
+                                        <p:tgtEl>
+                                          <p:spTgt spid="3">
+                                            <p:txEl>
+                                              <p:pRg st="5" end="5"/>
+                                            </p:txEl>
+                                          </p:spTgt>
+                                        </p:tgtEl>
+                                        <p:attrNameLst>
+                                          <p:attrName>style.visibility</p:attrName>
+                                        </p:attrNameLst>
+                                      </p:cBhvr>
+                                      <p:to>
+                                        <p:strVal val="visible"/>
+                                      </p:to>
+                                    </p:set>
+                                  </p:childTnLst>
+                                </p:cTn>
+                              </p:par>
+                            </p:childTnLst>
+                          </p:cTn>
+                        </p:par>
+                      </p:childTnLst>
+                    </p:cTn>
+                  </p:par>
+                  <p:par>
+                    <p:cTn id="23" fill="hold">
+                      <p:stCondLst>
+                        <p:cond delay="indefinite"/>
+                      </p:stCondLst>
+                      <p:childTnLst>
+                        <p:par>
+                          <p:cTn id="24" fill="hold">
+                            <p:stCondLst>
+                              <p:cond delay="0"/>
+                            </p:stCondLst>
+                            <p:childTnLst>
+                              <p:par>
+                                <p:cTn id="25" presetID="1" presetClass="entr" presetSubtype="0" fill="hold" grpId="0" nodeType="clickEffect">
+                                  <p:stCondLst>
+                                    <p:cond delay="0"/>
+                                  </p:stCondLst>
+                                  <p:childTnLst>
+                                    <p:set>
+                                      <p:cBhvr>
+                                        <p:cTn id="26" dur="1" fill="hold">
+                                          <p:stCondLst>
+                                            <p:cond delay="0"/>
+                                          </p:stCondLst>
+                                        </p:cTn>
+                                        <p:tgtEl>
+                                          <p:spTgt spid="3">
+                                            <p:txEl>
+                                              <p:pRg st="6" end="6"/>
+                                            </p:txEl>
+                                          </p:spTgt>
+                                        </p:tgtEl>
+                                        <p:attrNameLst>
+                                          <p:attrName>style.visibility</p:attrName>
+                                        </p:attrNameLst>
+                                      </p:cBhvr>
+                                      <p:to>
+                                        <p:strVal val="visible"/>
+                                      </p:to>
+                                    </p:set>
+                                  </p:childTnLst>
+                                </p:cTn>
+                              </p:par>
+                            </p:childTnLst>
+                          </p:cTn>
+                        </p:par>
+                      </p:childTnLst>
+                    </p:cTn>
+                  </p:par>
+                  <p:par>
+                    <p:cTn id="27" fill="hold">
+                      <p:stCondLst>
+                        <p:cond delay="indefinite"/>
+                      </p:stCondLst>
+                      <p:childTnLst>
+                        <p:par>
+                          <p:cTn id="28" fill="hold">
+                            <p:stCondLst>
+                              <p:cond delay="0"/>
+                            </p:stCondLst>
+                            <p:childTnLst>
+                              <p:par>
+                                <p:cTn id="29" presetID="1" presetClass="entr" presetSubtype="0" fill="hold" grpId="0" nodeType="clickEffect">
+                                  <p:stCondLst>
+                                    <p:cond delay="0"/>
+                                  </p:stCondLst>
+                                  <p:childTnLst>
+                                    <p:set>
+                                      <p:cBhvr>
+                                        <p:cTn id="30" dur="1" fill="hold">
+                                          <p:stCondLst>
+                                            <p:cond delay="0"/>
+                                          </p:stCondLst>
+                                        </p:cTn>
+                                        <p:tgtEl>
+                                          <p:spTgt spid="3">
+                                            <p:txEl>
+                                              <p:pRg st="7" end="7"/>
+                                            </p:txEl>
+                                          </p:spTgt>
+                                        </p:tgtEl>
+                                        <p:attrNameLst>
+                                          <p:attrName>style.visibility</p:attrName>
+                                        </p:attrNameLst>
+                                      </p:cBhvr>
+                                      <p:to>
+                                        <p:strVal val="visible"/>
+                                      </p:to>
+                                    </p:set>
+                                  </p:childTnLst>
+                                </p:cTn>
+                              </p:par>
+                            </p:childTnLst>
+                          </p:cTn>
+                        </p:par>
+                      </p:childTnLst>
+                    </p:cTn>
+                  </p:par>
+                </p:childTnLst>
+              </p:cTn>
+              <p:prevCondLst>
+                <p:cond evt="onPrev" delay="0">
+                  <p:tgtEl>
+                    <p:sldTgt/>
+                  </p:tgtEl>
+                </p:cond>
+              </p:prevCondLst>
+              <p:nextCondLst>
+                <p:cond evt="onNext" delay="0">
+                  <p:tgtEl>
+                    <p:sldTgt/>
+                  </p:tgtEl>
+                </p:cond>
+              </p:nextCondLst>
+            </p:seq>
+          </p:childTnLst>
+        </p:cTn>
+      </p:par>
+    </p:tnLst>
+    <p:bldLst>
+      <p:bldP spid="3" grpId="0" build="p"/>
+    </p:bldLst>
+  </p:timing>
 </p:sld>
 </file>
 
@@ -20803,7 +22181,7 @@
           <a:p>
             <a:r>
               <a:rPr lang="en-US" dirty="0"/>
-              <a:t>Code Reviews – Benefits (2)</a:t>
+              <a:t>Code Reviews – Benefits</a:t>
             </a:r>
           </a:p>
         </p:txBody>

</xml_diff>

<commit_message>
Update presentation with remote collaboration tools for VS Code and PyCharm
</commit_message>
<xml_diff>
--- a/presentations/CollaborativeConstruction.pptx
+++ b/presentations/CollaborativeConstruction.pptx
@@ -5,7 +5,7 @@
     <p:sldMasterId id="2147483648" r:id="rId1"/>
   </p:sldMasterIdLst>
   <p:notesMasterIdLst>
-    <p:notesMasterId r:id="rId32"/>
+    <p:notesMasterId r:id="rId33"/>
   </p:notesMasterIdLst>
   <p:sldIdLst>
     <p:sldId id="256" r:id="rId2"/>
@@ -34,10 +34,11 @@
     <p:sldId id="456" r:id="rId25"/>
     <p:sldId id="453" r:id="rId26"/>
     <p:sldId id="440" r:id="rId27"/>
-    <p:sldId id="457" r:id="rId28"/>
-    <p:sldId id="459" r:id="rId29"/>
-    <p:sldId id="458" r:id="rId30"/>
-    <p:sldId id="460" r:id="rId31"/>
+    <p:sldId id="461" r:id="rId28"/>
+    <p:sldId id="457" r:id="rId29"/>
+    <p:sldId id="459" r:id="rId30"/>
+    <p:sldId id="458" r:id="rId31"/>
+    <p:sldId id="460" r:id="rId32"/>
   </p:sldIdLst>
   <p:sldSz cx="12192000" cy="6858000"/>
   <p:notesSz cx="6858000" cy="9144000"/>
@@ -226,7 +227,7 @@
           <a:p>
             <a:fld id="{030160F6-98F2-C24A-A79A-6A89FCFB074E}" type="datetimeFigureOut">
               <a:rPr lang="en-US" smtClean="0"/>
-              <a:t>7/7/23</a:t>
+              <a:t>7/12/23</a:t>
             </a:fld>
             <a:endParaRPr lang="en-US"/>
           </a:p>
@@ -2012,7 +2013,7 @@
     </p:spTree>
     <p:extLst>
       <p:ext uri="{BB962C8B-B14F-4D97-AF65-F5344CB8AC3E}">
-        <p14:creationId xmlns:p14="http://schemas.microsoft.com/office/powerpoint/2010/main" val="533247099"/>
+        <p14:creationId xmlns:p14="http://schemas.microsoft.com/office/powerpoint/2010/main" val="4232378189"/>
       </p:ext>
     </p:extLst>
   </p:cSld>
@@ -2066,7 +2067,7 @@
           <a:bodyPr/>
           <a:lstStyle/>
           <a:p>
-            <a:endParaRPr lang="en-US" dirty="0"/>
+            <a:endParaRPr lang="en-US"/>
           </a:p>
         </p:txBody>
       </p:sp>
@@ -2096,7 +2097,7 @@
     </p:spTree>
     <p:extLst>
       <p:ext uri="{BB962C8B-B14F-4D97-AF65-F5344CB8AC3E}">
-        <p14:creationId xmlns:p14="http://schemas.microsoft.com/office/powerpoint/2010/main" val="1557858821"/>
+        <p14:creationId xmlns:p14="http://schemas.microsoft.com/office/powerpoint/2010/main" val="533247099"/>
       </p:ext>
     </p:extLst>
   </p:cSld>
@@ -2150,7 +2151,7 @@
           <a:bodyPr/>
           <a:lstStyle/>
           <a:p>
-            <a:endParaRPr lang="en-US"/>
+            <a:endParaRPr lang="en-US" dirty="0"/>
           </a:p>
         </p:txBody>
       </p:sp>
@@ -2180,7 +2181,7 @@
     </p:spTree>
     <p:extLst>
       <p:ext uri="{BB962C8B-B14F-4D97-AF65-F5344CB8AC3E}">
-        <p14:creationId xmlns:p14="http://schemas.microsoft.com/office/powerpoint/2010/main" val="2681094941"/>
+        <p14:creationId xmlns:p14="http://schemas.microsoft.com/office/powerpoint/2010/main" val="1557858821"/>
       </p:ext>
     </p:extLst>
   </p:cSld>
@@ -2256,6 +2257,90 @@
             <a:fld id="{2744C287-4C1B-E44A-A5AD-508A7D1413E1}" type="slidenum">
               <a:rPr lang="en-US" smtClean="0"/>
               <a:t>30</a:t>
+            </a:fld>
+            <a:endParaRPr lang="en-US"/>
+          </a:p>
+        </p:txBody>
+      </p:sp>
+    </p:spTree>
+    <p:extLst>
+      <p:ext uri="{BB962C8B-B14F-4D97-AF65-F5344CB8AC3E}">
+        <p14:creationId xmlns:p14="http://schemas.microsoft.com/office/powerpoint/2010/main" val="2681094941"/>
+      </p:ext>
+    </p:extLst>
+  </p:cSld>
+  <p:clrMapOvr>
+    <a:masterClrMapping/>
+  </p:clrMapOvr>
+</p:notes>
+</file>
+
+<file path=ppt/notesSlides/notesSlide27.xml><?xml version="1.0" encoding="utf-8"?>
+<p:notes xmlns:a="http://schemas.openxmlformats.org/drawingml/2006/main" xmlns:r="http://schemas.openxmlformats.org/officeDocument/2006/relationships" xmlns:p="http://schemas.openxmlformats.org/presentationml/2006/main">
+  <p:cSld>
+    <p:spTree>
+      <p:nvGrpSpPr>
+        <p:cNvPr id="1" name=""/>
+        <p:cNvGrpSpPr/>
+        <p:nvPr/>
+      </p:nvGrpSpPr>
+      <p:grpSpPr>
+        <a:xfrm>
+          <a:off x="0" y="0"/>
+          <a:ext cx="0" cy="0"/>
+          <a:chOff x="0" y="0"/>
+          <a:chExt cx="0" cy="0"/>
+        </a:xfrm>
+      </p:grpSpPr>
+      <p:sp>
+        <p:nvSpPr>
+          <p:cNvPr id="2" name="Slide Image Placeholder 1"/>
+          <p:cNvSpPr>
+            <a:spLocks noGrp="1" noRot="1" noChangeAspect="1"/>
+          </p:cNvSpPr>
+          <p:nvPr>
+            <p:ph type="sldImg"/>
+          </p:nvPr>
+        </p:nvSpPr>
+        <p:spPr/>
+      </p:sp>
+      <p:sp>
+        <p:nvSpPr>
+          <p:cNvPr id="3" name="Notes Placeholder 2"/>
+          <p:cNvSpPr>
+            <a:spLocks noGrp="1"/>
+          </p:cNvSpPr>
+          <p:nvPr>
+            <p:ph type="body" idx="1"/>
+          </p:nvPr>
+        </p:nvSpPr>
+        <p:spPr/>
+        <p:txBody>
+          <a:bodyPr/>
+          <a:lstStyle/>
+          <a:p>
+            <a:endParaRPr lang="en-US"/>
+          </a:p>
+        </p:txBody>
+      </p:sp>
+      <p:sp>
+        <p:nvSpPr>
+          <p:cNvPr id="4" name="Slide Number Placeholder 3"/>
+          <p:cNvSpPr>
+            <a:spLocks noGrp="1"/>
+          </p:cNvSpPr>
+          <p:nvPr>
+            <p:ph type="sldNum" sz="quarter" idx="5"/>
+          </p:nvPr>
+        </p:nvSpPr>
+        <p:spPr/>
+        <p:txBody>
+          <a:bodyPr/>
+          <a:lstStyle/>
+          <a:p>
+            <a:fld id="{2744C287-4C1B-E44A-A5AD-508A7D1413E1}" type="slidenum">
+              <a:rPr lang="en-US" smtClean="0"/>
+              <a:t>31</a:t>
             </a:fld>
             <a:endParaRPr lang="en-US"/>
           </a:p>
@@ -3134,7 +3219,7 @@
           <a:p>
             <a:fld id="{08C581B1-DAA2-9C48-ABD7-FAFF9FA89AAC}" type="datetime1">
               <a:rPr lang="en-US" smtClean="0"/>
-              <a:t>7/7/23</a:t>
+              <a:t>7/12/23</a:t>
             </a:fld>
             <a:endParaRPr lang="en-US"/>
           </a:p>
@@ -3332,7 +3417,7 @@
           <a:p>
             <a:fld id="{5C4569D4-F8BB-B24C-B4C5-11F11B806914}" type="datetime1">
               <a:rPr lang="en-US" smtClean="0"/>
-              <a:t>7/7/23</a:t>
+              <a:t>7/12/23</a:t>
             </a:fld>
             <a:endParaRPr lang="en-US"/>
           </a:p>
@@ -3540,7 +3625,7 @@
           <a:p>
             <a:fld id="{6AF1A67B-19C6-1047-A8FA-1C51D015C9A7}" type="datetime1">
               <a:rPr lang="en-US" smtClean="0"/>
-              <a:t>7/7/23</a:t>
+              <a:t>7/12/23</a:t>
             </a:fld>
             <a:endParaRPr lang="en-US"/>
           </a:p>
@@ -3738,7 +3823,7 @@
           <a:p>
             <a:fld id="{AC3C37EA-9CD2-5540-9C35-9542270D84DB}" type="datetime1">
               <a:rPr lang="en-US" smtClean="0"/>
-              <a:t>7/7/23</a:t>
+              <a:t>7/12/23</a:t>
             </a:fld>
             <a:endParaRPr lang="en-US"/>
           </a:p>
@@ -4013,7 +4098,7 @@
           <a:p>
             <a:fld id="{FC1B75E7-89CF-1E45-BF16-1E75DA4C4E16}" type="datetime1">
               <a:rPr lang="en-US" smtClean="0"/>
-              <a:t>7/7/23</a:t>
+              <a:t>7/12/23</a:t>
             </a:fld>
             <a:endParaRPr lang="en-US"/>
           </a:p>
@@ -4278,7 +4363,7 @@
           <a:p>
             <a:fld id="{F316FCF8-4319-A24E-8E69-D9D8CE7C84E8}" type="datetime1">
               <a:rPr lang="en-US" smtClean="0"/>
-              <a:t>7/7/23</a:t>
+              <a:t>7/12/23</a:t>
             </a:fld>
             <a:endParaRPr lang="en-US"/>
           </a:p>
@@ -4690,7 +4775,7 @@
           <a:p>
             <a:fld id="{3B768517-59A8-D141-A1F7-9FD956299CC2}" type="datetime1">
               <a:rPr lang="en-US" smtClean="0"/>
-              <a:t>7/7/23</a:t>
+              <a:t>7/12/23</a:t>
             </a:fld>
             <a:endParaRPr lang="en-US"/>
           </a:p>
@@ -4831,7 +4916,7 @@
           <a:p>
             <a:fld id="{D5026A61-9113-EA47-BA38-9D40B31CE670}" type="datetime1">
               <a:rPr lang="en-US" smtClean="0"/>
-              <a:t>7/7/23</a:t>
+              <a:t>7/12/23</a:t>
             </a:fld>
             <a:endParaRPr lang="en-US"/>
           </a:p>
@@ -4944,7 +5029,7 @@
           <a:p>
             <a:fld id="{06155294-0F32-9347-AEA9-D636AE777EEC}" type="datetime1">
               <a:rPr lang="en-US" smtClean="0"/>
-              <a:t>7/7/23</a:t>
+              <a:t>7/12/23</a:t>
             </a:fld>
             <a:endParaRPr lang="en-US"/>
           </a:p>
@@ -5255,7 +5340,7 @@
           <a:p>
             <a:fld id="{F1632DEE-EE21-344B-B206-B4CF92AEB0C1}" type="datetime1">
               <a:rPr lang="en-US" smtClean="0"/>
-              <a:t>7/7/23</a:t>
+              <a:t>7/12/23</a:t>
             </a:fld>
             <a:endParaRPr lang="en-US"/>
           </a:p>
@@ -5543,7 +5628,7 @@
           <a:p>
             <a:fld id="{483A1F3C-033A-664D-BF85-972B07A45245}" type="datetime1">
               <a:rPr lang="en-US" smtClean="0"/>
-              <a:t>7/7/23</a:t>
+              <a:t>7/12/23</a:t>
             </a:fld>
             <a:endParaRPr lang="en-US"/>
           </a:p>
@@ -5784,7 +5869,7 @@
           <a:p>
             <a:fld id="{08E6E954-0FD8-6144-BEFF-FA15B968A577}" type="datetime1">
               <a:rPr lang="en-US" smtClean="0"/>
-              <a:t>7/7/23</a:t>
+              <a:t>7/12/23</a:t>
             </a:fld>
             <a:endParaRPr lang="en-US"/>
           </a:p>
@@ -17307,7 +17392,7 @@
           <p:cNvPr id="2" name="Title 1">
             <a:extLst>
               <a:ext uri="{FF2B5EF4-FFF2-40B4-BE49-F238E27FC236}">
-                <a16:creationId xmlns:a16="http://schemas.microsoft.com/office/drawing/2014/main" id="{CB4904E7-362A-F306-C1DD-9F922DC487E6}"/>
+                <a16:creationId xmlns:a16="http://schemas.microsoft.com/office/drawing/2014/main" id="{56ED8624-A4E8-488C-6DF9-CD8A849FC2E1}"/>
               </a:ext>
             </a:extLst>
           </p:cNvPr>
@@ -17325,7 +17410,14 @@
           <a:p>
             <a:r>
               <a:rPr lang="en-US" dirty="0"/>
-              <a:t>Pair Programming Activity — Setup</a:t>
+              <a:t>Pair Programming —</a:t>
+            </a:r>
+            <a:br>
+              <a:rPr lang="en-US" dirty="0"/>
+            </a:br>
+            <a:r>
+              <a:rPr lang="en-US" dirty="0"/>
+              <a:t>Tools for Remote (or local) Collaboration</a:t>
             </a:r>
           </a:p>
         </p:txBody>
@@ -17335,7 +17427,7 @@
           <p:cNvPr id="3" name="Content Placeholder 2">
             <a:extLst>
               <a:ext uri="{FF2B5EF4-FFF2-40B4-BE49-F238E27FC236}">
-                <a16:creationId xmlns:a16="http://schemas.microsoft.com/office/drawing/2014/main" id="{F3052A98-7B04-354A-AE82-1EA571ECE677}"/>
+                <a16:creationId xmlns:a16="http://schemas.microsoft.com/office/drawing/2014/main" id="{84E4B5B8-E30A-4105-FA2A-C423F60CE90A}"/>
               </a:ext>
             </a:extLst>
           </p:cNvPr>
@@ -17348,84 +17440,46 @@
         </p:nvSpPr>
         <p:spPr/>
         <p:txBody>
-          <a:bodyPr>
-            <a:normAutofit/>
-          </a:bodyPr>
+          <a:bodyPr/>
           <a:lstStyle/>
           <a:p>
             <a:r>
-              <a:rPr lang="en-US" dirty="0"/>
-              <a:t>Pair up with someone</a:t>
-            </a:r>
-          </a:p>
-          <a:p>
-            <a:r>
-              <a:rPr lang="en-US" dirty="0"/>
-              <a:t>Clone the “Code-Review” repo</a:t>
+              <a:rPr lang="en-US" baseline="0" dirty="0"/>
+              <a:t>VS Code</a:t>
             </a:r>
           </a:p>
           <a:p>
             <a:pPr lvl="1"/>
             <a:r>
               <a:rPr lang="en-US" dirty="0"/>
-              <a:t>What you need for this activity is in the “activity” folder</a:t>
-            </a:r>
-          </a:p>
-          <a:p>
-            <a:r>
-              <a:rPr lang="en-US" dirty="0"/>
-              <a:t>Make sure it runs on your system:</a:t>
+              <a:t>Live Share extension from Microsoft</a:t>
+            </a:r>
+          </a:p>
+          <a:p>
+            <a:r>
+              <a:rPr lang="en-US" dirty="0"/>
+              <a:t>PyCharm (and other JetBrains IDEs)</a:t>
             </a:r>
           </a:p>
           <a:p>
             <a:pPr lvl="1"/>
             <a:r>
               <a:rPr lang="en-US" dirty="0"/>
-              <a:t>Run “python3 </a:t>
-            </a:r>
-            <a:r>
-              <a:rPr lang="en-US" dirty="0" err="1"/>
-              <a:t>inklimit.py</a:t>
-            </a:r>
-            <a:r>
-              <a:rPr lang="en-US" dirty="0"/>
-              <a:t> </a:t>
-            </a:r>
-            <a:r>
-              <a:rPr lang="en-US" dirty="0" err="1"/>
-              <a:t>testimage.tiff</a:t>
-            </a:r>
-            <a:r>
-              <a:rPr lang="en-US" dirty="0"/>
-              <a:t> </a:t>
-            </a:r>
-            <a:r>
-              <a:rPr lang="en-US" dirty="0" err="1"/>
-              <a:t>outimage.tiff</a:t>
-            </a:r>
-            <a:r>
-              <a:rPr lang="en-US" dirty="0"/>
-              <a:t>”</a:t>
+              <a:t>Code With Me plug-in</a:t>
+            </a:r>
+          </a:p>
+          <a:p>
+            <a:pPr lvl="0"/>
+            <a:r>
+              <a:rPr lang="en-US" dirty="0"/>
+              <a:t>Generic</a:t>
             </a:r>
           </a:p>
           <a:p>
             <a:pPr lvl="1"/>
             <a:r>
               <a:rPr lang="en-US" dirty="0"/>
-              <a:t>Install any missing modules using “pip3 install &lt;module&gt;”</a:t>
-            </a:r>
-          </a:p>
-          <a:p>
-            <a:r>
-              <a:rPr lang="en-US" dirty="0"/>
-              <a:t>Make sure you can view the input and your output image files</a:t>
-            </a:r>
-          </a:p>
-          <a:p>
-            <a:pPr lvl="1"/>
-            <a:r>
-              <a:rPr lang="en-US" dirty="0"/>
-              <a:t>How to do that depends on your system</a:t>
+              <a:t>Zoom (or equivalent) shared desktop</a:t>
             </a:r>
           </a:p>
         </p:txBody>
@@ -17435,7 +17489,7 @@
           <p:cNvPr id="4" name="Slide Number Placeholder 3">
             <a:extLst>
               <a:ext uri="{FF2B5EF4-FFF2-40B4-BE49-F238E27FC236}">
-                <a16:creationId xmlns:a16="http://schemas.microsoft.com/office/drawing/2014/main" id="{89F6ABCD-29D6-42C7-482F-EF9EF8DD81DF}"/>
+                <a16:creationId xmlns:a16="http://schemas.microsoft.com/office/drawing/2014/main" id="{9FD13DEF-B3F6-06ED-8E19-ADD38CBCB6A8}"/>
               </a:ext>
             </a:extLst>
           </p:cNvPr>
@@ -17462,7 +17516,7 @@
     </p:spTree>
     <p:extLst>
       <p:ext uri="{BB962C8B-B14F-4D97-AF65-F5344CB8AC3E}">
-        <p14:creationId xmlns:p14="http://schemas.microsoft.com/office/powerpoint/2010/main" val="245358514"/>
+        <p14:creationId xmlns:p14="http://schemas.microsoft.com/office/powerpoint/2010/main" val="981711242"/>
       </p:ext>
     </p:extLst>
   </p:cSld>
@@ -17569,8 +17623,556 @@
                                   </p:childTnLst>
                                 </p:cTn>
                               </p:par>
+                            </p:childTnLst>
+                          </p:cTn>
+                        </p:par>
+                      </p:childTnLst>
+                    </p:cTn>
+                  </p:par>
+                  <p:par>
+                    <p:cTn id="11" fill="hold">
+                      <p:stCondLst>
+                        <p:cond delay="indefinite"/>
+                      </p:stCondLst>
+                      <p:childTnLst>
+                        <p:par>
+                          <p:cTn id="12" fill="hold">
+                            <p:stCondLst>
+                              <p:cond delay="0"/>
+                            </p:stCondLst>
+                            <p:childTnLst>
                               <p:par>
-                                <p:cTn id="11" presetID="1" presetClass="entr" presetSubtype="0" fill="hold" grpId="0" nodeType="withEffect">
+                                <p:cTn id="13" presetID="1" presetClass="entr" presetSubtype="0" fill="hold" grpId="0" nodeType="clickEffect">
+                                  <p:stCondLst>
+                                    <p:cond delay="0"/>
+                                  </p:stCondLst>
+                                  <p:childTnLst>
+                                    <p:set>
+                                      <p:cBhvr>
+                                        <p:cTn id="14" dur="1" fill="hold">
+                                          <p:stCondLst>
+                                            <p:cond delay="0"/>
+                                          </p:stCondLst>
+                                        </p:cTn>
+                                        <p:tgtEl>
+                                          <p:spTgt spid="3">
+                                            <p:txEl>
+                                              <p:pRg st="2" end="2"/>
+                                            </p:txEl>
+                                          </p:spTgt>
+                                        </p:tgtEl>
+                                        <p:attrNameLst>
+                                          <p:attrName>style.visibility</p:attrName>
+                                        </p:attrNameLst>
+                                      </p:cBhvr>
+                                      <p:to>
+                                        <p:strVal val="visible"/>
+                                      </p:to>
+                                    </p:set>
+                                  </p:childTnLst>
+                                </p:cTn>
+                              </p:par>
+                            </p:childTnLst>
+                          </p:cTn>
+                        </p:par>
+                      </p:childTnLst>
+                    </p:cTn>
+                  </p:par>
+                  <p:par>
+                    <p:cTn id="15" fill="hold">
+                      <p:stCondLst>
+                        <p:cond delay="indefinite"/>
+                      </p:stCondLst>
+                      <p:childTnLst>
+                        <p:par>
+                          <p:cTn id="16" fill="hold">
+                            <p:stCondLst>
+                              <p:cond delay="0"/>
+                            </p:stCondLst>
+                            <p:childTnLst>
+                              <p:par>
+                                <p:cTn id="17" presetID="1" presetClass="entr" presetSubtype="0" fill="hold" grpId="0" nodeType="clickEffect">
+                                  <p:stCondLst>
+                                    <p:cond delay="0"/>
+                                  </p:stCondLst>
+                                  <p:childTnLst>
+                                    <p:set>
+                                      <p:cBhvr>
+                                        <p:cTn id="18" dur="1" fill="hold">
+                                          <p:stCondLst>
+                                            <p:cond delay="0"/>
+                                          </p:stCondLst>
+                                        </p:cTn>
+                                        <p:tgtEl>
+                                          <p:spTgt spid="3">
+                                            <p:txEl>
+                                              <p:pRg st="3" end="3"/>
+                                            </p:txEl>
+                                          </p:spTgt>
+                                        </p:tgtEl>
+                                        <p:attrNameLst>
+                                          <p:attrName>style.visibility</p:attrName>
+                                        </p:attrNameLst>
+                                      </p:cBhvr>
+                                      <p:to>
+                                        <p:strVal val="visible"/>
+                                      </p:to>
+                                    </p:set>
+                                  </p:childTnLst>
+                                </p:cTn>
+                              </p:par>
+                            </p:childTnLst>
+                          </p:cTn>
+                        </p:par>
+                      </p:childTnLst>
+                    </p:cTn>
+                  </p:par>
+                  <p:par>
+                    <p:cTn id="19" fill="hold">
+                      <p:stCondLst>
+                        <p:cond delay="indefinite"/>
+                      </p:stCondLst>
+                      <p:childTnLst>
+                        <p:par>
+                          <p:cTn id="20" fill="hold">
+                            <p:stCondLst>
+                              <p:cond delay="0"/>
+                            </p:stCondLst>
+                            <p:childTnLst>
+                              <p:par>
+                                <p:cTn id="21" presetID="1" presetClass="entr" presetSubtype="0" fill="hold" grpId="0" nodeType="clickEffect">
+                                  <p:stCondLst>
+                                    <p:cond delay="0"/>
+                                  </p:stCondLst>
+                                  <p:childTnLst>
+                                    <p:set>
+                                      <p:cBhvr>
+                                        <p:cTn id="22" dur="1" fill="hold">
+                                          <p:stCondLst>
+                                            <p:cond delay="0"/>
+                                          </p:stCondLst>
+                                        </p:cTn>
+                                        <p:tgtEl>
+                                          <p:spTgt spid="3">
+                                            <p:txEl>
+                                              <p:pRg st="4" end="4"/>
+                                            </p:txEl>
+                                          </p:spTgt>
+                                        </p:tgtEl>
+                                        <p:attrNameLst>
+                                          <p:attrName>style.visibility</p:attrName>
+                                        </p:attrNameLst>
+                                      </p:cBhvr>
+                                      <p:to>
+                                        <p:strVal val="visible"/>
+                                      </p:to>
+                                    </p:set>
+                                  </p:childTnLst>
+                                </p:cTn>
+                              </p:par>
+                            </p:childTnLst>
+                          </p:cTn>
+                        </p:par>
+                      </p:childTnLst>
+                    </p:cTn>
+                  </p:par>
+                  <p:par>
+                    <p:cTn id="23" fill="hold">
+                      <p:stCondLst>
+                        <p:cond delay="indefinite"/>
+                      </p:stCondLst>
+                      <p:childTnLst>
+                        <p:par>
+                          <p:cTn id="24" fill="hold">
+                            <p:stCondLst>
+                              <p:cond delay="0"/>
+                            </p:stCondLst>
+                            <p:childTnLst>
+                              <p:par>
+                                <p:cTn id="25" presetID="1" presetClass="entr" presetSubtype="0" fill="hold" grpId="0" nodeType="clickEffect">
+                                  <p:stCondLst>
+                                    <p:cond delay="0"/>
+                                  </p:stCondLst>
+                                  <p:childTnLst>
+                                    <p:set>
+                                      <p:cBhvr>
+                                        <p:cTn id="26" dur="1" fill="hold">
+                                          <p:stCondLst>
+                                            <p:cond delay="0"/>
+                                          </p:stCondLst>
+                                        </p:cTn>
+                                        <p:tgtEl>
+                                          <p:spTgt spid="3">
+                                            <p:txEl>
+                                              <p:pRg st="5" end="5"/>
+                                            </p:txEl>
+                                          </p:spTgt>
+                                        </p:tgtEl>
+                                        <p:attrNameLst>
+                                          <p:attrName>style.visibility</p:attrName>
+                                        </p:attrNameLst>
+                                      </p:cBhvr>
+                                      <p:to>
+                                        <p:strVal val="visible"/>
+                                      </p:to>
+                                    </p:set>
+                                  </p:childTnLst>
+                                </p:cTn>
+                              </p:par>
+                            </p:childTnLst>
+                          </p:cTn>
+                        </p:par>
+                      </p:childTnLst>
+                    </p:cTn>
+                  </p:par>
+                </p:childTnLst>
+              </p:cTn>
+              <p:prevCondLst>
+                <p:cond evt="onPrev" delay="0">
+                  <p:tgtEl>
+                    <p:sldTgt/>
+                  </p:tgtEl>
+                </p:cond>
+              </p:prevCondLst>
+              <p:nextCondLst>
+                <p:cond evt="onNext" delay="0">
+                  <p:tgtEl>
+                    <p:sldTgt/>
+                  </p:tgtEl>
+                </p:cond>
+              </p:nextCondLst>
+            </p:seq>
+          </p:childTnLst>
+        </p:cTn>
+      </p:par>
+    </p:tnLst>
+    <p:bldLst>
+      <p:bldP spid="3" grpId="0" build="p" bldLvl="2"/>
+    </p:bldLst>
+  </p:timing>
+</p:sld>
+</file>
+
+<file path=ppt/slides/slide28.xml><?xml version="1.0" encoding="utf-8"?>
+<p:sld xmlns:a="http://schemas.openxmlformats.org/drawingml/2006/main" xmlns:r="http://schemas.openxmlformats.org/officeDocument/2006/relationships" xmlns:p="http://schemas.openxmlformats.org/presentationml/2006/main">
+  <p:cSld>
+    <p:spTree>
+      <p:nvGrpSpPr>
+        <p:cNvPr id="1" name=""/>
+        <p:cNvGrpSpPr/>
+        <p:nvPr/>
+      </p:nvGrpSpPr>
+      <p:grpSpPr>
+        <a:xfrm>
+          <a:off x="0" y="0"/>
+          <a:ext cx="0" cy="0"/>
+          <a:chOff x="0" y="0"/>
+          <a:chExt cx="0" cy="0"/>
+        </a:xfrm>
+      </p:grpSpPr>
+      <p:sp>
+        <p:nvSpPr>
+          <p:cNvPr id="2" name="Title 1">
+            <a:extLst>
+              <a:ext uri="{FF2B5EF4-FFF2-40B4-BE49-F238E27FC236}">
+                <a16:creationId xmlns:a16="http://schemas.microsoft.com/office/drawing/2014/main" id="{CB4904E7-362A-F306-C1DD-9F922DC487E6}"/>
+              </a:ext>
+            </a:extLst>
+          </p:cNvPr>
+          <p:cNvSpPr>
+            <a:spLocks noGrp="1"/>
+          </p:cNvSpPr>
+          <p:nvPr>
+            <p:ph type="title"/>
+          </p:nvPr>
+        </p:nvSpPr>
+        <p:spPr/>
+        <p:txBody>
+          <a:bodyPr/>
+          <a:lstStyle/>
+          <a:p>
+            <a:r>
+              <a:rPr lang="en-US" dirty="0"/>
+              <a:t>Pair Programming Activity — Setup</a:t>
+            </a:r>
+          </a:p>
+        </p:txBody>
+      </p:sp>
+      <p:sp>
+        <p:nvSpPr>
+          <p:cNvPr id="3" name="Content Placeholder 2">
+            <a:extLst>
+              <a:ext uri="{FF2B5EF4-FFF2-40B4-BE49-F238E27FC236}">
+                <a16:creationId xmlns:a16="http://schemas.microsoft.com/office/drawing/2014/main" id="{F3052A98-7B04-354A-AE82-1EA571ECE677}"/>
+              </a:ext>
+            </a:extLst>
+          </p:cNvPr>
+          <p:cNvSpPr>
+            <a:spLocks noGrp="1"/>
+          </p:cNvSpPr>
+          <p:nvPr>
+            <p:ph idx="1"/>
+          </p:nvPr>
+        </p:nvSpPr>
+        <p:spPr>
+          <a:xfrm>
+            <a:off x="838200" y="1825625"/>
+            <a:ext cx="9448800" cy="4351338"/>
+          </a:xfrm>
+        </p:spPr>
+        <p:txBody>
+          <a:bodyPr>
+            <a:normAutofit fontScale="92500" lnSpcReduction="10000"/>
+          </a:bodyPr>
+          <a:lstStyle/>
+          <a:p>
+            <a:r>
+              <a:rPr lang="en-US" dirty="0"/>
+              <a:t>Pair up with someone</a:t>
+            </a:r>
+          </a:p>
+          <a:p>
+            <a:pPr lvl="1"/>
+            <a:r>
+              <a:rPr lang="en-US" dirty="0"/>
+              <a:t>Install Live Share or Code With Me if you use VS Code or PyCharm and want to try it</a:t>
+            </a:r>
+          </a:p>
+          <a:p>
+            <a:r>
+              <a:rPr lang="en-US" dirty="0"/>
+              <a:t>Clone the “Code-Review” repo</a:t>
+            </a:r>
+          </a:p>
+          <a:p>
+            <a:pPr lvl="1"/>
+            <a:r>
+              <a:rPr lang="en-US" dirty="0">
+                <a:hlinkClick r:id="rId3"/>
+              </a:rPr>
+              <a:t>https://github.com/INTERSECT-training/Code-Review</a:t>
+            </a:r>
+            <a:endParaRPr lang="en-US" dirty="0"/>
+          </a:p>
+          <a:p>
+            <a:pPr lvl="1"/>
+            <a:r>
+              <a:rPr lang="en-US" dirty="0"/>
+              <a:t>What you need for this activity is in the “activity” folder</a:t>
+            </a:r>
+          </a:p>
+          <a:p>
+            <a:r>
+              <a:rPr lang="en-US" dirty="0"/>
+              <a:t>Make sure it runs on your system:</a:t>
+            </a:r>
+          </a:p>
+          <a:p>
+            <a:pPr lvl="1"/>
+            <a:r>
+              <a:rPr lang="en-US" dirty="0"/>
+              <a:t>Run “python3 </a:t>
+            </a:r>
+            <a:r>
+              <a:rPr lang="en-US" dirty="0" err="1"/>
+              <a:t>inklimit.py</a:t>
+            </a:r>
+            <a:r>
+              <a:rPr lang="en-US" dirty="0"/>
+              <a:t> </a:t>
+            </a:r>
+            <a:r>
+              <a:rPr lang="en-US" dirty="0" err="1"/>
+              <a:t>testimage.tiff</a:t>
+            </a:r>
+            <a:r>
+              <a:rPr lang="en-US" dirty="0"/>
+              <a:t> </a:t>
+            </a:r>
+            <a:r>
+              <a:rPr lang="en-US" dirty="0" err="1"/>
+              <a:t>outimage.tiff</a:t>
+            </a:r>
+            <a:r>
+              <a:rPr lang="en-US" dirty="0"/>
+              <a:t>”</a:t>
+            </a:r>
+          </a:p>
+          <a:p>
+            <a:pPr lvl="1"/>
+            <a:r>
+              <a:rPr lang="en-US" dirty="0"/>
+              <a:t>Install any missing modules using “pip3 install”</a:t>
+            </a:r>
+          </a:p>
+          <a:p>
+            <a:pPr lvl="2"/>
+            <a:r>
+              <a:rPr lang="en-US" dirty="0"/>
+              <a:t>E.g. pip3 install </a:t>
+            </a:r>
+            <a:r>
+              <a:rPr lang="en-US" dirty="0" err="1"/>
+              <a:t>tifffile</a:t>
+            </a:r>
+            <a:endParaRPr lang="en-US" dirty="0"/>
+          </a:p>
+          <a:p>
+            <a:r>
+              <a:rPr lang="en-US" dirty="0"/>
+              <a:t>Make sure you can view the input and your output image files</a:t>
+            </a:r>
+          </a:p>
+          <a:p>
+            <a:pPr lvl="1"/>
+            <a:r>
+              <a:rPr lang="en-US" dirty="0"/>
+              <a:t>How to do that depends on your system</a:t>
+            </a:r>
+          </a:p>
+        </p:txBody>
+      </p:sp>
+      <p:sp>
+        <p:nvSpPr>
+          <p:cNvPr id="4" name="Slide Number Placeholder 3">
+            <a:extLst>
+              <a:ext uri="{FF2B5EF4-FFF2-40B4-BE49-F238E27FC236}">
+                <a16:creationId xmlns:a16="http://schemas.microsoft.com/office/drawing/2014/main" id="{89F6ABCD-29D6-42C7-482F-EF9EF8DD81DF}"/>
+              </a:ext>
+            </a:extLst>
+          </p:cNvPr>
+          <p:cNvSpPr>
+            <a:spLocks noGrp="1"/>
+          </p:cNvSpPr>
+          <p:nvPr>
+            <p:ph type="sldNum" sz="quarter" idx="12"/>
+          </p:nvPr>
+        </p:nvSpPr>
+        <p:spPr/>
+        <p:txBody>
+          <a:bodyPr/>
+          <a:lstStyle/>
+          <a:p>
+            <a:fld id="{CD10D25F-A2D7-CB4D-BFF2-5E4504CA3430}" type="slidenum">
+              <a:rPr lang="en-US" smtClean="0"/>
+              <a:t>28</a:t>
+            </a:fld>
+            <a:endParaRPr lang="en-US"/>
+          </a:p>
+        </p:txBody>
+      </p:sp>
+    </p:spTree>
+    <p:extLst>
+      <p:ext uri="{BB962C8B-B14F-4D97-AF65-F5344CB8AC3E}">
+        <p14:creationId xmlns:p14="http://schemas.microsoft.com/office/powerpoint/2010/main" val="245358514"/>
+      </p:ext>
+    </p:extLst>
+  </p:cSld>
+  <p:clrMapOvr>
+    <a:masterClrMapping/>
+  </p:clrMapOvr>
+  <p:timing>
+    <p:tnLst>
+      <p:par>
+        <p:cTn id="1" dur="indefinite" restart="never" nodeType="tmRoot">
+          <p:childTnLst>
+            <p:seq concurrent="1" nextAc="seek">
+              <p:cTn id="2" dur="indefinite" nodeType="mainSeq">
+                <p:childTnLst>
+                  <p:par>
+                    <p:cTn id="3" fill="hold">
+                      <p:stCondLst>
+                        <p:cond delay="indefinite"/>
+                      </p:stCondLst>
+                      <p:childTnLst>
+                        <p:par>
+                          <p:cTn id="4" fill="hold">
+                            <p:stCondLst>
+                              <p:cond delay="0"/>
+                            </p:stCondLst>
+                            <p:childTnLst>
+                              <p:par>
+                                <p:cTn id="5" presetID="1" presetClass="entr" presetSubtype="0" fill="hold" grpId="0" nodeType="clickEffect">
+                                  <p:stCondLst>
+                                    <p:cond delay="0"/>
+                                  </p:stCondLst>
+                                  <p:childTnLst>
+                                    <p:set>
+                                      <p:cBhvr>
+                                        <p:cTn id="6" dur="1" fill="hold">
+                                          <p:stCondLst>
+                                            <p:cond delay="0"/>
+                                          </p:stCondLst>
+                                        </p:cTn>
+                                        <p:tgtEl>
+                                          <p:spTgt spid="3">
+                                            <p:txEl>
+                                              <p:pRg st="0" end="0"/>
+                                            </p:txEl>
+                                          </p:spTgt>
+                                        </p:tgtEl>
+                                        <p:attrNameLst>
+                                          <p:attrName>style.visibility</p:attrName>
+                                        </p:attrNameLst>
+                                      </p:cBhvr>
+                                      <p:to>
+                                        <p:strVal val="visible"/>
+                                      </p:to>
+                                    </p:set>
+                                  </p:childTnLst>
+                                </p:cTn>
+                              </p:par>
+                              <p:par>
+                                <p:cTn id="7" presetID="1" presetClass="entr" presetSubtype="0" fill="hold" grpId="0" nodeType="withEffect">
+                                  <p:stCondLst>
+                                    <p:cond delay="0"/>
+                                  </p:stCondLst>
+                                  <p:childTnLst>
+                                    <p:set>
+                                      <p:cBhvr>
+                                        <p:cTn id="8" dur="1" fill="hold">
+                                          <p:stCondLst>
+                                            <p:cond delay="0"/>
+                                          </p:stCondLst>
+                                        </p:cTn>
+                                        <p:tgtEl>
+                                          <p:spTgt spid="3">
+                                            <p:txEl>
+                                              <p:pRg st="1" end="1"/>
+                                            </p:txEl>
+                                          </p:spTgt>
+                                        </p:tgtEl>
+                                        <p:attrNameLst>
+                                          <p:attrName>style.visibility</p:attrName>
+                                        </p:attrNameLst>
+                                      </p:cBhvr>
+                                      <p:to>
+                                        <p:strVal val="visible"/>
+                                      </p:to>
+                                    </p:set>
+                                  </p:childTnLst>
+                                </p:cTn>
+                              </p:par>
+                            </p:childTnLst>
+                          </p:cTn>
+                        </p:par>
+                      </p:childTnLst>
+                    </p:cTn>
+                  </p:par>
+                  <p:par>
+                    <p:cTn id="9" fill="hold">
+                      <p:stCondLst>
+                        <p:cond delay="indefinite"/>
+                      </p:stCondLst>
+                      <p:childTnLst>
+                        <p:par>
+                          <p:cTn id="10" fill="hold">
+                            <p:stCondLst>
+                              <p:cond delay="0"/>
+                            </p:stCondLst>
+                            <p:childTnLst>
+                              <p:par>
+                                <p:cTn id="11" presetID="1" presetClass="entr" presetSubtype="0" fill="hold" grpId="0" nodeType="clickEffect">
                                   <p:stCondLst>
                                     <p:cond delay="0"/>
                                   </p:stCondLst>
@@ -17600,33 +18202,15 @@
                                   </p:childTnLst>
                                 </p:cTn>
                               </p:par>
-                            </p:childTnLst>
-                          </p:cTn>
-                        </p:par>
-                      </p:childTnLst>
-                    </p:cTn>
-                  </p:par>
-                  <p:par>
-                    <p:cTn id="13" fill="hold">
-                      <p:stCondLst>
-                        <p:cond delay="indefinite"/>
-                      </p:stCondLst>
-                      <p:childTnLst>
-                        <p:par>
-                          <p:cTn id="14" fill="hold">
-                            <p:stCondLst>
-                              <p:cond delay="0"/>
-                            </p:stCondLst>
-                            <p:childTnLst>
                               <p:par>
-                                <p:cTn id="15" presetID="1" presetClass="entr" presetSubtype="0" fill="hold" grpId="0" nodeType="clickEffect">
+                                <p:cTn id="13" presetID="1" presetClass="entr" presetSubtype="0" fill="hold" grpId="0" nodeType="withEffect">
                                   <p:stCondLst>
                                     <p:cond delay="0"/>
                                   </p:stCondLst>
                                   <p:childTnLst>
                                     <p:set>
                                       <p:cBhvr>
-                                        <p:cTn id="16" dur="1" fill="hold">
+                                        <p:cTn id="14" dur="1" fill="hold">
                                           <p:stCondLst>
                                             <p:cond delay="0"/>
                                           </p:stCondLst>
@@ -17650,14 +18234,14 @@
                                 </p:cTn>
                               </p:par>
                               <p:par>
-                                <p:cTn id="17" presetID="1" presetClass="entr" presetSubtype="0" fill="hold" grpId="0" nodeType="withEffect">
+                                <p:cTn id="15" presetID="1" presetClass="entr" presetSubtype="0" fill="hold" grpId="0" nodeType="withEffect">
                                   <p:stCondLst>
                                     <p:cond delay="0"/>
                                   </p:stCondLst>
                                   <p:childTnLst>
                                     <p:set>
                                       <p:cBhvr>
-                                        <p:cTn id="18" dur="1" fill="hold">
+                                        <p:cTn id="16" dur="1" fill="hold">
                                           <p:stCondLst>
                                             <p:cond delay="0"/>
                                           </p:stCondLst>
@@ -17680,8 +18264,26 @@
                                   </p:childTnLst>
                                 </p:cTn>
                               </p:par>
+                            </p:childTnLst>
+                          </p:cTn>
+                        </p:par>
+                      </p:childTnLst>
+                    </p:cTn>
+                  </p:par>
+                  <p:par>
+                    <p:cTn id="17" fill="hold">
+                      <p:stCondLst>
+                        <p:cond delay="indefinite"/>
+                      </p:stCondLst>
+                      <p:childTnLst>
+                        <p:par>
+                          <p:cTn id="18" fill="hold">
+                            <p:stCondLst>
+                              <p:cond delay="0"/>
+                            </p:stCondLst>
+                            <p:childTnLst>
                               <p:par>
-                                <p:cTn id="19" presetID="1" presetClass="entr" presetSubtype="0" fill="hold" grpId="0" nodeType="withEffect">
+                                <p:cTn id="19" presetID="1" presetClass="entr" presetSubtype="0" fill="hold" grpId="0" nodeType="clickEffect">
                                   <p:stCondLst>
                                     <p:cond delay="0"/>
                                   </p:stCondLst>
@@ -17711,26 +18313,39 @@
                                   </p:childTnLst>
                                 </p:cTn>
                               </p:par>
-                            </p:childTnLst>
-                          </p:cTn>
-                        </p:par>
-                      </p:childTnLst>
-                    </p:cTn>
-                  </p:par>
-                  <p:par>
-                    <p:cTn id="21" fill="hold">
-                      <p:stCondLst>
-                        <p:cond delay="indefinite"/>
-                      </p:stCondLst>
-                      <p:childTnLst>
-                        <p:par>
-                          <p:cTn id="22" fill="hold">
-                            <p:stCondLst>
-                              <p:cond delay="0"/>
-                            </p:stCondLst>
-                            <p:childTnLst>
                               <p:par>
-                                <p:cTn id="23" presetID="1" presetClass="entr" presetSubtype="0" fill="hold" grpId="0" nodeType="clickEffect">
+                                <p:cTn id="21" presetID="1" presetClass="entr" presetSubtype="0" fill="hold" grpId="0" nodeType="withEffect">
+                                  <p:stCondLst>
+                                    <p:cond delay="0"/>
+                                  </p:stCondLst>
+                                  <p:childTnLst>
+                                    <p:set>
+                                      <p:cBhvr>
+                                        <p:cTn id="22" dur="1" fill="hold">
+                                          <p:stCondLst>
+                                            <p:cond delay="0"/>
+                                          </p:stCondLst>
+                                        </p:cTn>
+                                        <p:tgtEl>
+                                          <p:spTgt spid="3">
+                                            <p:txEl>
+                                              <p:pRg st="6" end="6"/>
+                                            </p:txEl>
+                                          </p:spTgt>
+                                        </p:tgtEl>
+                                        <p:attrNameLst>
+                                          <p:attrName>style.visibility</p:attrName>
+                                        </p:attrNameLst>
+                                      </p:cBhvr>
+                                      <p:to>
+                                        <p:strVal val="visible"/>
+                                      </p:to>
+                                    </p:set>
+                                  </p:childTnLst>
+                                </p:cTn>
+                              </p:par>
+                              <p:par>
+                                <p:cTn id="23" presetID="1" presetClass="entr" presetSubtype="0" fill="hold" grpId="0" nodeType="withEffect">
                                   <p:stCondLst>
                                     <p:cond delay="0"/>
                                   </p:stCondLst>
@@ -17745,7 +18360,7 @@
                                         <p:tgtEl>
                                           <p:spTgt spid="3">
                                             <p:txEl>
-                                              <p:pRg st="6" end="6"/>
+                                              <p:pRg st="7" end="7"/>
                                             </p:txEl>
                                           </p:spTgt>
                                         </p:tgtEl>
@@ -17776,7 +18391,87 @@
                                         <p:tgtEl>
                                           <p:spTgt spid="3">
                                             <p:txEl>
-                                              <p:pRg st="7" end="7"/>
+                                              <p:pRg st="8" end="8"/>
+                                            </p:txEl>
+                                          </p:spTgt>
+                                        </p:tgtEl>
+                                        <p:attrNameLst>
+                                          <p:attrName>style.visibility</p:attrName>
+                                        </p:attrNameLst>
+                                      </p:cBhvr>
+                                      <p:to>
+                                        <p:strVal val="visible"/>
+                                      </p:to>
+                                    </p:set>
+                                  </p:childTnLst>
+                                </p:cTn>
+                              </p:par>
+                            </p:childTnLst>
+                          </p:cTn>
+                        </p:par>
+                      </p:childTnLst>
+                    </p:cTn>
+                  </p:par>
+                  <p:par>
+                    <p:cTn id="27" fill="hold">
+                      <p:stCondLst>
+                        <p:cond delay="indefinite"/>
+                      </p:stCondLst>
+                      <p:childTnLst>
+                        <p:par>
+                          <p:cTn id="28" fill="hold">
+                            <p:stCondLst>
+                              <p:cond delay="0"/>
+                            </p:stCondLst>
+                            <p:childTnLst>
+                              <p:par>
+                                <p:cTn id="29" presetID="1" presetClass="entr" presetSubtype="0" fill="hold" grpId="0" nodeType="clickEffect">
+                                  <p:stCondLst>
+                                    <p:cond delay="0"/>
+                                  </p:stCondLst>
+                                  <p:childTnLst>
+                                    <p:set>
+                                      <p:cBhvr>
+                                        <p:cTn id="30" dur="1" fill="hold">
+                                          <p:stCondLst>
+                                            <p:cond delay="0"/>
+                                          </p:stCondLst>
+                                        </p:cTn>
+                                        <p:tgtEl>
+                                          <p:spTgt spid="3">
+                                            <p:txEl>
+                                              <p:pRg st="9" end="9"/>
+                                            </p:txEl>
+                                          </p:spTgt>
+                                        </p:tgtEl>
+                                        <p:attrNameLst>
+                                          <p:attrName>style.visibility</p:attrName>
+                                        </p:attrNameLst>
+                                      </p:cBhvr>
+                                      <p:to>
+                                        <p:strVal val="visible"/>
+                                      </p:to>
+                                    </p:set>
+                                  </p:childTnLst>
+                                </p:cTn>
+                              </p:par>
+                              <p:par>
+                                <p:cTn id="31" presetID="1" presetClass="entr" presetSubtype="0" fill="hold" grpId="0" nodeType="withEffect">
+                                  <p:stCondLst>
+                                    <p:cond delay="0"/>
+                                  </p:stCondLst>
+                                  <p:childTnLst>
+                                    <p:set>
+                                      <p:cBhvr>
+                                        <p:cTn id="32" dur="1" fill="hold">
+                                          <p:stCondLst>
+                                            <p:cond delay="0"/>
+                                          </p:stCondLst>
+                                        </p:cTn>
+                                        <p:tgtEl>
+                                          <p:spTgt spid="3">
+                                            <p:txEl>
+                                              <p:pRg st="10" end="10"/>
                                             </p:txEl>
                                           </p:spTgt>
                                         </p:tgtEl>
@@ -17825,7 +18520,7 @@
 </p:sld>
 </file>
 
-<file path=ppt/slides/slide28.xml><?xml version="1.0" encoding="utf-8"?>
+<file path=ppt/slides/slide29.xml><?xml version="1.0" encoding="utf-8"?>
 <p:sld xmlns:a="http://schemas.openxmlformats.org/drawingml/2006/main" xmlns:r="http://schemas.openxmlformats.org/officeDocument/2006/relationships" xmlns:p="http://schemas.openxmlformats.org/presentationml/2006/main">
   <p:cSld>
     <p:spTree>
@@ -18032,7 +18727,7 @@
           <a:p>
             <a:fld id="{CD10D25F-A2D7-CB4D-BFF2-5E4504CA3430}" type="slidenum">
               <a:rPr lang="en-US" smtClean="0"/>
-              <a:t>28</a:t>
+              <a:t>29</a:t>
             </a:fld>
             <a:endParaRPr lang="en-US"/>
           </a:p>
@@ -18655,592 +19350,6 @@
 </p:sld>
 </file>
 
-<file path=ppt/slides/slide29.xml><?xml version="1.0" encoding="utf-8"?>
-<p:sld xmlns:a="http://schemas.openxmlformats.org/drawingml/2006/main" xmlns:r="http://schemas.openxmlformats.org/officeDocument/2006/relationships" xmlns:p="http://schemas.openxmlformats.org/presentationml/2006/main">
-  <p:cSld>
-    <p:spTree>
-      <p:nvGrpSpPr>
-        <p:cNvPr id="1" name=""/>
-        <p:cNvGrpSpPr/>
-        <p:nvPr/>
-      </p:nvGrpSpPr>
-      <p:grpSpPr>
-        <a:xfrm>
-          <a:off x="0" y="0"/>
-          <a:ext cx="0" cy="0"/>
-          <a:chOff x="0" y="0"/>
-          <a:chExt cx="0" cy="0"/>
-        </a:xfrm>
-      </p:grpSpPr>
-      <p:sp>
-        <p:nvSpPr>
-          <p:cNvPr id="2" name="Title 1">
-            <a:extLst>
-              <a:ext uri="{FF2B5EF4-FFF2-40B4-BE49-F238E27FC236}">
-                <a16:creationId xmlns:a16="http://schemas.microsoft.com/office/drawing/2014/main" id="{B6F7355F-CB69-2C4D-F490-1B52FA325237}"/>
-              </a:ext>
-            </a:extLst>
-          </p:cNvPr>
-          <p:cNvSpPr>
-            <a:spLocks noGrp="1"/>
-          </p:cNvSpPr>
-          <p:nvPr>
-            <p:ph type="title"/>
-          </p:nvPr>
-        </p:nvSpPr>
-        <p:spPr/>
-        <p:txBody>
-          <a:bodyPr/>
-          <a:lstStyle/>
-          <a:p>
-            <a:r>
-              <a:rPr lang="en-US" dirty="0"/>
-              <a:t>Code Review Activity</a:t>
-            </a:r>
-          </a:p>
-        </p:txBody>
-      </p:sp>
-      <p:sp>
-        <p:nvSpPr>
-          <p:cNvPr id="3" name="Content Placeholder 2">
-            <a:extLst>
-              <a:ext uri="{FF2B5EF4-FFF2-40B4-BE49-F238E27FC236}">
-                <a16:creationId xmlns:a16="http://schemas.microsoft.com/office/drawing/2014/main" id="{48BE5E18-FC8B-E78F-19C1-5242D7470D92}"/>
-              </a:ext>
-            </a:extLst>
-          </p:cNvPr>
-          <p:cNvSpPr>
-            <a:spLocks noGrp="1"/>
-          </p:cNvSpPr>
-          <p:nvPr>
-            <p:ph idx="1"/>
-          </p:nvPr>
-        </p:nvSpPr>
-        <p:spPr/>
-        <p:txBody>
-          <a:bodyPr/>
-          <a:lstStyle/>
-          <a:p>
-            <a:pPr marL="228600" indent="-228600"/>
-            <a:r>
-              <a:rPr lang="en-US" dirty="0"/>
-              <a:t>Join together three (or two) pairs</a:t>
-            </a:r>
-          </a:p>
-          <a:p>
-            <a:pPr marL="228600" indent="-228600"/>
-            <a:r>
-              <a:rPr lang="en-US" dirty="0"/>
-              <a:t>Choose which pair’s code changes you will be reviewing</a:t>
-            </a:r>
-          </a:p>
-          <a:p>
-            <a:pPr marL="228600" indent="-228600"/>
-            <a:r>
-              <a:rPr lang="en-US" dirty="0"/>
-              <a:t>Run flake8 or </a:t>
-            </a:r>
-            <a:r>
-              <a:rPr lang="en-US" dirty="0" err="1"/>
-              <a:t>pylint</a:t>
-            </a:r>
-            <a:r>
-              <a:rPr lang="en-US" dirty="0"/>
-              <a:t> on the </a:t>
-            </a:r>
-            <a:r>
-              <a:rPr lang="en-US" dirty="0" err="1"/>
-              <a:t>inklimit.py</a:t>
-            </a:r>
-            <a:r>
-              <a:rPr lang="en-US" dirty="0"/>
-              <a:t> file and interpret the output</a:t>
-            </a:r>
-          </a:p>
-          <a:p>
-            <a:pPr lvl="1"/>
-            <a:r>
-              <a:rPr lang="en-US" dirty="0"/>
-              <a:t>“flake8 </a:t>
-            </a:r>
-            <a:r>
-              <a:rPr lang="en-US" dirty="0" err="1"/>
-              <a:t>inklimit.py</a:t>
-            </a:r>
-            <a:r>
-              <a:rPr lang="en-US" dirty="0"/>
-              <a:t>”</a:t>
-            </a:r>
-          </a:p>
-          <a:p>
-            <a:pPr lvl="1"/>
-            <a:r>
-              <a:rPr lang="en-US" dirty="0"/>
-              <a:t>(pip3 install flake8 or pip3 install </a:t>
-            </a:r>
-            <a:r>
-              <a:rPr lang="en-US" dirty="0" err="1"/>
-              <a:t>pylint</a:t>
-            </a:r>
-            <a:r>
-              <a:rPr lang="en-US" dirty="0"/>
-              <a:t> if necessary)</a:t>
-            </a:r>
-          </a:p>
-          <a:p>
-            <a:pPr marL="228600" indent="-228600"/>
-            <a:r>
-              <a:rPr lang="en-US" dirty="0"/>
-              <a:t>Choose someone to be “author”</a:t>
-            </a:r>
-          </a:p>
-          <a:p>
-            <a:pPr marL="228600" indent="-228600"/>
-            <a:r>
-              <a:rPr lang="en-US" dirty="0"/>
-              <a:t>Determine what categories of “defect” should be identified</a:t>
-            </a:r>
-          </a:p>
-          <a:p>
-            <a:pPr marL="228600" indent="-228600"/>
-            <a:r>
-              <a:rPr lang="en-US" dirty="0"/>
-              <a:t>Conduct a Code Walkthrough of the chosen code</a:t>
-            </a:r>
-          </a:p>
-        </p:txBody>
-      </p:sp>
-      <p:sp>
-        <p:nvSpPr>
-          <p:cNvPr id="4" name="Slide Number Placeholder 3">
-            <a:extLst>
-              <a:ext uri="{FF2B5EF4-FFF2-40B4-BE49-F238E27FC236}">
-                <a16:creationId xmlns:a16="http://schemas.microsoft.com/office/drawing/2014/main" id="{3A903C20-D0EF-617E-167D-58BBC27076E7}"/>
-              </a:ext>
-            </a:extLst>
-          </p:cNvPr>
-          <p:cNvSpPr>
-            <a:spLocks noGrp="1"/>
-          </p:cNvSpPr>
-          <p:nvPr>
-            <p:ph type="sldNum" sz="quarter" idx="12"/>
-          </p:nvPr>
-        </p:nvSpPr>
-        <p:spPr/>
-        <p:txBody>
-          <a:bodyPr/>
-          <a:lstStyle/>
-          <a:p>
-            <a:fld id="{CD10D25F-A2D7-CB4D-BFF2-5E4504CA3430}" type="slidenum">
-              <a:rPr lang="en-US" smtClean="0"/>
-              <a:t>29</a:t>
-            </a:fld>
-            <a:endParaRPr lang="en-US"/>
-          </a:p>
-        </p:txBody>
-      </p:sp>
-    </p:spTree>
-    <p:extLst>
-      <p:ext uri="{BB962C8B-B14F-4D97-AF65-F5344CB8AC3E}">
-        <p14:creationId xmlns:p14="http://schemas.microsoft.com/office/powerpoint/2010/main" val="67692164"/>
-      </p:ext>
-    </p:extLst>
-  </p:cSld>
-  <p:clrMapOvr>
-    <a:masterClrMapping/>
-  </p:clrMapOvr>
-  <p:timing>
-    <p:tnLst>
-      <p:par>
-        <p:cTn id="1" dur="indefinite" restart="never" nodeType="tmRoot">
-          <p:childTnLst>
-            <p:seq concurrent="1" nextAc="seek">
-              <p:cTn id="2" dur="indefinite" nodeType="mainSeq">
-                <p:childTnLst>
-                  <p:par>
-                    <p:cTn id="3" fill="hold">
-                      <p:stCondLst>
-                        <p:cond delay="indefinite"/>
-                      </p:stCondLst>
-                      <p:childTnLst>
-                        <p:par>
-                          <p:cTn id="4" fill="hold">
-                            <p:stCondLst>
-                              <p:cond delay="0"/>
-                            </p:stCondLst>
-                            <p:childTnLst>
-                              <p:par>
-                                <p:cTn id="5" presetID="1" presetClass="entr" presetSubtype="0" fill="hold" grpId="0" nodeType="clickEffect">
-                                  <p:stCondLst>
-                                    <p:cond delay="0"/>
-                                  </p:stCondLst>
-                                  <p:childTnLst>
-                                    <p:set>
-                                      <p:cBhvr>
-                                        <p:cTn id="6" dur="1" fill="hold">
-                                          <p:stCondLst>
-                                            <p:cond delay="0"/>
-                                          </p:stCondLst>
-                                        </p:cTn>
-                                        <p:tgtEl>
-                                          <p:spTgt spid="3">
-                                            <p:txEl>
-                                              <p:pRg st="0" end="0"/>
-                                            </p:txEl>
-                                          </p:spTgt>
-                                        </p:tgtEl>
-                                        <p:attrNameLst>
-                                          <p:attrName>style.visibility</p:attrName>
-                                        </p:attrNameLst>
-                                      </p:cBhvr>
-                                      <p:to>
-                                        <p:strVal val="visible"/>
-                                      </p:to>
-                                    </p:set>
-                                  </p:childTnLst>
-                                </p:cTn>
-                              </p:par>
-                            </p:childTnLst>
-                          </p:cTn>
-                        </p:par>
-                      </p:childTnLst>
-                    </p:cTn>
-                  </p:par>
-                  <p:par>
-                    <p:cTn id="7" fill="hold">
-                      <p:stCondLst>
-                        <p:cond delay="indefinite"/>
-                      </p:stCondLst>
-                      <p:childTnLst>
-                        <p:par>
-                          <p:cTn id="8" fill="hold">
-                            <p:stCondLst>
-                              <p:cond delay="0"/>
-                            </p:stCondLst>
-                            <p:childTnLst>
-                              <p:par>
-                                <p:cTn id="9" presetID="1" presetClass="entr" presetSubtype="0" fill="hold" grpId="0" nodeType="clickEffect">
-                                  <p:stCondLst>
-                                    <p:cond delay="0"/>
-                                  </p:stCondLst>
-                                  <p:childTnLst>
-                                    <p:set>
-                                      <p:cBhvr>
-                                        <p:cTn id="10" dur="1" fill="hold">
-                                          <p:stCondLst>
-                                            <p:cond delay="0"/>
-                                          </p:stCondLst>
-                                        </p:cTn>
-                                        <p:tgtEl>
-                                          <p:spTgt spid="3">
-                                            <p:txEl>
-                                              <p:pRg st="1" end="1"/>
-                                            </p:txEl>
-                                          </p:spTgt>
-                                        </p:tgtEl>
-                                        <p:attrNameLst>
-                                          <p:attrName>style.visibility</p:attrName>
-                                        </p:attrNameLst>
-                                      </p:cBhvr>
-                                      <p:to>
-                                        <p:strVal val="visible"/>
-                                      </p:to>
-                                    </p:set>
-                                  </p:childTnLst>
-                                </p:cTn>
-                              </p:par>
-                            </p:childTnLst>
-                          </p:cTn>
-                        </p:par>
-                      </p:childTnLst>
-                    </p:cTn>
-                  </p:par>
-                  <p:par>
-                    <p:cTn id="11" fill="hold">
-                      <p:stCondLst>
-                        <p:cond delay="indefinite"/>
-                      </p:stCondLst>
-                      <p:childTnLst>
-                        <p:par>
-                          <p:cTn id="12" fill="hold">
-                            <p:stCondLst>
-                              <p:cond delay="0"/>
-                            </p:stCondLst>
-                            <p:childTnLst>
-                              <p:par>
-                                <p:cTn id="13" presetID="1" presetClass="entr" presetSubtype="0" fill="hold" grpId="0" nodeType="clickEffect">
-                                  <p:stCondLst>
-                                    <p:cond delay="0"/>
-                                  </p:stCondLst>
-                                  <p:childTnLst>
-                                    <p:set>
-                                      <p:cBhvr>
-                                        <p:cTn id="14" dur="1" fill="hold">
-                                          <p:stCondLst>
-                                            <p:cond delay="0"/>
-                                          </p:stCondLst>
-                                        </p:cTn>
-                                        <p:tgtEl>
-                                          <p:spTgt spid="3">
-                                            <p:txEl>
-                                              <p:pRg st="2" end="2"/>
-                                            </p:txEl>
-                                          </p:spTgt>
-                                        </p:tgtEl>
-                                        <p:attrNameLst>
-                                          <p:attrName>style.visibility</p:attrName>
-                                        </p:attrNameLst>
-                                      </p:cBhvr>
-                                      <p:to>
-                                        <p:strVal val="visible"/>
-                                      </p:to>
-                                    </p:set>
-                                  </p:childTnLst>
-                                </p:cTn>
-                              </p:par>
-                              <p:par>
-                                <p:cTn id="15" presetID="1" presetClass="entr" presetSubtype="0" fill="hold" grpId="0" nodeType="withEffect">
-                                  <p:stCondLst>
-                                    <p:cond delay="0"/>
-                                  </p:stCondLst>
-                                  <p:childTnLst>
-                                    <p:set>
-                                      <p:cBhvr>
-                                        <p:cTn id="16" dur="1" fill="hold">
-                                          <p:stCondLst>
-                                            <p:cond delay="0"/>
-                                          </p:stCondLst>
-                                        </p:cTn>
-                                        <p:tgtEl>
-                                          <p:spTgt spid="3">
-                                            <p:txEl>
-                                              <p:pRg st="3" end="3"/>
-                                            </p:txEl>
-                                          </p:spTgt>
-                                        </p:tgtEl>
-                                        <p:attrNameLst>
-                                          <p:attrName>style.visibility</p:attrName>
-                                        </p:attrNameLst>
-                                      </p:cBhvr>
-                                      <p:to>
-                                        <p:strVal val="visible"/>
-                                      </p:to>
-                                    </p:set>
-                                  </p:childTnLst>
-                                </p:cTn>
-                              </p:par>
-                              <p:par>
-                                <p:cTn id="17" presetID="1" presetClass="entr" presetSubtype="0" fill="hold" grpId="0" nodeType="withEffect">
-                                  <p:stCondLst>
-                                    <p:cond delay="0"/>
-                                  </p:stCondLst>
-                                  <p:childTnLst>
-                                    <p:set>
-                                      <p:cBhvr>
-                                        <p:cTn id="18" dur="1" fill="hold">
-                                          <p:stCondLst>
-                                            <p:cond delay="0"/>
-                                          </p:stCondLst>
-                                        </p:cTn>
-                                        <p:tgtEl>
-                                          <p:spTgt spid="3">
-                                            <p:txEl>
-                                              <p:pRg st="4" end="4"/>
-                                            </p:txEl>
-                                          </p:spTgt>
-                                        </p:tgtEl>
-                                        <p:attrNameLst>
-                                          <p:attrName>style.visibility</p:attrName>
-                                        </p:attrNameLst>
-                                      </p:cBhvr>
-                                      <p:to>
-                                        <p:strVal val="visible"/>
-                                      </p:to>
-                                    </p:set>
-                                  </p:childTnLst>
-                                </p:cTn>
-                              </p:par>
-                            </p:childTnLst>
-                          </p:cTn>
-                        </p:par>
-                      </p:childTnLst>
-                    </p:cTn>
-                  </p:par>
-                  <p:par>
-                    <p:cTn id="19" fill="hold">
-                      <p:stCondLst>
-                        <p:cond delay="indefinite"/>
-                      </p:stCondLst>
-                      <p:childTnLst>
-                        <p:par>
-                          <p:cTn id="20" fill="hold">
-                            <p:stCondLst>
-                              <p:cond delay="0"/>
-                            </p:stCondLst>
-                            <p:childTnLst>
-                              <p:par>
-                                <p:cTn id="21" presetID="1" presetClass="entr" presetSubtype="0" fill="hold" grpId="0" nodeType="clickEffect">
-                                  <p:stCondLst>
-                                    <p:cond delay="0"/>
-                                  </p:stCondLst>
-                                  <p:childTnLst>
-                                    <p:set>
-                                      <p:cBhvr>
-                                        <p:cTn id="22" dur="1" fill="hold">
-                                          <p:stCondLst>
-                                            <p:cond delay="0"/>
-                                          </p:stCondLst>
-                                        </p:cTn>
-                                        <p:tgtEl>
-                                          <p:spTgt spid="3">
-                                            <p:txEl>
-                                              <p:pRg st="5" end="5"/>
-                                            </p:txEl>
-                                          </p:spTgt>
-                                        </p:tgtEl>
-                                        <p:attrNameLst>
-                                          <p:attrName>style.visibility</p:attrName>
-                                        </p:attrNameLst>
-                                      </p:cBhvr>
-                                      <p:to>
-                                        <p:strVal val="visible"/>
-                                      </p:to>
-                                    </p:set>
-                                  </p:childTnLst>
-                                </p:cTn>
-                              </p:par>
-                            </p:childTnLst>
-                          </p:cTn>
-                        </p:par>
-                      </p:childTnLst>
-                    </p:cTn>
-                  </p:par>
-                  <p:par>
-                    <p:cTn id="23" fill="hold">
-                      <p:stCondLst>
-                        <p:cond delay="indefinite"/>
-                      </p:stCondLst>
-                      <p:childTnLst>
-                        <p:par>
-                          <p:cTn id="24" fill="hold">
-                            <p:stCondLst>
-                              <p:cond delay="0"/>
-                            </p:stCondLst>
-                            <p:childTnLst>
-                              <p:par>
-                                <p:cTn id="25" presetID="1" presetClass="entr" presetSubtype="0" fill="hold" grpId="0" nodeType="clickEffect">
-                                  <p:stCondLst>
-                                    <p:cond delay="0"/>
-                                  </p:stCondLst>
-                                  <p:childTnLst>
-                                    <p:set>
-                                      <p:cBhvr>
-                                        <p:cTn id="26" dur="1" fill="hold">
-                                          <p:stCondLst>
-                                            <p:cond delay="0"/>
-                                          </p:stCondLst>
-                                        </p:cTn>
-                                        <p:tgtEl>
-                                          <p:spTgt spid="3">
-                                            <p:txEl>
-                                              <p:pRg st="6" end="6"/>
-                                            </p:txEl>
-                                          </p:spTgt>
-                                        </p:tgtEl>
-                                        <p:attrNameLst>
-                                          <p:attrName>style.visibility</p:attrName>
-                                        </p:attrNameLst>
-                                      </p:cBhvr>
-                                      <p:to>
-                                        <p:strVal val="visible"/>
-                                      </p:to>
-                                    </p:set>
-                                  </p:childTnLst>
-                                </p:cTn>
-                              </p:par>
-                            </p:childTnLst>
-                          </p:cTn>
-                        </p:par>
-                      </p:childTnLst>
-                    </p:cTn>
-                  </p:par>
-                  <p:par>
-                    <p:cTn id="27" fill="hold">
-                      <p:stCondLst>
-                        <p:cond delay="indefinite"/>
-                      </p:stCondLst>
-                      <p:childTnLst>
-                        <p:par>
-                          <p:cTn id="28" fill="hold">
-                            <p:stCondLst>
-                              <p:cond delay="0"/>
-                            </p:stCondLst>
-                            <p:childTnLst>
-                              <p:par>
-                                <p:cTn id="29" presetID="1" presetClass="entr" presetSubtype="0" fill="hold" grpId="0" nodeType="clickEffect">
-                                  <p:stCondLst>
-                                    <p:cond delay="0"/>
-                                  </p:stCondLst>
-                                  <p:childTnLst>
-                                    <p:set>
-                                      <p:cBhvr>
-                                        <p:cTn id="30" dur="1" fill="hold">
-                                          <p:stCondLst>
-                                            <p:cond delay="0"/>
-                                          </p:stCondLst>
-                                        </p:cTn>
-                                        <p:tgtEl>
-                                          <p:spTgt spid="3">
-                                            <p:txEl>
-                                              <p:pRg st="7" end="7"/>
-                                            </p:txEl>
-                                          </p:spTgt>
-                                        </p:tgtEl>
-                                        <p:attrNameLst>
-                                          <p:attrName>style.visibility</p:attrName>
-                                        </p:attrNameLst>
-                                      </p:cBhvr>
-                                      <p:to>
-                                        <p:strVal val="visible"/>
-                                      </p:to>
-                                    </p:set>
-                                  </p:childTnLst>
-                                </p:cTn>
-                              </p:par>
-                            </p:childTnLst>
-                          </p:cTn>
-                        </p:par>
-                      </p:childTnLst>
-                    </p:cTn>
-                  </p:par>
-                </p:childTnLst>
-              </p:cTn>
-              <p:prevCondLst>
-                <p:cond evt="onPrev" delay="0">
-                  <p:tgtEl>
-                    <p:sldTgt/>
-                  </p:tgtEl>
-                </p:cond>
-              </p:prevCondLst>
-              <p:nextCondLst>
-                <p:cond evt="onNext" delay="0">
-                  <p:tgtEl>
-                    <p:sldTgt/>
-                  </p:tgtEl>
-                </p:cond>
-              </p:nextCondLst>
-            </p:seq>
-          </p:childTnLst>
-        </p:cTn>
-      </p:par>
-    </p:tnLst>
-    <p:bldLst>
-      <p:bldP spid="3" grpId="0" build="p"/>
-    </p:bldLst>
-  </p:timing>
-</p:sld>
-</file>
-
 <file path=ppt/slides/slide3.xml><?xml version="1.0" encoding="utf-8"?>
 <p:sld xmlns:a="http://schemas.openxmlformats.org/drawingml/2006/main" xmlns:r="http://schemas.openxmlformats.org/officeDocument/2006/relationships" xmlns:p="http://schemas.openxmlformats.org/presentationml/2006/main">
   <p:cSld>
@@ -19805,6 +19914,592 @@
           <p:cNvPr id="2" name="Title 1">
             <a:extLst>
               <a:ext uri="{FF2B5EF4-FFF2-40B4-BE49-F238E27FC236}">
+                <a16:creationId xmlns:a16="http://schemas.microsoft.com/office/drawing/2014/main" id="{B6F7355F-CB69-2C4D-F490-1B52FA325237}"/>
+              </a:ext>
+            </a:extLst>
+          </p:cNvPr>
+          <p:cNvSpPr>
+            <a:spLocks noGrp="1"/>
+          </p:cNvSpPr>
+          <p:nvPr>
+            <p:ph type="title"/>
+          </p:nvPr>
+        </p:nvSpPr>
+        <p:spPr/>
+        <p:txBody>
+          <a:bodyPr/>
+          <a:lstStyle/>
+          <a:p>
+            <a:r>
+              <a:rPr lang="en-US" dirty="0"/>
+              <a:t>Code Review Activity</a:t>
+            </a:r>
+          </a:p>
+        </p:txBody>
+      </p:sp>
+      <p:sp>
+        <p:nvSpPr>
+          <p:cNvPr id="3" name="Content Placeholder 2">
+            <a:extLst>
+              <a:ext uri="{FF2B5EF4-FFF2-40B4-BE49-F238E27FC236}">
+                <a16:creationId xmlns:a16="http://schemas.microsoft.com/office/drawing/2014/main" id="{48BE5E18-FC8B-E78F-19C1-5242D7470D92}"/>
+              </a:ext>
+            </a:extLst>
+          </p:cNvPr>
+          <p:cNvSpPr>
+            <a:spLocks noGrp="1"/>
+          </p:cNvSpPr>
+          <p:nvPr>
+            <p:ph idx="1"/>
+          </p:nvPr>
+        </p:nvSpPr>
+        <p:spPr/>
+        <p:txBody>
+          <a:bodyPr/>
+          <a:lstStyle/>
+          <a:p>
+            <a:pPr marL="228600" indent="-228600"/>
+            <a:r>
+              <a:rPr lang="en-US" dirty="0"/>
+              <a:t>Join together three (or two) pairs</a:t>
+            </a:r>
+          </a:p>
+          <a:p>
+            <a:pPr marL="228600" indent="-228600"/>
+            <a:r>
+              <a:rPr lang="en-US" dirty="0"/>
+              <a:t>Choose which pair’s code changes you will be reviewing</a:t>
+            </a:r>
+          </a:p>
+          <a:p>
+            <a:pPr marL="228600" indent="-228600"/>
+            <a:r>
+              <a:rPr lang="en-US" dirty="0"/>
+              <a:t>Run flake8 or </a:t>
+            </a:r>
+            <a:r>
+              <a:rPr lang="en-US" dirty="0" err="1"/>
+              <a:t>pylint</a:t>
+            </a:r>
+            <a:r>
+              <a:rPr lang="en-US" dirty="0"/>
+              <a:t> on the </a:t>
+            </a:r>
+            <a:r>
+              <a:rPr lang="en-US" dirty="0" err="1"/>
+              <a:t>inklimit.py</a:t>
+            </a:r>
+            <a:r>
+              <a:rPr lang="en-US" dirty="0"/>
+              <a:t> file and interpret the output</a:t>
+            </a:r>
+          </a:p>
+          <a:p>
+            <a:pPr lvl="1"/>
+            <a:r>
+              <a:rPr lang="en-US" dirty="0"/>
+              <a:t>“flake8 </a:t>
+            </a:r>
+            <a:r>
+              <a:rPr lang="en-US" dirty="0" err="1"/>
+              <a:t>inklimit.py</a:t>
+            </a:r>
+            <a:r>
+              <a:rPr lang="en-US" dirty="0"/>
+              <a:t>”</a:t>
+            </a:r>
+          </a:p>
+          <a:p>
+            <a:pPr lvl="1"/>
+            <a:r>
+              <a:rPr lang="en-US" dirty="0"/>
+              <a:t>(pip3 install flake8 or pip3 install </a:t>
+            </a:r>
+            <a:r>
+              <a:rPr lang="en-US" dirty="0" err="1"/>
+              <a:t>pylint</a:t>
+            </a:r>
+            <a:r>
+              <a:rPr lang="en-US" dirty="0"/>
+              <a:t> if necessary)</a:t>
+            </a:r>
+          </a:p>
+          <a:p>
+            <a:pPr marL="228600" indent="-228600"/>
+            <a:r>
+              <a:rPr lang="en-US" dirty="0"/>
+              <a:t>Choose someone to be “author”</a:t>
+            </a:r>
+          </a:p>
+          <a:p>
+            <a:pPr marL="228600" indent="-228600"/>
+            <a:r>
+              <a:rPr lang="en-US" dirty="0"/>
+              <a:t>Determine what categories of “defect” should be identified</a:t>
+            </a:r>
+          </a:p>
+          <a:p>
+            <a:pPr marL="228600" indent="-228600"/>
+            <a:r>
+              <a:rPr lang="en-US" dirty="0"/>
+              <a:t>Conduct a Code Walkthrough of the chosen code</a:t>
+            </a:r>
+          </a:p>
+        </p:txBody>
+      </p:sp>
+      <p:sp>
+        <p:nvSpPr>
+          <p:cNvPr id="4" name="Slide Number Placeholder 3">
+            <a:extLst>
+              <a:ext uri="{FF2B5EF4-FFF2-40B4-BE49-F238E27FC236}">
+                <a16:creationId xmlns:a16="http://schemas.microsoft.com/office/drawing/2014/main" id="{3A903C20-D0EF-617E-167D-58BBC27076E7}"/>
+              </a:ext>
+            </a:extLst>
+          </p:cNvPr>
+          <p:cNvSpPr>
+            <a:spLocks noGrp="1"/>
+          </p:cNvSpPr>
+          <p:nvPr>
+            <p:ph type="sldNum" sz="quarter" idx="12"/>
+          </p:nvPr>
+        </p:nvSpPr>
+        <p:spPr/>
+        <p:txBody>
+          <a:bodyPr/>
+          <a:lstStyle/>
+          <a:p>
+            <a:fld id="{CD10D25F-A2D7-CB4D-BFF2-5E4504CA3430}" type="slidenum">
+              <a:rPr lang="en-US" smtClean="0"/>
+              <a:t>30</a:t>
+            </a:fld>
+            <a:endParaRPr lang="en-US"/>
+          </a:p>
+        </p:txBody>
+      </p:sp>
+    </p:spTree>
+    <p:extLst>
+      <p:ext uri="{BB962C8B-B14F-4D97-AF65-F5344CB8AC3E}">
+        <p14:creationId xmlns:p14="http://schemas.microsoft.com/office/powerpoint/2010/main" val="67692164"/>
+      </p:ext>
+    </p:extLst>
+  </p:cSld>
+  <p:clrMapOvr>
+    <a:masterClrMapping/>
+  </p:clrMapOvr>
+  <p:timing>
+    <p:tnLst>
+      <p:par>
+        <p:cTn id="1" dur="indefinite" restart="never" nodeType="tmRoot">
+          <p:childTnLst>
+            <p:seq concurrent="1" nextAc="seek">
+              <p:cTn id="2" dur="indefinite" nodeType="mainSeq">
+                <p:childTnLst>
+                  <p:par>
+                    <p:cTn id="3" fill="hold">
+                      <p:stCondLst>
+                        <p:cond delay="indefinite"/>
+                      </p:stCondLst>
+                      <p:childTnLst>
+                        <p:par>
+                          <p:cTn id="4" fill="hold">
+                            <p:stCondLst>
+                              <p:cond delay="0"/>
+                            </p:stCondLst>
+                            <p:childTnLst>
+                              <p:par>
+                                <p:cTn id="5" presetID="1" presetClass="entr" presetSubtype="0" fill="hold" grpId="0" nodeType="clickEffect">
+                                  <p:stCondLst>
+                                    <p:cond delay="0"/>
+                                  </p:stCondLst>
+                                  <p:childTnLst>
+                                    <p:set>
+                                      <p:cBhvr>
+                                        <p:cTn id="6" dur="1" fill="hold">
+                                          <p:stCondLst>
+                                            <p:cond delay="0"/>
+                                          </p:stCondLst>
+                                        </p:cTn>
+                                        <p:tgtEl>
+                                          <p:spTgt spid="3">
+                                            <p:txEl>
+                                              <p:pRg st="0" end="0"/>
+                                            </p:txEl>
+                                          </p:spTgt>
+                                        </p:tgtEl>
+                                        <p:attrNameLst>
+                                          <p:attrName>style.visibility</p:attrName>
+                                        </p:attrNameLst>
+                                      </p:cBhvr>
+                                      <p:to>
+                                        <p:strVal val="visible"/>
+                                      </p:to>
+                                    </p:set>
+                                  </p:childTnLst>
+                                </p:cTn>
+                              </p:par>
+                            </p:childTnLst>
+                          </p:cTn>
+                        </p:par>
+                      </p:childTnLst>
+                    </p:cTn>
+                  </p:par>
+                  <p:par>
+                    <p:cTn id="7" fill="hold">
+                      <p:stCondLst>
+                        <p:cond delay="indefinite"/>
+                      </p:stCondLst>
+                      <p:childTnLst>
+                        <p:par>
+                          <p:cTn id="8" fill="hold">
+                            <p:stCondLst>
+                              <p:cond delay="0"/>
+                            </p:stCondLst>
+                            <p:childTnLst>
+                              <p:par>
+                                <p:cTn id="9" presetID="1" presetClass="entr" presetSubtype="0" fill="hold" grpId="0" nodeType="clickEffect">
+                                  <p:stCondLst>
+                                    <p:cond delay="0"/>
+                                  </p:stCondLst>
+                                  <p:childTnLst>
+                                    <p:set>
+                                      <p:cBhvr>
+                                        <p:cTn id="10" dur="1" fill="hold">
+                                          <p:stCondLst>
+                                            <p:cond delay="0"/>
+                                          </p:stCondLst>
+                                        </p:cTn>
+                                        <p:tgtEl>
+                                          <p:spTgt spid="3">
+                                            <p:txEl>
+                                              <p:pRg st="1" end="1"/>
+                                            </p:txEl>
+                                          </p:spTgt>
+                                        </p:tgtEl>
+                                        <p:attrNameLst>
+                                          <p:attrName>style.visibility</p:attrName>
+                                        </p:attrNameLst>
+                                      </p:cBhvr>
+                                      <p:to>
+                                        <p:strVal val="visible"/>
+                                      </p:to>
+                                    </p:set>
+                                  </p:childTnLst>
+                                </p:cTn>
+                              </p:par>
+                            </p:childTnLst>
+                          </p:cTn>
+                        </p:par>
+                      </p:childTnLst>
+                    </p:cTn>
+                  </p:par>
+                  <p:par>
+                    <p:cTn id="11" fill="hold">
+                      <p:stCondLst>
+                        <p:cond delay="indefinite"/>
+                      </p:stCondLst>
+                      <p:childTnLst>
+                        <p:par>
+                          <p:cTn id="12" fill="hold">
+                            <p:stCondLst>
+                              <p:cond delay="0"/>
+                            </p:stCondLst>
+                            <p:childTnLst>
+                              <p:par>
+                                <p:cTn id="13" presetID="1" presetClass="entr" presetSubtype="0" fill="hold" grpId="0" nodeType="clickEffect">
+                                  <p:stCondLst>
+                                    <p:cond delay="0"/>
+                                  </p:stCondLst>
+                                  <p:childTnLst>
+                                    <p:set>
+                                      <p:cBhvr>
+                                        <p:cTn id="14" dur="1" fill="hold">
+                                          <p:stCondLst>
+                                            <p:cond delay="0"/>
+                                          </p:stCondLst>
+                                        </p:cTn>
+                                        <p:tgtEl>
+                                          <p:spTgt spid="3">
+                                            <p:txEl>
+                                              <p:pRg st="2" end="2"/>
+                                            </p:txEl>
+                                          </p:spTgt>
+                                        </p:tgtEl>
+                                        <p:attrNameLst>
+                                          <p:attrName>style.visibility</p:attrName>
+                                        </p:attrNameLst>
+                                      </p:cBhvr>
+                                      <p:to>
+                                        <p:strVal val="visible"/>
+                                      </p:to>
+                                    </p:set>
+                                  </p:childTnLst>
+                                </p:cTn>
+                              </p:par>
+                              <p:par>
+                                <p:cTn id="15" presetID="1" presetClass="entr" presetSubtype="0" fill="hold" grpId="0" nodeType="withEffect">
+                                  <p:stCondLst>
+                                    <p:cond delay="0"/>
+                                  </p:stCondLst>
+                                  <p:childTnLst>
+                                    <p:set>
+                                      <p:cBhvr>
+                                        <p:cTn id="16" dur="1" fill="hold">
+                                          <p:stCondLst>
+                                            <p:cond delay="0"/>
+                                          </p:stCondLst>
+                                        </p:cTn>
+                                        <p:tgtEl>
+                                          <p:spTgt spid="3">
+                                            <p:txEl>
+                                              <p:pRg st="3" end="3"/>
+                                            </p:txEl>
+                                          </p:spTgt>
+                                        </p:tgtEl>
+                                        <p:attrNameLst>
+                                          <p:attrName>style.visibility</p:attrName>
+                                        </p:attrNameLst>
+                                      </p:cBhvr>
+                                      <p:to>
+                                        <p:strVal val="visible"/>
+                                      </p:to>
+                                    </p:set>
+                                  </p:childTnLst>
+                                </p:cTn>
+                              </p:par>
+                              <p:par>
+                                <p:cTn id="17" presetID="1" presetClass="entr" presetSubtype="0" fill="hold" grpId="0" nodeType="withEffect">
+                                  <p:stCondLst>
+                                    <p:cond delay="0"/>
+                                  </p:stCondLst>
+                                  <p:childTnLst>
+                                    <p:set>
+                                      <p:cBhvr>
+                                        <p:cTn id="18" dur="1" fill="hold">
+                                          <p:stCondLst>
+                                            <p:cond delay="0"/>
+                                          </p:stCondLst>
+                                        </p:cTn>
+                                        <p:tgtEl>
+                                          <p:spTgt spid="3">
+                                            <p:txEl>
+                                              <p:pRg st="4" end="4"/>
+                                            </p:txEl>
+                                          </p:spTgt>
+                                        </p:tgtEl>
+                                        <p:attrNameLst>
+                                          <p:attrName>style.visibility</p:attrName>
+                                        </p:attrNameLst>
+                                      </p:cBhvr>
+                                      <p:to>
+                                        <p:strVal val="visible"/>
+                                      </p:to>
+                                    </p:set>
+                                  </p:childTnLst>
+                                </p:cTn>
+                              </p:par>
+                            </p:childTnLst>
+                          </p:cTn>
+                        </p:par>
+                      </p:childTnLst>
+                    </p:cTn>
+                  </p:par>
+                  <p:par>
+                    <p:cTn id="19" fill="hold">
+                      <p:stCondLst>
+                        <p:cond delay="indefinite"/>
+                      </p:stCondLst>
+                      <p:childTnLst>
+                        <p:par>
+                          <p:cTn id="20" fill="hold">
+                            <p:stCondLst>
+                              <p:cond delay="0"/>
+                            </p:stCondLst>
+                            <p:childTnLst>
+                              <p:par>
+                                <p:cTn id="21" presetID="1" presetClass="entr" presetSubtype="0" fill="hold" grpId="0" nodeType="clickEffect">
+                                  <p:stCondLst>
+                                    <p:cond delay="0"/>
+                                  </p:stCondLst>
+                                  <p:childTnLst>
+                                    <p:set>
+                                      <p:cBhvr>
+                                        <p:cTn id="22" dur="1" fill="hold">
+                                          <p:stCondLst>
+                                            <p:cond delay="0"/>
+                                          </p:stCondLst>
+                                        </p:cTn>
+                                        <p:tgtEl>
+                                          <p:spTgt spid="3">
+                                            <p:txEl>
+                                              <p:pRg st="5" end="5"/>
+                                            </p:txEl>
+                                          </p:spTgt>
+                                        </p:tgtEl>
+                                        <p:attrNameLst>
+                                          <p:attrName>style.visibility</p:attrName>
+                                        </p:attrNameLst>
+                                      </p:cBhvr>
+                                      <p:to>
+                                        <p:strVal val="visible"/>
+                                      </p:to>
+                                    </p:set>
+                                  </p:childTnLst>
+                                </p:cTn>
+                              </p:par>
+                            </p:childTnLst>
+                          </p:cTn>
+                        </p:par>
+                      </p:childTnLst>
+                    </p:cTn>
+                  </p:par>
+                  <p:par>
+                    <p:cTn id="23" fill="hold">
+                      <p:stCondLst>
+                        <p:cond delay="indefinite"/>
+                      </p:stCondLst>
+                      <p:childTnLst>
+                        <p:par>
+                          <p:cTn id="24" fill="hold">
+                            <p:stCondLst>
+                              <p:cond delay="0"/>
+                            </p:stCondLst>
+                            <p:childTnLst>
+                              <p:par>
+                                <p:cTn id="25" presetID="1" presetClass="entr" presetSubtype="0" fill="hold" grpId="0" nodeType="clickEffect">
+                                  <p:stCondLst>
+                                    <p:cond delay="0"/>
+                                  </p:stCondLst>
+                                  <p:childTnLst>
+                                    <p:set>
+                                      <p:cBhvr>
+                                        <p:cTn id="26" dur="1" fill="hold">
+                                          <p:stCondLst>
+                                            <p:cond delay="0"/>
+                                          </p:stCondLst>
+                                        </p:cTn>
+                                        <p:tgtEl>
+                                          <p:spTgt spid="3">
+                                            <p:txEl>
+                                              <p:pRg st="6" end="6"/>
+                                            </p:txEl>
+                                          </p:spTgt>
+                                        </p:tgtEl>
+                                        <p:attrNameLst>
+                                          <p:attrName>style.visibility</p:attrName>
+                                        </p:attrNameLst>
+                                      </p:cBhvr>
+                                      <p:to>
+                                        <p:strVal val="visible"/>
+                                      </p:to>
+                                    </p:set>
+                                  </p:childTnLst>
+                                </p:cTn>
+                              </p:par>
+                            </p:childTnLst>
+                          </p:cTn>
+                        </p:par>
+                      </p:childTnLst>
+                    </p:cTn>
+                  </p:par>
+                  <p:par>
+                    <p:cTn id="27" fill="hold">
+                      <p:stCondLst>
+                        <p:cond delay="indefinite"/>
+                      </p:stCondLst>
+                      <p:childTnLst>
+                        <p:par>
+                          <p:cTn id="28" fill="hold">
+                            <p:stCondLst>
+                              <p:cond delay="0"/>
+                            </p:stCondLst>
+                            <p:childTnLst>
+                              <p:par>
+                                <p:cTn id="29" presetID="1" presetClass="entr" presetSubtype="0" fill="hold" grpId="0" nodeType="clickEffect">
+                                  <p:stCondLst>
+                                    <p:cond delay="0"/>
+                                  </p:stCondLst>
+                                  <p:childTnLst>
+                                    <p:set>
+                                      <p:cBhvr>
+                                        <p:cTn id="30" dur="1" fill="hold">
+                                          <p:stCondLst>
+                                            <p:cond delay="0"/>
+                                          </p:stCondLst>
+                                        </p:cTn>
+                                        <p:tgtEl>
+                                          <p:spTgt spid="3">
+                                            <p:txEl>
+                                              <p:pRg st="7" end="7"/>
+                                            </p:txEl>
+                                          </p:spTgt>
+                                        </p:tgtEl>
+                                        <p:attrNameLst>
+                                          <p:attrName>style.visibility</p:attrName>
+                                        </p:attrNameLst>
+                                      </p:cBhvr>
+                                      <p:to>
+                                        <p:strVal val="visible"/>
+                                      </p:to>
+                                    </p:set>
+                                  </p:childTnLst>
+                                </p:cTn>
+                              </p:par>
+                            </p:childTnLst>
+                          </p:cTn>
+                        </p:par>
+                      </p:childTnLst>
+                    </p:cTn>
+                  </p:par>
+                </p:childTnLst>
+              </p:cTn>
+              <p:prevCondLst>
+                <p:cond evt="onPrev" delay="0">
+                  <p:tgtEl>
+                    <p:sldTgt/>
+                  </p:tgtEl>
+                </p:cond>
+              </p:prevCondLst>
+              <p:nextCondLst>
+                <p:cond evt="onNext" delay="0">
+                  <p:tgtEl>
+                    <p:sldTgt/>
+                  </p:tgtEl>
+                </p:cond>
+              </p:nextCondLst>
+            </p:seq>
+          </p:childTnLst>
+        </p:cTn>
+      </p:par>
+    </p:tnLst>
+    <p:bldLst>
+      <p:bldP spid="3" grpId="0" build="p"/>
+    </p:bldLst>
+  </p:timing>
+</p:sld>
+</file>
+
+<file path=ppt/slides/slide31.xml><?xml version="1.0" encoding="utf-8"?>
+<p:sld xmlns:a="http://schemas.openxmlformats.org/drawingml/2006/main" xmlns:r="http://schemas.openxmlformats.org/officeDocument/2006/relationships" xmlns:p="http://schemas.openxmlformats.org/presentationml/2006/main">
+  <p:cSld>
+    <p:spTree>
+      <p:nvGrpSpPr>
+        <p:cNvPr id="1" name=""/>
+        <p:cNvGrpSpPr/>
+        <p:nvPr/>
+      </p:nvGrpSpPr>
+      <p:grpSpPr>
+        <a:xfrm>
+          <a:off x="0" y="0"/>
+          <a:ext cx="0" cy="0"/>
+          <a:chOff x="0" y="0"/>
+          <a:chExt cx="0" cy="0"/>
+        </a:xfrm>
+      </p:grpSpPr>
+      <p:sp>
+        <p:nvSpPr>
+          <p:cNvPr id="2" name="Title 1">
+            <a:extLst>
+              <a:ext uri="{FF2B5EF4-FFF2-40B4-BE49-F238E27FC236}">
                 <a16:creationId xmlns:a16="http://schemas.microsoft.com/office/drawing/2014/main" id="{1E4372E3-A3FD-9127-6C36-D4CE349BDD04}"/>
               </a:ext>
             </a:extLst>
@@ -19933,7 +20628,7 @@
           <a:p>
             <a:fld id="{CD10D25F-A2D7-CB4D-BFF2-5E4504CA3430}" type="slidenum">
               <a:rPr lang="en-US" smtClean="0"/>
-              <a:t>30</a:t>
+              <a:t>31</a:t>
             </a:fld>
             <a:endParaRPr lang="en-US"/>
           </a:p>

</xml_diff>